<commit_message>
Modifiche titoli definitivi e fix grafiche
</commit_message>
<xml_diff>
--- a/Presentazione/Presentazione Gabriel Rovesti.pptx
+++ b/Presentazione/Presentazione Gabriel Rovesti.pptx
@@ -9790,7 +9790,7 @@
         </p:nvSpPr>
         <p:spPr>
           <a:xfrm>
-            <a:off x="576062" y="3708416"/>
+            <a:off x="576062" y="3653572"/>
             <a:ext cx="8411378" cy="2534027"/>
           </a:xfrm>
           <a:prstGeom prst="rect">
@@ -9938,8 +9938,8 @@
         </p:nvSpPr>
         <p:spPr>
           <a:xfrm>
-            <a:off x="457200" y="-182567"/>
-            <a:ext cx="5213100" cy="1143300"/>
+            <a:off x="457199" y="-182567"/>
+            <a:ext cx="5792993" cy="1143300"/>
           </a:xfrm>
           <a:prstGeom prst="rect">
             <a:avLst/>
@@ -9966,7 +9966,7 @@
                   <a:srgbClr val="FFFFFF"/>
                 </a:solidFill>
               </a:rPr>
-              <a:t>Il progetto: VerifiedMovies</a:t>
+              <a:t>Il progetto realizzato</a:t>
             </a:r>
             <a:endParaRPr sz="3000" dirty="0">
               <a:solidFill>
@@ -10270,7 +10270,7 @@
                   <a:srgbClr val="FFFFFF"/>
                 </a:solidFill>
               </a:rPr>
-              <a:t>Il progetto: VerifiedMovies</a:t>
+              <a:t>Le caratteristiche del progetto</a:t>
             </a:r>
             <a:endParaRPr sz="3000" dirty="0">
               <a:solidFill>
@@ -10453,7 +10453,7 @@
               <a:t>per associare all’utente un </a:t>
             </a:r>
             <a:r>
-              <a:rPr lang="it-IT" sz="1800" b="1" i="1" dirty="0"/>
+              <a:rPr lang="it-IT" sz="1800" b="1" dirty="0"/>
               <a:t>Decentralized Identifier</a:t>
             </a:r>
             <a:r>
@@ -10607,7 +10607,7 @@
                   <a:srgbClr val="FFFFFF"/>
                 </a:solidFill>
               </a:rPr>
-              <a:t>Codifica: Verifica dell’età</a:t>
+              <a:t>Verifica dell’età</a:t>
             </a:r>
             <a:endParaRPr sz="3000" dirty="0">
               <a:solidFill>
@@ -10890,9 +10890,16 @@
               <a:rPr lang="it-IT" sz="1600" dirty="0"/>
               <a:t>Risoluzione delle firme digitali presenti e verifica della catena di fiducia usando </a:t>
             </a:r>
+          </a:p>
+          <a:p>
+            <a:pPr>
+              <a:lnSpc>
+                <a:spcPct val="150000"/>
+              </a:lnSpc>
+            </a:pPr>
             <a:r>
               <a:rPr lang="it-IT" sz="1600" b="1" dirty="0"/>
-              <a:t>Self Sovereign Identity</a:t>
+              <a:t>      Self Sovereign Identity</a:t>
             </a:r>
             <a:endParaRPr lang="it-IT" sz="1600" dirty="0"/>
           </a:p>
@@ -10968,7 +10975,7 @@
                   <a:srgbClr val="FFFFFF"/>
                 </a:solidFill>
               </a:rPr>
-              <a:t>Codifica: Tecnologie utilizzate</a:t>
+              <a:t>Tecnologie del progetto</a:t>
             </a:r>
             <a:endParaRPr sz="3000" dirty="0">
               <a:solidFill>
@@ -11798,7 +11805,7 @@
             </a:pPr>
             <a:r>
               <a:rPr lang="it-IT" sz="1800" dirty="0"/>
-              <a:t>Realizzazione di un progetto che utilizza tecnologie non del tutto standardizzate, complesse ma di sicuri sviluppi futuri</a:t>
+              <a:t>Realizzazione di un progetto che utilizza tecnologie non del tutto standardizzate, con molti sviluppi futuri e importante oggetto di ricerca </a:t>
             </a:r>
           </a:p>
           <a:p>
@@ -12351,8 +12358,8 @@
         </p:nvSpPr>
         <p:spPr>
           <a:xfrm>
-            <a:off x="457199" y="2945675"/>
-            <a:ext cx="8411378" cy="3780522"/>
+            <a:off x="457199" y="2947742"/>
+            <a:ext cx="8411378" cy="2949525"/>
           </a:xfrm>
           <a:prstGeom prst="rect">
             <a:avLst/>
@@ -12441,26 +12448,6 @@
               <a:rPr lang="it-IT" sz="1800" dirty="0"/>
               <a:t>Informazioni salvate in modo trasparente e decentralizzato</a:t>
             </a:r>
-          </a:p>
-          <a:p>
-            <a:pPr marL="285750" indent="-285750">
-              <a:lnSpc>
-                <a:spcPct val="150000"/>
-              </a:lnSpc>
-              <a:buFont typeface="Arial" panose="020B0604020202020204" pitchFamily="34" charset="0"/>
-              <a:buChar char="•"/>
-            </a:pPr>
-            <a:endParaRPr lang="it-IT" sz="1800" dirty="0"/>
-          </a:p>
-          <a:p>
-            <a:pPr marL="285750" indent="-285750">
-              <a:lnSpc>
-                <a:spcPct val="150000"/>
-              </a:lnSpc>
-              <a:buFont typeface="Arial" panose="020B0604020202020204" pitchFamily="34" charset="0"/>
-              <a:buChar char="•"/>
-            </a:pPr>
-            <a:endParaRPr lang="it-IT" sz="1800" dirty="0"/>
           </a:p>
         </p:txBody>
       </p:sp>
@@ -12676,7 +12663,7 @@
         </p:nvSpPr>
         <p:spPr>
           <a:xfrm>
-            <a:off x="414618" y="3292920"/>
+            <a:off x="554467" y="3105511"/>
             <a:ext cx="8411378" cy="2949525"/>
           </a:xfrm>
           <a:prstGeom prst="rect">
@@ -12779,8 +12766,8 @@
         </p:blipFill>
         <p:spPr bwMode="auto">
           <a:xfrm>
-            <a:off x="751897" y="1354315"/>
-            <a:ext cx="2853369" cy="1493065"/>
+            <a:off x="841800" y="1192665"/>
+            <a:ext cx="2853369" cy="1680913"/>
           </a:xfrm>
           <a:prstGeom prst="rect">
             <a:avLst/>
@@ -12826,8 +12813,8 @@
         </p:blipFill>
         <p:spPr bwMode="auto">
           <a:xfrm>
-            <a:off x="5641131" y="1197988"/>
-            <a:ext cx="2853369" cy="1902246"/>
+            <a:off x="5448832" y="1192665"/>
+            <a:ext cx="2853368" cy="1680913"/>
           </a:xfrm>
           <a:prstGeom prst="rect">
             <a:avLst/>
@@ -13219,7 +13206,7 @@
         </p:blipFill>
         <p:spPr bwMode="auto">
           <a:xfrm>
-            <a:off x="7739424" y="2544896"/>
+            <a:off x="7626285" y="2544896"/>
             <a:ext cx="1060515" cy="1768207"/>
           </a:xfrm>
           <a:prstGeom prst="rect">
@@ -13479,7 +13466,7 @@
         </p:nvSpPr>
         <p:spPr>
           <a:xfrm>
-            <a:off x="457199" y="2781505"/>
+            <a:off x="457199" y="2627615"/>
             <a:ext cx="8411378" cy="3365024"/>
           </a:xfrm>
           <a:prstGeom prst="rect">
@@ -14498,7 +14485,7 @@
               <a:t>Identificazione univoca tramite un </a:t>
             </a:r>
             <a:r>
-              <a:rPr lang="it-IT" sz="1800" b="1" i="1" dirty="0"/>
+              <a:rPr lang="it-IT" sz="1800" b="1" dirty="0"/>
               <a:t>Decentralized Identifier</a:t>
             </a:r>
             <a:r>

</xml_diff>

<commit_message>
Piccole modifiche coerenti slides
</commit_message>
<xml_diff>
--- a/Presentazione/Presentazione Gabriel Rovesti.pptx
+++ b/Presentazione/Presentazione Gabriel Rovesti.pptx
@@ -358,7 +358,7 @@
           <a:p>
             <a:fld id="{6469F890-3609-4E18-B68A-510CF7125ACB}" type="datetimeFigureOut">
               <a:rPr lang="it-IT" smtClean="0"/>
-              <a:t>21/06/2023</a:t>
+              <a:t>22/06/2023</a:t>
             </a:fld>
             <a:endParaRPr lang="it-IT"/>
           </a:p>
@@ -11681,7 +11681,7 @@
         <p:spPr>
           <a:xfrm>
             <a:off x="414618" y="1223907"/>
-            <a:ext cx="8411378" cy="4611519"/>
+            <a:ext cx="8411378" cy="4196020"/>
           </a:xfrm>
           <a:prstGeom prst="rect">
             <a:avLst/>
@@ -11818,7 +11818,7 @@
             </a:pPr>
             <a:r>
               <a:rPr lang="it-IT" sz="1800" dirty="0"/>
-              <a:t>Autonomia nella realizzazione del progetto ma poca presenza e guida sulle attività svolte</a:t>
+              <a:t>Autonomia nella realizzazione del progetto e maturazione professionale</a:t>
             </a:r>
           </a:p>
         </p:txBody>

</xml_diff>

<commit_message>
Nuove info discussione + volantino + varie info
</commit_message>
<xml_diff>
--- a/Presentazione/Presentazione Gabriel Rovesti.pptx
+++ b/Presentazione/Presentazione Gabriel Rovesti.pptx
@@ -358,7 +358,7 @@
           <a:p>
             <a:fld id="{6469F890-3609-4E18-B68A-510CF7125ACB}" type="datetimeFigureOut">
               <a:rPr lang="it-IT" smtClean="0"/>
-              <a:t>22/06/2023</a:t>
+              <a:t>06/07/2023</a:t>
             </a:fld>
             <a:endParaRPr lang="it-IT"/>
           </a:p>
@@ -10818,7 +10818,7 @@
             </a:r>
             <a:r>
               <a:rPr lang="it-IT" sz="1600" dirty="0"/>
-              <a:t> usato in fase di login</a:t>
+              <a:t> usato in fase di autenticazione</a:t>
             </a:r>
           </a:p>
           <a:p>
@@ -12004,7 +12004,7 @@
         </p:blipFill>
         <p:spPr>
           <a:xfrm>
-            <a:off x="5278503" y="2634972"/>
+            <a:off x="457200" y="1928185"/>
             <a:ext cx="3408297" cy="1292592"/>
           </a:xfrm>
           <a:prstGeom prst="roundRect">
@@ -12039,8 +12039,8 @@
         </p:nvSpPr>
         <p:spPr>
           <a:xfrm>
-            <a:off x="457200" y="1645467"/>
-            <a:ext cx="4401686" cy="3780522"/>
+            <a:off x="3967110" y="1238705"/>
+            <a:ext cx="4401686" cy="2949525"/>
           </a:xfrm>
           <a:prstGeom prst="rect">
             <a:avLst/>
@@ -12066,35 +12066,10 @@
             </a:r>
           </a:p>
           <a:p>
-            <a:pPr marL="285750" indent="-285750">
+            <a:pPr>
               <a:lnSpc>
                 <a:spcPct val="150000"/>
               </a:lnSpc>
-              <a:buFont typeface="Arial" panose="020B0604020202020204" pitchFamily="34" charset="0"/>
-              <a:buChar char="•"/>
-            </a:pPr>
-            <a:endParaRPr lang="it-IT" sz="1800" dirty="0"/>
-          </a:p>
-          <a:p>
-            <a:pPr marL="285750" indent="-285750">
-              <a:lnSpc>
-                <a:spcPct val="150000"/>
-              </a:lnSpc>
-              <a:buFont typeface="Arial" panose="020B0604020202020204" pitchFamily="34" charset="0"/>
-              <a:buChar char="•"/>
-            </a:pPr>
-            <a:r>
-              <a:rPr lang="it-IT" sz="1800" dirty="0"/>
-              <a:t>6 sedi presenti nel territorio</a:t>
-            </a:r>
-          </a:p>
-          <a:p>
-            <a:pPr marL="285750" indent="-285750">
-              <a:lnSpc>
-                <a:spcPct val="150000"/>
-              </a:lnSpc>
-              <a:buFont typeface="Arial" panose="020B0604020202020204" pitchFamily="34" charset="0"/>
-              <a:buChar char="•"/>
             </a:pPr>
             <a:endParaRPr lang="it-IT" sz="1800" dirty="0"/>
           </a:p>
@@ -12160,6 +12135,168 @@
           </a:p>
         </p:txBody>
       </p:sp>
+      <p:pic>
+        <p:nvPicPr>
+          <p:cNvPr id="8" name="Immagine 7">
+            <a:extLst>
+              <a:ext uri="{FF2B5EF4-FFF2-40B4-BE49-F238E27FC236}">
+                <a16:creationId xmlns:a16="http://schemas.microsoft.com/office/drawing/2014/main" id="{8E46C6F0-5445-894E-B4C3-ADD0E58D6F0A}"/>
+              </a:ext>
+            </a:extLst>
+          </p:cNvPr>
+          <p:cNvPicPr>
+            <a:picLocks noChangeAspect="1"/>
+          </p:cNvPicPr>
+          <p:nvPr/>
+        </p:nvPicPr>
+        <p:blipFill>
+          <a:blip r:embed="rId4"/>
+          <a:stretch>
+            <a:fillRect/>
+          </a:stretch>
+        </p:blipFill>
+        <p:spPr>
+          <a:xfrm>
+            <a:off x="592494" y="4157746"/>
+            <a:ext cx="1676545" cy="1859441"/>
+          </a:xfrm>
+          <a:prstGeom prst="roundRect">
+            <a:avLst>
+              <a:gd name="adj" fmla="val 16667"/>
+            </a:avLst>
+          </a:prstGeom>
+          <a:ln>
+            <a:noFill/>
+          </a:ln>
+          <a:effectLst>
+            <a:outerShdw blurRad="76200" dist="38100" dir="7800000" algn="tl" rotWithShape="0">
+              <a:srgbClr val="000000">
+                <a:alpha val="40000"/>
+              </a:srgbClr>
+            </a:outerShdw>
+          </a:effectLst>
+          <a:scene3d>
+            <a:camera prst="orthographicFront"/>
+            <a:lightRig rig="contrasting" dir="t">
+              <a:rot lat="0" lon="0" rev="4200000"/>
+            </a:lightRig>
+          </a:scene3d>
+          <a:sp3d prstMaterial="plastic">
+            <a:bevelT w="381000" h="114300" prst="relaxedInset"/>
+            <a:contourClr>
+              <a:srgbClr val="969696"/>
+            </a:contourClr>
+          </a:sp3d>
+        </p:spPr>
+      </p:pic>
+      <p:pic>
+        <p:nvPicPr>
+          <p:cNvPr id="10" name="Immagine 9">
+            <a:extLst>
+              <a:ext uri="{FF2B5EF4-FFF2-40B4-BE49-F238E27FC236}">
+                <a16:creationId xmlns:a16="http://schemas.microsoft.com/office/drawing/2014/main" id="{E70F8B12-AB90-8521-4F26-8D0227FBC3BD}"/>
+              </a:ext>
+            </a:extLst>
+          </p:cNvPr>
+          <p:cNvPicPr>
+            <a:picLocks noChangeAspect="1"/>
+          </p:cNvPicPr>
+          <p:nvPr/>
+        </p:nvPicPr>
+        <p:blipFill>
+          <a:blip r:embed="rId5"/>
+          <a:stretch>
+            <a:fillRect/>
+          </a:stretch>
+        </p:blipFill>
+        <p:spPr>
+          <a:xfrm>
+            <a:off x="3885261" y="4145197"/>
+            <a:ext cx="1373477" cy="1884538"/>
+          </a:xfrm>
+          <a:prstGeom prst="roundRect">
+            <a:avLst>
+              <a:gd name="adj" fmla="val 16667"/>
+            </a:avLst>
+          </a:prstGeom>
+          <a:ln>
+            <a:noFill/>
+          </a:ln>
+          <a:effectLst>
+            <a:outerShdw blurRad="76200" dist="38100" dir="7800000" algn="tl" rotWithShape="0">
+              <a:srgbClr val="000000">
+                <a:alpha val="40000"/>
+              </a:srgbClr>
+            </a:outerShdw>
+          </a:effectLst>
+          <a:scene3d>
+            <a:camera prst="orthographicFront"/>
+            <a:lightRig rig="contrasting" dir="t">
+              <a:rot lat="0" lon="0" rev="4200000"/>
+            </a:lightRig>
+          </a:scene3d>
+          <a:sp3d prstMaterial="plastic">
+            <a:bevelT w="381000" h="114300" prst="relaxedInset"/>
+            <a:contourClr>
+              <a:srgbClr val="969696"/>
+            </a:contourClr>
+          </a:sp3d>
+        </p:spPr>
+      </p:pic>
+      <p:pic>
+        <p:nvPicPr>
+          <p:cNvPr id="14" name="Immagine 13">
+            <a:extLst>
+              <a:ext uri="{FF2B5EF4-FFF2-40B4-BE49-F238E27FC236}">
+                <a16:creationId xmlns:a16="http://schemas.microsoft.com/office/drawing/2014/main" id="{B6459507-1F3A-7DC4-6B85-197F9EFE943F}"/>
+              </a:ext>
+            </a:extLst>
+          </p:cNvPr>
+          <p:cNvPicPr>
+            <a:picLocks noChangeAspect="1"/>
+          </p:cNvPicPr>
+          <p:nvPr/>
+        </p:nvPicPr>
+        <p:blipFill>
+          <a:blip r:embed="rId6"/>
+          <a:stretch>
+            <a:fillRect/>
+          </a:stretch>
+        </p:blipFill>
+        <p:spPr>
+          <a:xfrm>
+            <a:off x="6871877" y="4142506"/>
+            <a:ext cx="1735545" cy="1874681"/>
+          </a:xfrm>
+          <a:prstGeom prst="roundRect">
+            <a:avLst>
+              <a:gd name="adj" fmla="val 16667"/>
+            </a:avLst>
+          </a:prstGeom>
+          <a:ln>
+            <a:noFill/>
+          </a:ln>
+          <a:effectLst>
+            <a:outerShdw blurRad="76200" dist="38100" dir="7800000" algn="tl" rotWithShape="0">
+              <a:srgbClr val="000000">
+                <a:alpha val="40000"/>
+              </a:srgbClr>
+            </a:outerShdw>
+          </a:effectLst>
+          <a:scene3d>
+            <a:camera prst="orthographicFront"/>
+            <a:lightRig rig="contrasting" dir="t">
+              <a:rot lat="0" lon="0" rev="4200000"/>
+            </a:lightRig>
+          </a:scene3d>
+          <a:sp3d prstMaterial="plastic">
+            <a:bevelT w="381000" h="114300" prst="relaxedInset"/>
+            <a:contourClr>
+              <a:srgbClr val="969696"/>
+            </a:contourClr>
+          </a:sp3d>
+        </p:spPr>
+      </p:pic>
     </p:spTree>
   </p:cSld>
   <p:clrMapOvr>
@@ -13489,7 +13626,7 @@
             </a:pPr>
             <a:r>
               <a:rPr lang="it-IT" sz="1800" dirty="0"/>
-              <a:t>Identificatori univoci composti da una stringa alfanumerica a associati ad un’entità verificabile normati dallo standard W3C omonimo</a:t>
+              <a:t>Identificatori univoci composti da una stringa alfanumerica associati ad un’entità verificabile secondo le regole dello standard W3C omonimo</a:t>
             </a:r>
           </a:p>
           <a:p>
@@ -13512,8 +13649,13 @@
             </a:pPr>
             <a:r>
               <a:rPr lang="it-IT" sz="1800" dirty="0"/>
-              <a:t>Ad essi è associato un documento che descrive il soggetto associato e i metodi di autenticazione utilizzati in modo sicuro</a:t>
+              <a:t>Ad essi è associato un documento che descrive il soggetto associato e i metodi di autenticazione utilizzati in modo sicuro, chiamato </a:t>
             </a:r>
+            <a:r>
+              <a:rPr lang="it-IT" sz="1800" i="1" dirty="0"/>
+              <a:t>DID Document</a:t>
+            </a:r>
+            <a:endParaRPr lang="it-IT" sz="1800" dirty="0"/>
           </a:p>
           <a:p>
             <a:pPr>
@@ -13750,8 +13892,8 @@
         </p:nvSpPr>
         <p:spPr>
           <a:xfrm>
-            <a:off x="457199" y="3795057"/>
-            <a:ext cx="8411378" cy="2534027"/>
+            <a:off x="457199" y="3446807"/>
+            <a:ext cx="8411378" cy="2949525"/>
           </a:xfrm>
           <a:prstGeom prst="rect">
             <a:avLst/>
@@ -13773,15 +13915,15 @@
             </a:pPr>
             <a:r>
               <a:rPr lang="it-IT" sz="1800" dirty="0"/>
-              <a:t>Standard W3C aperto per credenziali digitali firmate digitalmente e verificabili pubblicamente usando il </a:t>
+              <a:t>Standard W3C omonimo e aperto all’uso di credenziali digitali firmate digitalmente e verificabili pubblicamente usando il </a:t>
             </a:r>
             <a:r>
               <a:rPr lang="it-IT" sz="1800" b="1" dirty="0"/>
-              <a:t>Decentralized Identifier</a:t>
+              <a:t>Decentralized Identifier </a:t>
             </a:r>
             <a:r>
               <a:rPr lang="it-IT" sz="1800" dirty="0"/>
-              <a:t> dell’utente</a:t>
+              <a:t>dell’utente</a:t>
             </a:r>
           </a:p>
           <a:p>
@@ -13860,8 +14002,8 @@
         </p:blipFill>
         <p:spPr>
           <a:xfrm>
-            <a:off x="2716369" y="960733"/>
-            <a:ext cx="3711262" cy="2743438"/>
+            <a:off x="2906892" y="850673"/>
+            <a:ext cx="3511991" cy="2596133"/>
           </a:xfrm>
           <a:prstGeom prst="rect">
             <a:avLst/>
@@ -14107,11 +14249,11 @@
             </a:r>
             <a:r>
               <a:rPr lang="it-IT" sz="1800" b="1" dirty="0"/>
-              <a:t>Verifiable Credentials </a:t>
+              <a:t>Verifiable Credentials (VC) </a:t>
             </a:r>
             <a:r>
               <a:rPr lang="it-IT" sz="1800" dirty="0"/>
-              <a:t>che condividono in modo sicuro e verificabile le proprie informazioni (normate nella stessa sezione)</a:t>
+              <a:t>che presentano un insieme di dati codificati con una prova crittografica di non manomissione</a:t>
             </a:r>
           </a:p>
           <a:p>

</xml_diff>

<commit_message>
Semplificazioni e chiarimenti slide e discorso
</commit_message>
<xml_diff>
--- a/Presentazione/Presentazione Gabriel Rovesti.pptx
+++ b/Presentazione/Presentazione Gabriel Rovesti.pptx
@@ -358,7 +358,7 @@
           <a:p>
             <a:fld id="{6469F890-3609-4E18-B68A-510CF7125ACB}" type="datetimeFigureOut">
               <a:rPr lang="it-IT" smtClean="0"/>
-              <a:t>06/07/2023</a:t>
+              <a:t>08/07/2023</a:t>
             </a:fld>
             <a:endParaRPr lang="it-IT"/>
           </a:p>
@@ -9435,7 +9435,7 @@
         </p:blipFill>
         <p:spPr>
           <a:xfrm>
-            <a:off x="2574013" y="894284"/>
+            <a:off x="2574013" y="817832"/>
             <a:ext cx="4177749" cy="2095341"/>
           </a:xfrm>
           <a:prstGeom prst="rect">
@@ -9457,8 +9457,8 @@
         </p:nvSpPr>
         <p:spPr>
           <a:xfrm>
-            <a:off x="457199" y="2892490"/>
-            <a:ext cx="8411378" cy="3365024"/>
+            <a:off x="457199" y="2871777"/>
+            <a:ext cx="8411378" cy="3370666"/>
           </a:xfrm>
           <a:prstGeom prst="rect">
             <a:avLst/>
@@ -9479,11 +9479,11 @@
               <a:buChar char="•"/>
             </a:pPr>
             <a:r>
-              <a:rPr lang="it-IT" sz="1800" dirty="0"/>
-              <a:t>La credenziale dell’utente viene emessa da un’entità fidata chiamata </a:t>
-            </a:r>
-            <a:r>
-              <a:rPr lang="it-IT" sz="1800" b="1" dirty="0"/>
+              <a:rPr lang="it-IT" sz="1600" dirty="0"/>
+              <a:t>La credenziale dell’utente viene rilasciata da un’entità fidata definita </a:t>
+            </a:r>
+            <a:r>
+              <a:rPr lang="it-IT" sz="1600" b="1" dirty="0"/>
               <a:t>issuer</a:t>
             </a:r>
           </a:p>
@@ -9495,7 +9495,7 @@
               <a:buFont typeface="Arial" panose="020B0604020202020204" pitchFamily="34" charset="0"/>
               <a:buChar char="•"/>
             </a:pPr>
-            <a:endParaRPr lang="it-IT" sz="1800" b="1" dirty="0"/>
+            <a:endParaRPr lang="it-IT" sz="1600" b="1" dirty="0"/>
           </a:p>
           <a:p>
             <a:pPr marL="285750" indent="-285750">
@@ -9506,22 +9506,22 @@
               <a:buChar char="•"/>
             </a:pPr>
             <a:r>
-              <a:rPr lang="it-IT" sz="1800" dirty="0"/>
+              <a:rPr lang="it-IT" sz="1600" dirty="0"/>
               <a:t>Esiste una «catena di fiducia» formata da una serie di </a:t>
             </a:r>
             <a:r>
-              <a:rPr lang="it-IT" sz="1800" i="1" dirty="0"/>
+              <a:rPr lang="it-IT" sz="1600" i="1" dirty="0"/>
               <a:t>issuer</a:t>
             </a:r>
             <a:r>
-              <a:rPr lang="it-IT" sz="1800" dirty="0"/>
+              <a:rPr lang="it-IT" sz="1600" dirty="0"/>
               <a:t> fidati partendo da un’unica firma di un’entità padre, definita </a:t>
             </a:r>
             <a:r>
-              <a:rPr lang="it-IT" sz="1800" b="1" dirty="0"/>
+              <a:rPr lang="it-IT" sz="1600" b="1" dirty="0"/>
               <a:t>certification authority</a:t>
             </a:r>
-            <a:endParaRPr lang="it-IT" sz="1800" dirty="0"/>
+            <a:endParaRPr lang="it-IT" sz="1600" dirty="0"/>
           </a:p>
           <a:p>
             <a:pPr>
@@ -9529,7 +9529,7 @@
                 <a:spcPct val="150000"/>
               </a:lnSpc>
             </a:pPr>
-            <a:endParaRPr lang="it-IT" sz="1800" b="1" dirty="0"/>
+            <a:endParaRPr lang="it-IT" sz="1600" b="1" dirty="0"/>
           </a:p>
           <a:p>
             <a:pPr marL="285750" indent="-285750">
@@ -9540,13 +9540,29 @@
               <a:buChar char="•"/>
             </a:pPr>
             <a:r>
-              <a:rPr lang="it-IT" sz="1800" dirty="0"/>
-              <a:t>L’utente fornisce questa credenziale come prova in qualità di </a:t>
-            </a:r>
-            <a:r>
-              <a:rPr lang="it-IT" sz="1800" b="1" dirty="0"/>
+              <a:rPr lang="it-IT" sz="1600" dirty="0"/>
+              <a:t>L’utente presenta la credenziale nel proprio </a:t>
+            </a:r>
+            <a:r>
+              <a:rPr lang="it-IT" sz="1600" i="1" dirty="0"/>
+              <a:t>wallet </a:t>
+            </a:r>
+            <a:r>
+              <a:rPr lang="it-IT" sz="1600" dirty="0"/>
+              <a:t>e li presenta come </a:t>
+            </a:r>
+            <a:r>
+              <a:rPr lang="it-IT" sz="1600" b="1" dirty="0"/>
               <a:t>holder</a:t>
             </a:r>
+          </a:p>
+          <a:p>
+            <a:pPr>
+              <a:lnSpc>
+                <a:spcPct val="150000"/>
+              </a:lnSpc>
+            </a:pPr>
+            <a:endParaRPr lang="it-IT" sz="1600" b="1" dirty="0"/>
           </a:p>
           <a:p>
             <a:pPr marL="285750" indent="-285750">
@@ -9556,25 +9572,26 @@
               <a:buFont typeface="Arial" panose="020B0604020202020204" pitchFamily="34" charset="0"/>
               <a:buChar char="•"/>
             </a:pPr>
-            <a:endParaRPr lang="it-IT" sz="1800" b="1" dirty="0"/>
-          </a:p>
-          <a:p>
-            <a:pPr marL="285750" indent="-285750">
-              <a:lnSpc>
-                <a:spcPct val="150000"/>
-              </a:lnSpc>
-              <a:buFont typeface="Arial" panose="020B0604020202020204" pitchFamily="34" charset="0"/>
-              <a:buChar char="•"/>
-            </a:pPr>
-            <a:r>
-              <a:rPr lang="it-IT" sz="1800" dirty="0"/>
-              <a:t>Il sito attiva un meccanismo di verifica assumendo il ruolo di </a:t>
-            </a:r>
-            <a:r>
-              <a:rPr lang="it-IT" sz="1800" b="1" dirty="0"/>
-              <a:t>verifier</a:t>
-            </a:r>
-            <a:endParaRPr lang="it-IT" sz="1800" dirty="0"/>
+            <a:r>
+              <a:rPr lang="it-IT" sz="1600" dirty="0"/>
+              <a:t>Il sito controlla la validità dei dati presentati assumendo il ruolo di </a:t>
+            </a:r>
+            <a:r>
+              <a:rPr lang="it-IT" sz="1600" b="1" dirty="0"/>
+              <a:t>verifier, </a:t>
+            </a:r>
+            <a:r>
+              <a:rPr lang="it-IT" sz="1600" dirty="0"/>
+              <a:t>leggendo i dati dalla blockchain (</a:t>
+            </a:r>
+            <a:r>
+              <a:rPr lang="it-IT" sz="1600" i="1" dirty="0"/>
+              <a:t>verifiable data registry</a:t>
+            </a:r>
+            <a:r>
+              <a:rPr lang="it-IT" sz="1600" dirty="0"/>
+              <a:t>).</a:t>
+            </a:r>
           </a:p>
         </p:txBody>
       </p:sp>
@@ -10412,7 +10429,7 @@
         </p:nvSpPr>
         <p:spPr>
           <a:xfrm>
-            <a:off x="457199" y="1330990"/>
+            <a:off x="484093" y="1330990"/>
             <a:ext cx="8298950" cy="4196020"/>
           </a:xfrm>
           <a:prstGeom prst="rect">
@@ -10490,7 +10507,7 @@
             </a:pPr>
             <a:r>
               <a:rPr lang="it-IT" sz="1800" dirty="0"/>
-              <a:t>Implementazione della libreria che realizza </a:t>
+              <a:t>Implementazione della catena e di </a:t>
             </a:r>
             <a:r>
               <a:rPr lang="it-IT" sz="1800" b="1" dirty="0"/>
@@ -10500,13 +10517,31 @@
               <a:rPr lang="it-IT" sz="1800" dirty="0"/>
               <a:t> usando lo </a:t>
             </a:r>
+          </a:p>
+          <a:p>
+            <a:pPr>
+              <a:lnSpc>
+                <a:spcPct val="150000"/>
+              </a:lnSpc>
+            </a:pPr>
             <a:r>
               <a:rPr lang="it-IT" sz="1800" i="1" dirty="0"/>
-              <a:t>smart contract</a:t>
+              <a:t>    smart contract</a:t>
             </a:r>
             <a:r>
               <a:rPr lang="it-IT" sz="1800" dirty="0"/>
-              <a:t> del laureando magistrale in Informatica presso Ca’ Foscari Alessio De Biasi</a:t>
+              <a:t> dello stagista e laureando magistrale presso Ca’ Foscari</a:t>
+            </a:r>
+          </a:p>
+          <a:p>
+            <a:pPr>
+              <a:lnSpc>
+                <a:spcPct val="150000"/>
+              </a:lnSpc>
+            </a:pPr>
+            <a:r>
+              <a:rPr lang="it-IT" sz="1800" dirty="0"/>
+              <a:t>    Alessio De Biasi</a:t>
             </a:r>
           </a:p>
           <a:p>
@@ -10527,7 +10562,7 @@
             </a:pPr>
             <a:r>
               <a:rPr lang="it-IT" sz="1800" dirty="0"/>
-              <a:t>Meccanismo di verifica dell’età dell’utente in base ai limiti d’età di un certo film basato sulla presentazione di credenziali con </a:t>
+              <a:t>Meccanismo di verifica dell’età dell’utente in base ai limiti d’età del singolo film basato sulla presentazione di credenziali con </a:t>
             </a:r>
             <a:r>
               <a:rPr lang="it-IT" sz="1800" b="1" dirty="0"/>
@@ -10780,7 +10815,7 @@
         <p:spPr>
           <a:xfrm>
             <a:off x="565046" y="3137264"/>
-            <a:ext cx="8411378" cy="3370666"/>
+            <a:ext cx="8411378" cy="3001334"/>
           </a:xfrm>
           <a:prstGeom prst="rect">
             <a:avLst/>
@@ -10810,7 +10845,7 @@
             </a:r>
             <a:r>
               <a:rPr lang="it-IT" sz="1600" dirty="0"/>
-              <a:t> sulla base del </a:t>
+              <a:t> con i dati dell’utente e il </a:t>
             </a:r>
             <a:r>
               <a:rPr lang="it-IT" sz="1600" b="1" dirty="0"/>
@@ -10849,24 +10884,21 @@
             </a:r>
             <a:r>
               <a:rPr lang="it-IT" sz="1600" dirty="0"/>
-              <a:t>firmato digitalmente secondo lo standard </a:t>
+              <a:t>usando come prova di correttezza della credenziale presente lo schema </a:t>
             </a:r>
             <a:r>
               <a:rPr lang="it-IT" sz="1600" i="1" dirty="0"/>
-              <a:t>CLSignature2019 </a:t>
+              <a:t>CLSignature2019, </a:t>
             </a:r>
             <a:r>
               <a:rPr lang="it-IT" sz="1600" dirty="0"/>
-              <a:t>usato per realizzare </a:t>
+              <a:t>utile per </a:t>
             </a:r>
             <a:r>
               <a:rPr lang="it-IT" sz="1600" b="1" dirty="0"/>
               <a:t>Zero Knowledge Proof</a:t>
             </a:r>
-            <a:r>
-              <a:rPr lang="it-IT" sz="1600" dirty="0"/>
-              <a:t> e per generare le prove di correttezza della credenziale presentata</a:t>
-            </a:r>
+            <a:endParaRPr lang="it-IT" sz="1600" dirty="0"/>
           </a:p>
           <a:p>
             <a:pPr marL="342900" indent="-342900">
@@ -11093,13 +11125,36 @@
         </p:blipFill>
         <p:spPr bwMode="auto">
           <a:xfrm>
-            <a:off x="465869" y="2177201"/>
+            <a:off x="444353" y="2177201"/>
             <a:ext cx="2407185" cy="1251562"/>
           </a:xfrm>
-          <a:prstGeom prst="rect">
-            <a:avLst/>
-          </a:prstGeom>
-          <a:noFill/>
+          <a:prstGeom prst="roundRect">
+            <a:avLst>
+              <a:gd name="adj" fmla="val 16667"/>
+            </a:avLst>
+          </a:prstGeom>
+          <a:ln>
+            <a:noFill/>
+          </a:ln>
+          <a:effectLst>
+            <a:outerShdw blurRad="76200" dist="38100" dir="7800000" algn="tl" rotWithShape="0">
+              <a:srgbClr val="000000">
+                <a:alpha val="40000"/>
+              </a:srgbClr>
+            </a:outerShdw>
+          </a:effectLst>
+          <a:scene3d>
+            <a:camera prst="orthographicFront"/>
+            <a:lightRig rig="contrasting" dir="t">
+              <a:rot lat="0" lon="0" rev="4200000"/>
+            </a:lightRig>
+          </a:scene3d>
+          <a:sp3d prstMaterial="plastic">
+            <a:bevelT w="381000" h="114300" prst="relaxedInset"/>
+            <a:contourClr>
+              <a:srgbClr val="969696"/>
+            </a:contourClr>
+          </a:sp3d>
           <a:extLst>
             <a:ext uri="{909E8E84-426E-40DD-AFC4-6F175D3DCCD1}">
               <a14:hiddenFill xmlns:a14="http://schemas.microsoft.com/office/drawing/2010/main">
@@ -11143,10 +11198,33 @@
             <a:off x="3428021" y="2125472"/>
             <a:ext cx="1280155" cy="1280155"/>
           </a:xfrm>
-          <a:prstGeom prst="rect">
-            <a:avLst/>
-          </a:prstGeom>
-          <a:noFill/>
+          <a:prstGeom prst="roundRect">
+            <a:avLst>
+              <a:gd name="adj" fmla="val 16667"/>
+            </a:avLst>
+          </a:prstGeom>
+          <a:ln>
+            <a:noFill/>
+          </a:ln>
+          <a:effectLst>
+            <a:outerShdw blurRad="76200" dist="38100" dir="7800000" algn="tl" rotWithShape="0">
+              <a:srgbClr val="000000">
+                <a:alpha val="40000"/>
+              </a:srgbClr>
+            </a:outerShdw>
+          </a:effectLst>
+          <a:scene3d>
+            <a:camera prst="orthographicFront"/>
+            <a:lightRig rig="contrasting" dir="t">
+              <a:rot lat="0" lon="0" rev="4200000"/>
+            </a:lightRig>
+          </a:scene3d>
+          <a:sp3d prstMaterial="plastic">
+            <a:bevelT w="381000" h="114300" prst="relaxedInset"/>
+            <a:contourClr>
+              <a:srgbClr val="969696"/>
+            </a:contourClr>
+          </a:sp3d>
           <a:extLst>
             <a:ext uri="{909E8E84-426E-40DD-AFC4-6F175D3DCCD1}">
               <a14:hiddenFill xmlns:a14="http://schemas.microsoft.com/office/drawing/2010/main">
@@ -11183,9 +11261,33 @@
             <a:off x="5483702" y="1959420"/>
             <a:ext cx="1382154" cy="1582882"/>
           </a:xfrm>
-          <a:prstGeom prst="rect">
-            <a:avLst/>
-          </a:prstGeom>
+          <a:prstGeom prst="roundRect">
+            <a:avLst>
+              <a:gd name="adj" fmla="val 16667"/>
+            </a:avLst>
+          </a:prstGeom>
+          <a:ln>
+            <a:noFill/>
+          </a:ln>
+          <a:effectLst>
+            <a:outerShdw blurRad="76200" dist="38100" dir="7800000" algn="tl" rotWithShape="0">
+              <a:srgbClr val="000000">
+                <a:alpha val="40000"/>
+              </a:srgbClr>
+            </a:outerShdw>
+          </a:effectLst>
+          <a:scene3d>
+            <a:camera prst="orthographicFront"/>
+            <a:lightRig rig="contrasting" dir="t">
+              <a:rot lat="0" lon="0" rev="4200000"/>
+            </a:lightRig>
+          </a:scene3d>
+          <a:sp3d prstMaterial="plastic">
+            <a:bevelT w="381000" h="114300" prst="relaxedInset"/>
+            <a:contourClr>
+              <a:srgbClr val="969696"/>
+            </a:contourClr>
+          </a:sp3d>
         </p:spPr>
       </p:pic>
       <p:sp>
@@ -11259,10 +11361,33 @@
             <a:off x="656565" y="4541776"/>
             <a:ext cx="2407185" cy="1517443"/>
           </a:xfrm>
-          <a:prstGeom prst="rect">
-            <a:avLst/>
-          </a:prstGeom>
-          <a:noFill/>
+          <a:prstGeom prst="roundRect">
+            <a:avLst>
+              <a:gd name="adj" fmla="val 16667"/>
+            </a:avLst>
+          </a:prstGeom>
+          <a:ln>
+            <a:noFill/>
+          </a:ln>
+          <a:effectLst>
+            <a:outerShdw blurRad="76200" dist="38100" dir="7800000" algn="tl" rotWithShape="0">
+              <a:srgbClr val="000000">
+                <a:alpha val="40000"/>
+              </a:srgbClr>
+            </a:outerShdw>
+          </a:effectLst>
+          <a:scene3d>
+            <a:camera prst="orthographicFront"/>
+            <a:lightRig rig="contrasting" dir="t">
+              <a:rot lat="0" lon="0" rev="4200000"/>
+            </a:lightRig>
+          </a:scene3d>
+          <a:sp3d prstMaterial="plastic">
+            <a:bevelT w="381000" h="114300" prst="relaxedInset"/>
+            <a:contourClr>
+              <a:srgbClr val="969696"/>
+            </a:contourClr>
+          </a:sp3d>
           <a:extLst>
             <a:ext uri="{909E8E84-426E-40DD-AFC4-6F175D3DCCD1}">
               <a14:hiddenFill xmlns:a14="http://schemas.microsoft.com/office/drawing/2010/main">
@@ -11306,10 +11431,33 @@
             <a:off x="3380643" y="4536533"/>
             <a:ext cx="2655065" cy="1207253"/>
           </a:xfrm>
-          <a:prstGeom prst="rect">
-            <a:avLst/>
-          </a:prstGeom>
-          <a:noFill/>
+          <a:prstGeom prst="roundRect">
+            <a:avLst>
+              <a:gd name="adj" fmla="val 16667"/>
+            </a:avLst>
+          </a:prstGeom>
+          <a:ln>
+            <a:noFill/>
+          </a:ln>
+          <a:effectLst>
+            <a:outerShdw blurRad="76200" dist="38100" dir="7800000" algn="tl" rotWithShape="0">
+              <a:srgbClr val="000000">
+                <a:alpha val="40000"/>
+              </a:srgbClr>
+            </a:outerShdw>
+          </a:effectLst>
+          <a:scene3d>
+            <a:camera prst="orthographicFront"/>
+            <a:lightRig rig="contrasting" dir="t">
+              <a:rot lat="0" lon="0" rev="4200000"/>
+            </a:lightRig>
+          </a:scene3d>
+          <a:sp3d prstMaterial="plastic">
+            <a:bevelT w="381000" h="114300" prst="relaxedInset"/>
+            <a:contourClr>
+              <a:srgbClr val="969696"/>
+            </a:contourClr>
+          </a:sp3d>
           <a:extLst>
             <a:ext uri="{909E8E84-426E-40DD-AFC4-6F175D3DCCD1}">
               <a14:hiddenFill xmlns:a14="http://schemas.microsoft.com/office/drawing/2010/main">
@@ -11353,10 +11501,33 @@
             <a:off x="6772776" y="4278411"/>
             <a:ext cx="1560912" cy="1567880"/>
           </a:xfrm>
-          <a:prstGeom prst="rect">
-            <a:avLst/>
-          </a:prstGeom>
-          <a:noFill/>
+          <a:prstGeom prst="roundRect">
+            <a:avLst>
+              <a:gd name="adj" fmla="val 16667"/>
+            </a:avLst>
+          </a:prstGeom>
+          <a:ln>
+            <a:noFill/>
+          </a:ln>
+          <a:effectLst>
+            <a:outerShdw blurRad="76200" dist="38100" dir="7800000" algn="tl" rotWithShape="0">
+              <a:srgbClr val="000000">
+                <a:alpha val="40000"/>
+              </a:srgbClr>
+            </a:outerShdw>
+          </a:effectLst>
+          <a:scene3d>
+            <a:camera prst="orthographicFront"/>
+            <a:lightRig rig="contrasting" dir="t">
+              <a:rot lat="0" lon="0" rev="4200000"/>
+            </a:lightRig>
+          </a:scene3d>
+          <a:sp3d prstMaterial="plastic">
+            <a:bevelT w="381000" h="114300" prst="relaxedInset"/>
+            <a:contourClr>
+              <a:srgbClr val="969696"/>
+            </a:contourClr>
+          </a:sp3d>
           <a:extLst>
             <a:ext uri="{909E8E84-426E-40DD-AFC4-6F175D3DCCD1}">
               <a14:hiddenFill xmlns:a14="http://schemas.microsoft.com/office/drawing/2010/main">
@@ -11463,9 +11634,33 @@
             <a:off x="7608329" y="1959420"/>
             <a:ext cx="1234899" cy="1590070"/>
           </a:xfrm>
-          <a:prstGeom prst="rect">
-            <a:avLst/>
-          </a:prstGeom>
+          <a:prstGeom prst="roundRect">
+            <a:avLst>
+              <a:gd name="adj" fmla="val 16667"/>
+            </a:avLst>
+          </a:prstGeom>
+          <a:ln>
+            <a:noFill/>
+          </a:ln>
+          <a:effectLst>
+            <a:outerShdw blurRad="76200" dist="38100" dir="7800000" algn="tl" rotWithShape="0">
+              <a:srgbClr val="000000">
+                <a:alpha val="40000"/>
+              </a:srgbClr>
+            </a:outerShdw>
+          </a:effectLst>
+          <a:scene3d>
+            <a:camera prst="orthographicFront"/>
+            <a:lightRig rig="contrasting" dir="t">
+              <a:rot lat="0" lon="0" rev="4200000"/>
+            </a:lightRig>
+          </a:scene3d>
+          <a:sp3d prstMaterial="plastic">
+            <a:bevelT w="381000" h="114300" prst="relaxedInset"/>
+            <a:contourClr>
+              <a:srgbClr val="969696"/>
+            </a:contourClr>
+          </a:sp3d>
         </p:spPr>
       </p:pic>
     </p:spTree>
@@ -12496,7 +12691,7 @@
         <p:spPr>
           <a:xfrm>
             <a:off x="457199" y="2947742"/>
-            <a:ext cx="8411378" cy="2949525"/>
+            <a:ext cx="8411378" cy="3365024"/>
           </a:xfrm>
           <a:prstGeom prst="rect">
             <a:avLst/>
@@ -12518,7 +12713,7 @@
             </a:pPr>
             <a:r>
               <a:rPr lang="it-IT" sz="1800" dirty="0"/>
-              <a:t>Struttura dati basata su un consenso distribuito tra i partecipanti</a:t>
+              <a:t>Struttura dati basata su un consenso distribuito tra i partecipanti secondo protocolli definiti a priori</a:t>
             </a:r>
           </a:p>
           <a:p>
@@ -12823,7 +13018,7 @@
             </a:pPr>
             <a:r>
               <a:rPr lang="it-IT" sz="1800" dirty="0"/>
-              <a:t>Uso delle tecnologie blockchain in un caso d’uso reale</a:t>
+              <a:t>Applicazione della tecnologia blockchain ad un caso d’uso reale</a:t>
             </a:r>
           </a:p>
           <a:p>
@@ -12846,7 +13041,7 @@
             </a:pPr>
             <a:r>
               <a:rPr lang="it-IT" sz="1800" dirty="0"/>
-              <a:t>Studio di standard di identità digitale e valutazione delle loro potenziali applicazioni all'interno di una maschera web</a:t>
+              <a:t>Studio di standard di identità digitale connessi e loro applicazione all’interno di una maschera web</a:t>
             </a:r>
           </a:p>
           <a:p>
@@ -12869,7 +13064,7 @@
             </a:pPr>
             <a:r>
               <a:rPr lang="it-IT" sz="1800" dirty="0"/>
-              <a:t>Creazione di un sistema di riconoscimento basato su metodi sicuri, che garantisce la privacy senza divulgazione di informazioni personali</a:t>
+              <a:t>Creazione di un sistema di riconoscimento basato su metodi sicuri, attento alla privacy e senza divulgazione di informazioni personali</a:t>
             </a:r>
           </a:p>
         </p:txBody>
@@ -13180,7 +13375,7 @@
         </p:nvSpPr>
         <p:spPr>
           <a:xfrm>
-            <a:off x="457198" y="1330990"/>
+            <a:off x="457198" y="1374020"/>
             <a:ext cx="6516477" cy="4196020"/>
           </a:xfrm>
           <a:prstGeom prst="rect">
@@ -13203,7 +13398,7 @@
             </a:pPr>
             <a:r>
               <a:rPr lang="it-IT" sz="1800" dirty="0"/>
-              <a:t>Realizzazione di un sito di un cinema con film soggetti a limite d’età</a:t>
+              <a:t>Realizzazione di un sito di un cinema applicando questo sistema per film soggetti a limite d’età</a:t>
             </a:r>
           </a:p>
           <a:p>
@@ -13226,7 +13421,7 @@
             </a:pPr>
             <a:r>
               <a:rPr lang="it-IT" sz="1800" dirty="0"/>
-              <a:t>Verifica dell’identità e prenotazione di un film con un meccanismo basato sullo studio di </a:t>
+              <a:t>Verifica dell’identità utente con un meccanismo basato su </a:t>
             </a:r>
             <a:r>
               <a:rPr lang="it-IT" sz="1800" b="1" dirty="0"/>
@@ -13262,15 +13457,61 @@
             </a:pPr>
             <a:r>
               <a:rPr lang="it-IT" sz="1800" dirty="0"/>
-              <a:t>Creazione di un meccanismo di riconoscimento senza divulgazione di dati personali basato su blockchain </a:t>
+              <a:t>Utilizzo dell’ambiente blockchain </a:t>
             </a:r>
             <a:r>
               <a:rPr lang="it-IT" sz="1800" i="1" dirty="0"/>
               <a:t>Ethereum </a:t>
             </a:r>
+          </a:p>
+          <a:p>
+            <a:pPr marL="285750" indent="-285750">
+              <a:lnSpc>
+                <a:spcPct val="150000"/>
+              </a:lnSpc>
+              <a:buFont typeface="Arial" panose="020B0604020202020204" pitchFamily="34" charset="0"/>
+              <a:buChar char="•"/>
+            </a:pPr>
+            <a:endParaRPr lang="it-IT" sz="1800" i="1" dirty="0"/>
+          </a:p>
+          <a:p>
+            <a:pPr marL="285750" indent="-285750">
+              <a:lnSpc>
+                <a:spcPct val="150000"/>
+              </a:lnSpc>
+              <a:buFont typeface="Arial" panose="020B0604020202020204" pitchFamily="34" charset="0"/>
+              <a:buChar char="•"/>
+            </a:pPr>
             <a:r>
               <a:rPr lang="it-IT" sz="1800" dirty="0"/>
-              <a:t>e sugli standard di identità digitale connessi</a:t>
+              <a:t>Creazione di un </a:t>
+            </a:r>
+            <a:r>
+              <a:rPr lang="it-IT" sz="1800" i="1" dirty="0"/>
+              <a:t>Proof of Concept</a:t>
+            </a:r>
+            <a:r>
+              <a:rPr lang="it-IT" sz="1800" dirty="0"/>
+              <a:t> basato sulle librerie</a:t>
+            </a:r>
+          </a:p>
+          <a:p>
+            <a:pPr>
+              <a:lnSpc>
+                <a:spcPct val="150000"/>
+              </a:lnSpc>
+            </a:pPr>
+            <a:r>
+              <a:rPr lang="it-IT" sz="1800" b="1" dirty="0"/>
+              <a:t>     web3.js </a:t>
+            </a:r>
+            <a:r>
+              <a:rPr lang="it-IT" sz="1800" dirty="0"/>
+              <a:t>oppure </a:t>
+            </a:r>
+            <a:r>
+              <a:rPr lang="it-IT" sz="1800" b="1" dirty="0"/>
+              <a:t>ethers.js</a:t>
             </a:r>
           </a:p>
         </p:txBody>
@@ -13626,7 +13867,23 @@
             </a:pPr>
             <a:r>
               <a:rPr lang="it-IT" sz="1800" dirty="0"/>
-              <a:t>Identificatori univoci composti da una stringa alfanumerica associati ad un’entità verificabile secondo le regole dello standard W3C omonimo</a:t>
+              <a:t>Identificatori alfanumerici permanenti come degli URL, associati ad un’entità verificabile (</a:t>
+            </a:r>
+            <a:r>
+              <a:rPr lang="it-IT" sz="1800" i="1" dirty="0"/>
+              <a:t>risolvibili</a:t>
+            </a:r>
+            <a:r>
+              <a:rPr lang="it-IT" sz="1800" dirty="0"/>
+              <a:t>), gestiti dall’utente (</a:t>
+            </a:r>
+            <a:r>
+              <a:rPr lang="it-IT" sz="1800" i="1" dirty="0"/>
+              <a:t>controller</a:t>
+            </a:r>
+            <a:r>
+              <a:rPr lang="it-IT" sz="1800" dirty="0"/>
+              <a:t>) e senza controllo centrale</a:t>
             </a:r>
           </a:p>
           <a:p>
@@ -13649,7 +13906,15 @@
             </a:pPr>
             <a:r>
               <a:rPr lang="it-IT" sz="1800" dirty="0"/>
-              <a:t>Ad essi è associato un documento che descrive il soggetto associato e i metodi di autenticazione utilizzati in modo sicuro, chiamato </a:t>
+              <a:t>Ad essi è associato un documento che descrive il soggetto associato e i metodi di autenticazione sicuri (</a:t>
+            </a:r>
+            <a:r>
+              <a:rPr lang="it-IT" sz="1800" i="1" dirty="0"/>
+              <a:t>DID </a:t>
+            </a:r>
+            <a:r>
+              <a:rPr lang="it-IT" sz="1800" dirty="0"/>
+              <a:t>Method), chiamato </a:t>
             </a:r>
             <a:r>
               <a:rPr lang="it-IT" sz="1800" i="1" dirty="0"/>
@@ -13892,8 +14157,8 @@
         </p:nvSpPr>
         <p:spPr>
           <a:xfrm>
-            <a:off x="457199" y="3446807"/>
-            <a:ext cx="8411378" cy="2949525"/>
+            <a:off x="457198" y="3814127"/>
+            <a:ext cx="8411378" cy="2262671"/>
           </a:xfrm>
           <a:prstGeom prst="rect">
             <a:avLst/>
@@ -13914,16 +14179,16 @@
               <a:buChar char="•"/>
             </a:pPr>
             <a:r>
-              <a:rPr lang="it-IT" sz="1800" dirty="0"/>
-              <a:t>Standard W3C omonimo e aperto all’uso di credenziali digitali firmate digitalmente e verificabili pubblicamente usando il </a:t>
-            </a:r>
-            <a:r>
-              <a:rPr lang="it-IT" sz="1800" b="1" dirty="0"/>
+              <a:rPr lang="it-IT" sz="1600" dirty="0"/>
+              <a:t>Credenziali rilasciate da un’entità fidata firmate con la sua chiave pubblica, la chiave privata dell’utente e contenente il </a:t>
+            </a:r>
+            <a:r>
+              <a:rPr lang="it-IT" sz="1600" b="1" dirty="0"/>
               <a:t>Decentralized Identifier </a:t>
             </a:r>
             <a:r>
-              <a:rPr lang="it-IT" sz="1800" dirty="0"/>
-              <a:t>dell’utente</a:t>
+              <a:rPr lang="it-IT" sz="1600" dirty="0"/>
+              <a:t>come prova certa di identità</a:t>
             </a:r>
           </a:p>
           <a:p>
@@ -13934,7 +14199,7 @@
               <a:buFont typeface="Arial" panose="020B0604020202020204" pitchFamily="34" charset="0"/>
               <a:buChar char="•"/>
             </a:pPr>
-            <a:endParaRPr lang="it-IT" sz="1800" dirty="0"/>
+            <a:endParaRPr lang="it-IT" sz="1600" dirty="0"/>
           </a:p>
           <a:p>
             <a:pPr marL="285750" indent="-285750">
@@ -13945,38 +14210,38 @@
               <a:buChar char="•"/>
             </a:pPr>
             <a:r>
-              <a:rPr lang="it-IT" sz="1800" dirty="0"/>
+              <a:rPr lang="it-IT" sz="1600" dirty="0"/>
               <a:t>Create in formato JSON, contengono un’entità che afferma con certezza il rilascio </a:t>
             </a:r>
             <a:r>
-              <a:rPr lang="it-IT" sz="1800" i="1" dirty="0"/>
+              <a:rPr lang="it-IT" sz="1600" i="1" dirty="0"/>
               <a:t>(claim</a:t>
             </a:r>
             <a:r>
-              <a:rPr lang="it-IT" sz="1800" dirty="0"/>
+              <a:rPr lang="it-IT" sz="1600" dirty="0"/>
               <a:t>)</a:t>
             </a:r>
             <a:r>
-              <a:rPr lang="it-IT" sz="1800" i="1" dirty="0"/>
+              <a:rPr lang="it-IT" sz="1600" i="1" dirty="0"/>
               <a:t>,</a:t>
             </a:r>
             <a:r>
-              <a:rPr lang="it-IT" sz="1800" dirty="0"/>
+              <a:rPr lang="it-IT" sz="1600" dirty="0"/>
               <a:t> gli attributi base dell’utente che le presenta (</a:t>
             </a:r>
             <a:r>
-              <a:rPr lang="it-IT" sz="1800" i="1" dirty="0"/>
+              <a:rPr lang="it-IT" sz="1600" i="1" dirty="0"/>
               <a:t>metadata</a:t>
             </a:r>
             <a:r>
-              <a:rPr lang="it-IT" sz="1800" dirty="0"/>
-              <a:t>) e la prova crittografica di autenticità (</a:t>
-            </a:r>
-            <a:r>
-              <a:rPr lang="it-IT" sz="1800" i="1" dirty="0"/>
+              <a:rPr lang="it-IT" sz="1600" dirty="0"/>
+              <a:t>) e la prova crittografica in formato hash di autenticità (</a:t>
+            </a:r>
+            <a:r>
+              <a:rPr lang="it-IT" sz="1600" i="1" dirty="0"/>
               <a:t>proof)</a:t>
             </a:r>
-            <a:endParaRPr lang="it-IT" sz="1800" dirty="0"/>
+            <a:endParaRPr lang="it-IT" sz="1600" dirty="0"/>
           </a:p>
         </p:txBody>
       </p:sp>
@@ -14002,7 +14267,7 @@
         </p:blipFill>
         <p:spPr>
           <a:xfrm>
-            <a:off x="2906892" y="850673"/>
+            <a:off x="2906892" y="898459"/>
             <a:ext cx="3511991" cy="2596133"/>
           </a:xfrm>
           <a:prstGeom prst="rect">
@@ -14632,7 +14897,7 @@
             </a:r>
             <a:r>
               <a:rPr lang="it-IT" sz="1800" dirty="0"/>
-              <a:t> firmato con le proprie chiavi all’interno di credenziali immutabili e uniche in blockchain</a:t>
+              <a:t> firmato con chiave private dell’utente e chiave pubblica di un’entità fidata in blockchain</a:t>
             </a:r>
           </a:p>
         </p:txBody>

</xml_diff>

<commit_message>
Ulteriori modifiche presentazione e discorso
</commit_message>
<xml_diff>
--- a/Presentazione/Presentazione Gabriel Rovesti.pptx
+++ b/Presentazione/Presentazione Gabriel Rovesti.pptx
@@ -6,10 +6,10 @@
     <p:sldMasterId id="2147483665" r:id="rId2"/>
   </p:sldMasterIdLst>
   <p:notesMasterIdLst>
-    <p:notesMasterId r:id="rId19"/>
+    <p:notesMasterId r:id="rId18"/>
   </p:notesMasterIdLst>
   <p:handoutMasterIdLst>
-    <p:handoutMasterId r:id="rId20"/>
+    <p:handoutMasterId r:id="rId19"/>
   </p:handoutMasterIdLst>
   <p:sldIdLst>
     <p:sldId id="256" r:id="rId3"/>
@@ -23,35 +23,34 @@
     <p:sldId id="270" r:id="rId11"/>
     <p:sldId id="275" r:id="rId12"/>
     <p:sldId id="271" r:id="rId13"/>
-    <p:sldId id="279" r:id="rId14"/>
-    <p:sldId id="266" r:id="rId15"/>
-    <p:sldId id="278" r:id="rId16"/>
-    <p:sldId id="272" r:id="rId17"/>
-    <p:sldId id="265" r:id="rId18"/>
+    <p:sldId id="266" r:id="rId14"/>
+    <p:sldId id="278" r:id="rId15"/>
+    <p:sldId id="272" r:id="rId16"/>
+    <p:sldId id="265" r:id="rId17"/>
   </p:sldIdLst>
   <p:sldSz cx="9144000" cy="6858000" type="screen4x3"/>
   <p:notesSz cx="6858000" cy="9144000"/>
   <p:embeddedFontLst>
     <p:embeddedFont>
       <p:font typeface="Calibri" panose="020F0502020204030204" pitchFamily="34" charset="0"/>
-      <p:regular r:id="rId21"/>
-      <p:bold r:id="rId22"/>
-      <p:italic r:id="rId23"/>
-      <p:boldItalic r:id="rId24"/>
+      <p:regular r:id="rId20"/>
+      <p:bold r:id="rId21"/>
+      <p:italic r:id="rId22"/>
+      <p:boldItalic r:id="rId23"/>
     </p:embeddedFont>
     <p:embeddedFont>
       <p:font typeface="Cuprum" panose="020B0604020202020204" charset="0"/>
-      <p:regular r:id="rId25"/>
-      <p:bold r:id="rId26"/>
-      <p:italic r:id="rId27"/>
-      <p:boldItalic r:id="rId28"/>
+      <p:regular r:id="rId24"/>
+      <p:bold r:id="rId25"/>
+      <p:italic r:id="rId26"/>
+      <p:boldItalic r:id="rId27"/>
     </p:embeddedFont>
     <p:embeddedFont>
       <p:font typeface="Source Sans Pro" panose="020B0503030403020204" pitchFamily="34" charset="0"/>
-      <p:regular r:id="rId29"/>
-      <p:bold r:id="rId30"/>
-      <p:italic r:id="rId31"/>
-      <p:boldItalic r:id="rId32"/>
+      <p:regular r:id="rId28"/>
+      <p:bold r:id="rId29"/>
+      <p:italic r:id="rId30"/>
+      <p:boldItalic r:id="rId31"/>
     </p:embeddedFont>
   </p:embeddedFontLst>
   <p:defaultTextStyle>
@@ -358,7 +357,7 @@
           <a:p>
             <a:fld id="{6469F890-3609-4E18-B68A-510CF7125ACB}" type="datetimeFigureOut">
               <a:rPr lang="it-IT" smtClean="0"/>
-              <a:t>08/07/2023</a:t>
+              <a:t>10/07/2023</a:t>
             </a:fld>
             <a:endParaRPr lang="it-IT"/>
           </a:p>
@@ -1178,7 +1177,7 @@
     </p:spTree>
     <p:extLst>
       <p:ext uri="{BB962C8B-B14F-4D97-AF65-F5344CB8AC3E}">
-        <p14:creationId xmlns:p14="http://schemas.microsoft.com/office/powerpoint/2010/main" val="1061103021"/>
+        <p14:creationId xmlns:p14="http://schemas.microsoft.com/office/powerpoint/2010/main" val="2777132999"/>
       </p:ext>
     </p:extLst>
   </p:cSld>
@@ -1287,7 +1286,7 @@
     </p:spTree>
     <p:extLst>
       <p:ext uri="{BB962C8B-B14F-4D97-AF65-F5344CB8AC3E}">
-        <p14:creationId xmlns:p14="http://schemas.microsoft.com/office/powerpoint/2010/main" val="2777132999"/>
+        <p14:creationId xmlns:p14="http://schemas.microsoft.com/office/powerpoint/2010/main" val="744482108"/>
       </p:ext>
     </p:extLst>
   </p:cSld>
@@ -1396,7 +1395,7 @@
     </p:spTree>
     <p:extLst>
       <p:ext uri="{BB962C8B-B14F-4D97-AF65-F5344CB8AC3E}">
-        <p14:creationId xmlns:p14="http://schemas.microsoft.com/office/powerpoint/2010/main" val="744482108"/>
+        <p14:creationId xmlns:p14="http://schemas.microsoft.com/office/powerpoint/2010/main" val="1046887117"/>
       </p:ext>
     </p:extLst>
   </p:cSld>
@@ -1407,115 +1406,6 @@
 </file>
 
 <file path=ppt/notesSlides/notesSlide15.xml><?xml version="1.0" encoding="utf-8"?>
-<p:notes xmlns:a="http://schemas.openxmlformats.org/drawingml/2006/main" xmlns:r="http://schemas.openxmlformats.org/officeDocument/2006/relationships" xmlns:p="http://schemas.openxmlformats.org/presentationml/2006/main" showMasterSp="0" showMasterPhAnim="0">
-  <p:cSld>
-    <p:spTree>
-      <p:nvGrpSpPr>
-        <p:cNvPr id="1" name="Shape 95"/>
-        <p:cNvGrpSpPr/>
-        <p:nvPr/>
-      </p:nvGrpSpPr>
-      <p:grpSpPr>
-        <a:xfrm>
-          <a:off x="0" y="0"/>
-          <a:ext cx="0" cy="0"/>
-          <a:chOff x="0" y="0"/>
-          <a:chExt cx="0" cy="0"/>
-        </a:xfrm>
-      </p:grpSpPr>
-      <p:sp>
-        <p:nvSpPr>
-          <p:cNvPr id="96" name="Shape 96"/>
-          <p:cNvSpPr>
-            <a:spLocks noGrp="1" noRot="1" noChangeAspect="1"/>
-          </p:cNvSpPr>
-          <p:nvPr>
-            <p:ph type="sldImg" idx="2"/>
-          </p:nvPr>
-        </p:nvSpPr>
-        <p:spPr>
-          <a:xfrm>
-            <a:off x="1143000" y="685800"/>
-            <a:ext cx="4572000" cy="3429000"/>
-          </a:xfrm>
-          <a:custGeom>
-            <a:avLst/>
-            <a:gdLst/>
-            <a:ahLst/>
-            <a:cxnLst/>
-            <a:rect l="0" t="0" r="0" b="0"/>
-            <a:pathLst>
-              <a:path w="120000" h="120000" extrusionOk="0">
-                <a:moveTo>
-                  <a:pt x="0" y="0"/>
-                </a:moveTo>
-                <a:lnTo>
-                  <a:pt x="120000" y="0"/>
-                </a:lnTo>
-                <a:lnTo>
-                  <a:pt x="120000" y="120000"/>
-                </a:lnTo>
-                <a:lnTo>
-                  <a:pt x="0" y="120000"/>
-                </a:lnTo>
-                <a:close/>
-              </a:path>
-            </a:pathLst>
-          </a:custGeom>
-        </p:spPr>
-      </p:sp>
-      <p:sp>
-        <p:nvSpPr>
-          <p:cNvPr id="97" name="Shape 97"/>
-          <p:cNvSpPr txBox="1">
-            <a:spLocks noGrp="1"/>
-          </p:cNvSpPr>
-          <p:nvPr>
-            <p:ph type="body" idx="1"/>
-          </p:nvPr>
-        </p:nvSpPr>
-        <p:spPr>
-          <a:xfrm>
-            <a:off x="685800" y="4343400"/>
-            <a:ext cx="5486400" cy="4114800"/>
-          </a:xfrm>
-          <a:prstGeom prst="rect">
-            <a:avLst/>
-          </a:prstGeom>
-        </p:spPr>
-        <p:txBody>
-          <a:bodyPr spcFirstLastPara="1" wrap="square" lIns="91425" tIns="91425" rIns="91425" bIns="91425" anchor="t" anchorCtr="0">
-            <a:noAutofit/>
-          </a:bodyPr>
-          <a:lstStyle/>
-          <a:p>
-            <a:pPr marL="0" lvl="0" indent="0" rtl="0">
-              <a:spcBef>
-                <a:spcPts val="0"/>
-              </a:spcBef>
-              <a:spcAft>
-                <a:spcPts val="0"/>
-              </a:spcAft>
-              <a:buNone/>
-            </a:pPr>
-            <a:endParaRPr dirty="0"/>
-          </a:p>
-        </p:txBody>
-      </p:sp>
-    </p:spTree>
-    <p:extLst>
-      <p:ext uri="{BB962C8B-B14F-4D97-AF65-F5344CB8AC3E}">
-        <p14:creationId xmlns:p14="http://schemas.microsoft.com/office/powerpoint/2010/main" val="1046887117"/>
-      </p:ext>
-    </p:extLst>
-  </p:cSld>
-  <p:clrMapOvr>
-    <a:masterClrMapping/>
-  </p:clrMapOvr>
-</p:notes>
-</file>
-
-<file path=ppt/notesSlides/notesSlide16.xml><?xml version="1.0" encoding="utf-8"?>
 <p:notes xmlns:a="http://schemas.openxmlformats.org/drawingml/2006/main" xmlns:r="http://schemas.openxmlformats.org/officeDocument/2006/relationships" xmlns:p="http://schemas.openxmlformats.org/presentationml/2006/main" showMasterSp="0" showMasterPhAnim="0">
   <p:cSld>
     <p:spTree>
@@ -9369,7 +9259,7 @@
                   <a:schemeClr val="bg1"/>
                 </a:solidFill>
               </a:rPr>
-              <a:t>10 / 16</a:t>
+              <a:t>10 / 15</a:t>
             </a:r>
           </a:p>
         </p:txBody>
@@ -9749,7 +9639,7 @@
                   <a:schemeClr val="bg1"/>
                 </a:solidFill>
               </a:rPr>
-              <a:t>11 / 16</a:t>
+              <a:t>11 / 15</a:t>
             </a:r>
           </a:p>
         </p:txBody>
@@ -9861,7 +9751,7 @@
             </a:r>
             <a:r>
               <a:rPr lang="it-IT" sz="1800" dirty="0"/>
-              <a:t> comune (la catena di fiducia), dimostrando che tutte le credenziali sono state firmate da entità fidate e provando la correttezza di ognuna </a:t>
+              <a:t> comune (la catena di fiducia), dimostrando che la credenziale è stata firmata da entità fidate e provando la correttezza di tutti i dati presenti</a:t>
             </a:r>
           </a:p>
         </p:txBody>
@@ -9956,7 +9846,7 @@
         <p:spPr>
           <a:xfrm>
             <a:off x="457199" y="-182567"/>
-            <a:ext cx="5792993" cy="1143300"/>
+            <a:ext cx="6053769" cy="1143300"/>
           </a:xfrm>
           <a:prstGeom prst="rect">
             <a:avLst/>
@@ -9983,7 +9873,7 @@
                   <a:srgbClr val="FFFFFF"/>
                 </a:solidFill>
               </a:rPr>
-              <a:t>Il progetto realizzato</a:t>
+              <a:t>Le caratteristiche del progetto</a:t>
             </a:r>
             <a:endParaRPr sz="3000" dirty="0">
               <a:solidFill>
@@ -10067,7 +9957,7 @@
                   <a:schemeClr val="bg1"/>
                 </a:solidFill>
               </a:rPr>
-              <a:t>12 / 16</a:t>
+              <a:t>12 / 15</a:t>
             </a:r>
           </a:p>
         </p:txBody>
@@ -10111,12 +10001,169 @@
           </a:p>
         </p:txBody>
       </p:sp>
+      <p:sp>
+        <p:nvSpPr>
+          <p:cNvPr id="12" name="CasellaDiTesto 11">
+            <a:extLst>
+              <a:ext uri="{FF2B5EF4-FFF2-40B4-BE49-F238E27FC236}">
+                <a16:creationId xmlns:a16="http://schemas.microsoft.com/office/drawing/2014/main" id="{C5DF3E3C-D423-9AA2-3150-1F49E451CE59}"/>
+              </a:ext>
+            </a:extLst>
+          </p:cNvPr>
+          <p:cNvSpPr txBox="1"/>
+          <p:nvPr/>
+        </p:nvSpPr>
+        <p:spPr>
+          <a:xfrm>
+            <a:off x="349949" y="2556996"/>
+            <a:ext cx="8444101" cy="3739998"/>
+          </a:xfrm>
+          <a:prstGeom prst="rect">
+            <a:avLst/>
+          </a:prstGeom>
+          <a:noFill/>
+        </p:spPr>
+        <p:txBody>
+          <a:bodyPr wrap="square" rtlCol="0">
+            <a:spAutoFit/>
+          </a:bodyPr>
+          <a:lstStyle/>
+          <a:p>
+            <a:pPr marL="285750" indent="-285750">
+              <a:lnSpc>
+                <a:spcPct val="150000"/>
+              </a:lnSpc>
+              <a:buFont typeface="Arial" panose="020B0604020202020204" pitchFamily="34" charset="0"/>
+              <a:buChar char="•"/>
+            </a:pPr>
+            <a:r>
+              <a:rPr lang="it-IT" sz="1600" dirty="0"/>
+              <a:t>Registrazione e login basate su un meccanismo </a:t>
+            </a:r>
+          </a:p>
+          <a:p>
+            <a:pPr>
+              <a:lnSpc>
+                <a:spcPct val="150000"/>
+              </a:lnSpc>
+            </a:pPr>
+            <a:r>
+              <a:rPr lang="it-IT" sz="1600" i="1" dirty="0"/>
+              <a:t>     challenge-response </a:t>
+            </a:r>
+            <a:r>
+              <a:rPr lang="it-IT" sz="1600" dirty="0"/>
+              <a:t>per associare all’utente un </a:t>
+            </a:r>
+            <a:r>
+              <a:rPr lang="it-IT" sz="1600" b="1" dirty="0"/>
+              <a:t>Decentralized Identifier</a:t>
+            </a:r>
+            <a:r>
+              <a:rPr lang="it-IT" sz="1600" dirty="0"/>
+              <a:t> </a:t>
+            </a:r>
+          </a:p>
+          <a:p>
+            <a:pPr>
+              <a:lnSpc>
+                <a:spcPct val="150000"/>
+              </a:lnSpc>
+            </a:pPr>
+            <a:r>
+              <a:rPr lang="it-IT" sz="1600" dirty="0"/>
+              <a:t>     firmato con la propria chiave privata</a:t>
+            </a:r>
+          </a:p>
+          <a:p>
+            <a:pPr>
+              <a:lnSpc>
+                <a:spcPct val="150000"/>
+              </a:lnSpc>
+            </a:pPr>
+            <a:endParaRPr lang="it-IT" sz="1600" i="1" dirty="0"/>
+          </a:p>
+          <a:p>
+            <a:pPr marL="285750" indent="-285750">
+              <a:lnSpc>
+                <a:spcPct val="150000"/>
+              </a:lnSpc>
+              <a:buFont typeface="Arial" panose="020B0604020202020204" pitchFamily="34" charset="0"/>
+              <a:buChar char="•"/>
+            </a:pPr>
+            <a:r>
+              <a:rPr lang="it-IT" sz="1600" dirty="0"/>
+              <a:t>Implementazione della catena e di </a:t>
+            </a:r>
+            <a:r>
+              <a:rPr lang="it-IT" sz="1600" b="1" dirty="0"/>
+              <a:t>Self Sovereign Identity</a:t>
+            </a:r>
+            <a:r>
+              <a:rPr lang="it-IT" sz="1600" dirty="0"/>
+              <a:t> usando lo </a:t>
+            </a:r>
+          </a:p>
+          <a:p>
+            <a:pPr>
+              <a:lnSpc>
+                <a:spcPct val="150000"/>
+              </a:lnSpc>
+            </a:pPr>
+            <a:r>
+              <a:rPr lang="it-IT" sz="1600" i="1" dirty="0"/>
+              <a:t>     smart contract</a:t>
+            </a:r>
+            <a:r>
+              <a:rPr lang="it-IT" sz="1600" dirty="0"/>
+              <a:t> dello stagista e laureando magistrale presso Ca’ Foscari</a:t>
+            </a:r>
+          </a:p>
+          <a:p>
+            <a:pPr>
+              <a:lnSpc>
+                <a:spcPct val="150000"/>
+              </a:lnSpc>
+            </a:pPr>
+            <a:r>
+              <a:rPr lang="it-IT" sz="1600" dirty="0"/>
+              <a:t>     Alessio De Biasi</a:t>
+            </a:r>
+          </a:p>
+          <a:p>
+            <a:pPr>
+              <a:lnSpc>
+                <a:spcPct val="150000"/>
+              </a:lnSpc>
+            </a:pPr>
+            <a:endParaRPr lang="it-IT" sz="1600" i="1" dirty="0"/>
+          </a:p>
+          <a:p>
+            <a:pPr marL="285750" indent="-285750">
+              <a:lnSpc>
+                <a:spcPct val="150000"/>
+              </a:lnSpc>
+              <a:buFont typeface="Arial" panose="020B0604020202020204" pitchFamily="34" charset="0"/>
+              <a:buChar char="•"/>
+            </a:pPr>
+            <a:r>
+              <a:rPr lang="it-IT" sz="1600" dirty="0"/>
+              <a:t>Meccanismo di verifica dell’età dell’utente in base ai limiti d’età del singolo film basato sulla presentazione di credenziali con </a:t>
+            </a:r>
+            <a:r>
+              <a:rPr lang="it-IT" sz="1600" b="1" dirty="0"/>
+              <a:t>Zero Knowledge Proof</a:t>
+            </a:r>
+            <a:endParaRPr lang="it-IT" sz="1600" dirty="0"/>
+          </a:p>
+        </p:txBody>
+      </p:sp>
       <p:pic>
         <p:nvPicPr>
-          <p:cNvPr id="10" name="Immagine 9">
+          <p:cNvPr id="3" name="Immagine 2" descr="Immagine che contiene testo, Carattere, logo, schermata&#10;&#10;Descrizione generata automaticamente">
             <a:extLst>
               <a:ext uri="{FF2B5EF4-FFF2-40B4-BE49-F238E27FC236}">
-                <a16:creationId xmlns:a16="http://schemas.microsoft.com/office/drawing/2014/main" id="{E0401EF2-BEDC-6D71-955C-3C206AA9AE44}"/>
+                <a16:creationId xmlns:a16="http://schemas.microsoft.com/office/drawing/2014/main" id="{5D45E86E-072D-87D3-D6AA-4D89B2303C13}"/>
               </a:ext>
             </a:extLst>
           </p:cNvPr>
@@ -10133,68 +10180,8 @@
         </p:blipFill>
         <p:spPr>
           <a:xfrm>
-            <a:off x="3874385" y="3716223"/>
-            <a:ext cx="5022015" cy="2392887"/>
-          </a:xfrm>
-          <a:prstGeom prst="rect">
-            <a:avLst/>
-          </a:prstGeom>
-        </p:spPr>
-      </p:pic>
-      <p:pic>
-        <p:nvPicPr>
-          <p:cNvPr id="14" name="Immagine 13">
-            <a:extLst>
-              <a:ext uri="{FF2B5EF4-FFF2-40B4-BE49-F238E27FC236}">
-                <a16:creationId xmlns:a16="http://schemas.microsoft.com/office/drawing/2014/main" id="{7D6EE93F-983E-2621-1499-EB1F2990B436}"/>
-              </a:ext>
-            </a:extLst>
-          </p:cNvPr>
-          <p:cNvPicPr>
-            <a:picLocks noChangeAspect="1"/>
-          </p:cNvPicPr>
-          <p:nvPr/>
-        </p:nvPicPr>
-        <p:blipFill>
-          <a:blip r:embed="rId4"/>
-          <a:stretch>
-            <a:fillRect/>
-          </a:stretch>
-        </p:blipFill>
-        <p:spPr>
-          <a:xfrm>
-            <a:off x="3874385" y="990388"/>
-            <a:ext cx="5037257" cy="2438611"/>
-          </a:xfrm>
-          <a:prstGeom prst="rect">
-            <a:avLst/>
-          </a:prstGeom>
-        </p:spPr>
-      </p:pic>
-      <p:pic>
-        <p:nvPicPr>
-          <p:cNvPr id="16" name="Immagine 15" descr="Immagine che contiene testo, Carattere, logo, schermata&#10;&#10;Descrizione generata automaticamente">
-            <a:extLst>
-              <a:ext uri="{FF2B5EF4-FFF2-40B4-BE49-F238E27FC236}">
-                <a16:creationId xmlns:a16="http://schemas.microsoft.com/office/drawing/2014/main" id="{6089DA83-68E0-2F46-77DD-DADD1D4E4BB3}"/>
-              </a:ext>
-            </a:extLst>
-          </p:cNvPr>
-          <p:cNvPicPr>
-            <a:picLocks noChangeAspect="1"/>
-          </p:cNvPicPr>
-          <p:nvPr/>
-        </p:nvPicPr>
-        <p:blipFill>
-          <a:blip r:embed="rId5"/>
-          <a:stretch>
-            <a:fillRect/>
-          </a:stretch>
-        </p:blipFill>
-        <p:spPr>
-          <a:xfrm>
-            <a:off x="335735" y="2474678"/>
-            <a:ext cx="3167629" cy="1908642"/>
+            <a:off x="3398195" y="960733"/>
+            <a:ext cx="2347607" cy="1414541"/>
           </a:xfrm>
           <a:prstGeom prst="round2DiagRect">
             <a:avLst>
@@ -10220,7 +10207,7 @@
     </p:spTree>
     <p:extLst>
       <p:ext uri="{BB962C8B-B14F-4D97-AF65-F5344CB8AC3E}">
-        <p14:creationId xmlns:p14="http://schemas.microsoft.com/office/powerpoint/2010/main" val="1828649479"/>
+        <p14:creationId xmlns:p14="http://schemas.microsoft.com/office/powerpoint/2010/main" val="1213906835"/>
       </p:ext>
     </p:extLst>
   </p:cSld>
@@ -10259,8 +10246,8 @@
         </p:nvSpPr>
         <p:spPr>
           <a:xfrm>
-            <a:off x="457199" y="-182567"/>
-            <a:ext cx="6053769" cy="1143300"/>
+            <a:off x="457200" y="-182567"/>
+            <a:ext cx="5213100" cy="1143300"/>
           </a:xfrm>
           <a:prstGeom prst="rect">
             <a:avLst/>
@@ -10287,7 +10274,7 @@
                   <a:srgbClr val="FFFFFF"/>
                 </a:solidFill>
               </a:rPr>
-              <a:t>Le caratteristiche del progetto</a:t>
+              <a:t>Verifica dell’età</a:t>
             </a:r>
             <a:endParaRPr sz="3000" dirty="0">
               <a:solidFill>
@@ -10371,7 +10358,7 @@
                   <a:schemeClr val="bg1"/>
                 </a:solidFill>
               </a:rPr>
-              <a:t>13 / 16</a:t>
+              <a:t>13 / 15</a:t>
             </a:r>
           </a:p>
         </p:txBody>
@@ -10415,12 +10402,42 @@
           </a:p>
         </p:txBody>
       </p:sp>
-      <p:sp>
-        <p:nvSpPr>
-          <p:cNvPr id="12" name="CasellaDiTesto 11">
+      <p:pic>
+        <p:nvPicPr>
+          <p:cNvPr id="4" name="Immagine 3">
             <a:extLst>
               <a:ext uri="{FF2B5EF4-FFF2-40B4-BE49-F238E27FC236}">
-                <a16:creationId xmlns:a16="http://schemas.microsoft.com/office/drawing/2014/main" id="{C5DF3E3C-D423-9AA2-3150-1F49E451CE59}"/>
+                <a16:creationId xmlns:a16="http://schemas.microsoft.com/office/drawing/2014/main" id="{EA217CC8-78DB-5953-DFB9-5FE3913A339D}"/>
+              </a:ext>
+            </a:extLst>
+          </p:cNvPr>
+          <p:cNvPicPr>
+            <a:picLocks noChangeAspect="1"/>
+          </p:cNvPicPr>
+          <p:nvPr/>
+        </p:nvPicPr>
+        <p:blipFill>
+          <a:blip r:embed="rId3"/>
+          <a:stretch>
+            <a:fillRect/>
+          </a:stretch>
+        </p:blipFill>
+        <p:spPr>
+          <a:xfrm>
+            <a:off x="2099095" y="1056823"/>
+            <a:ext cx="4945809" cy="2080440"/>
+          </a:xfrm>
+          <a:prstGeom prst="rect">
+            <a:avLst/>
+          </a:prstGeom>
+        </p:spPr>
+      </p:pic>
+      <p:sp>
+        <p:nvSpPr>
+          <p:cNvPr id="5" name="CasellaDiTesto 4">
+            <a:extLst>
+              <a:ext uri="{FF2B5EF4-FFF2-40B4-BE49-F238E27FC236}">
+                <a16:creationId xmlns:a16="http://schemas.microsoft.com/office/drawing/2014/main" id="{4F81341A-03BB-842C-FDE5-DDB2BE11C067}"/>
               </a:ext>
             </a:extLst>
           </p:cNvPr>
@@ -10429,8 +10446,8 @@
         </p:nvSpPr>
         <p:spPr>
           <a:xfrm>
-            <a:off x="484093" y="1330990"/>
-            <a:ext cx="8298950" cy="4196020"/>
+            <a:off x="565046" y="3137264"/>
+            <a:ext cx="8411378" cy="3001334"/>
           </a:xfrm>
           <a:prstGeom prst="rect">
             <a:avLst/>
@@ -10443,16 +10460,99 @@
           </a:bodyPr>
           <a:lstStyle/>
           <a:p>
-            <a:pPr marL="285750" indent="-285750">
+            <a:pPr marL="342900" indent="-342900">
               <a:lnSpc>
                 <a:spcPct val="150000"/>
               </a:lnSpc>
-              <a:buFont typeface="Arial" panose="020B0604020202020204" pitchFamily="34" charset="0"/>
-              <a:buChar char="•"/>
+              <a:buFont typeface="+mj-lt"/>
+              <a:buAutoNum type="arabicPeriod"/>
             </a:pPr>
             <a:r>
-              <a:rPr lang="it-IT" sz="1800" dirty="0"/>
-              <a:t>Funzionalità di registrazione e login basate su un meccanismo </a:t>
+              <a:rPr lang="it-IT" sz="1600" dirty="0"/>
+              <a:t>Creazione di una </a:t>
+            </a:r>
+            <a:r>
+              <a:rPr lang="it-IT" sz="1600" b="1" dirty="0"/>
+              <a:t>Verifiable Credential</a:t>
+            </a:r>
+            <a:r>
+              <a:rPr lang="it-IT" sz="1600" dirty="0"/>
+              <a:t> con i dati dell’utente e il </a:t>
+            </a:r>
+            <a:r>
+              <a:rPr lang="it-IT" sz="1600" b="1" dirty="0"/>
+              <a:t>Decentralized Identifier</a:t>
+            </a:r>
+            <a:r>
+              <a:rPr lang="it-IT" sz="1600" dirty="0"/>
+              <a:t> usato in fase di autenticazione</a:t>
+            </a:r>
+          </a:p>
+          <a:p>
+            <a:pPr marL="342900" indent="-342900">
+              <a:lnSpc>
+                <a:spcPct val="150000"/>
+              </a:lnSpc>
+              <a:buFont typeface="+mj-lt"/>
+              <a:buAutoNum type="arabicPeriod"/>
+            </a:pPr>
+            <a:endParaRPr lang="it-IT" sz="1600" dirty="0"/>
+          </a:p>
+          <a:p>
+            <a:pPr marL="342900" indent="-342900">
+              <a:lnSpc>
+                <a:spcPct val="150000"/>
+              </a:lnSpc>
+              <a:buFont typeface="+mj-lt"/>
+              <a:buAutoNum type="arabicPeriod"/>
+            </a:pPr>
+            <a:r>
+              <a:rPr lang="it-IT" sz="1600" dirty="0"/>
+              <a:t>Creazione di una </a:t>
+            </a:r>
+            <a:r>
+              <a:rPr lang="it-IT" sz="1600" b="1" dirty="0"/>
+              <a:t>Verifiable Presentation </a:t>
+            </a:r>
+            <a:r>
+              <a:rPr lang="it-IT" sz="1600" dirty="0"/>
+              <a:t>usando come prova di correttezza della credenziale presente lo schema </a:t>
+            </a:r>
+            <a:r>
+              <a:rPr lang="it-IT" sz="1600" i="1" dirty="0"/>
+              <a:t>CLSignature2019, </a:t>
+            </a:r>
+            <a:r>
+              <a:rPr lang="it-IT" sz="1600" dirty="0"/>
+              <a:t>utile per </a:t>
+            </a:r>
+            <a:r>
+              <a:rPr lang="it-IT" sz="1600" b="1" dirty="0"/>
+              <a:t>Zero Knowledge Proof</a:t>
+            </a:r>
+            <a:endParaRPr lang="it-IT" sz="1600" dirty="0"/>
+          </a:p>
+          <a:p>
+            <a:pPr marL="342900" indent="-342900">
+              <a:lnSpc>
+                <a:spcPct val="150000"/>
+              </a:lnSpc>
+              <a:buFont typeface="+mj-lt"/>
+              <a:buAutoNum type="arabicPeriod"/>
+            </a:pPr>
+            <a:endParaRPr lang="it-IT" sz="1600" dirty="0"/>
+          </a:p>
+          <a:p>
+            <a:pPr marL="342900" indent="-342900">
+              <a:lnSpc>
+                <a:spcPct val="150000"/>
+              </a:lnSpc>
+              <a:buFont typeface="+mj-lt"/>
+              <a:buAutoNum type="arabicPeriod"/>
+            </a:pPr>
+            <a:r>
+              <a:rPr lang="it-IT" sz="1600" dirty="0"/>
+              <a:t>Risoluzione delle firme digitali presenti e verifica della catena di fiducia usando </a:t>
             </a:r>
           </a:p>
           <a:p>
@@ -10462,120 +10562,17 @@
               </a:lnSpc>
             </a:pPr>
             <a:r>
-              <a:rPr lang="it-IT" sz="1800" i="1" dirty="0"/>
-              <a:t>     challenge-response </a:t>
-            </a:r>
-            <a:r>
-              <a:rPr lang="it-IT" sz="1800" dirty="0"/>
-              <a:t>per associare all’utente un </a:t>
-            </a:r>
-            <a:r>
-              <a:rPr lang="it-IT" sz="1800" b="1" dirty="0"/>
-              <a:t>Decentralized Identifier</a:t>
-            </a:r>
-            <a:r>
-              <a:rPr lang="it-IT" sz="1800" dirty="0"/>
-              <a:t> </a:t>
-            </a:r>
-          </a:p>
-          <a:p>
-            <a:pPr>
-              <a:lnSpc>
-                <a:spcPct val="150000"/>
-              </a:lnSpc>
-            </a:pPr>
-            <a:r>
-              <a:rPr lang="it-IT" sz="1800" dirty="0"/>
-              <a:t>     firmato con la propria chiave privata</a:t>
-            </a:r>
-          </a:p>
-          <a:p>
-            <a:pPr>
-              <a:lnSpc>
-                <a:spcPct val="150000"/>
-              </a:lnSpc>
-            </a:pPr>
-            <a:endParaRPr lang="it-IT" sz="1800" i="1" dirty="0"/>
-          </a:p>
-          <a:p>
-            <a:pPr marL="285750" indent="-285750">
-              <a:lnSpc>
-                <a:spcPct val="150000"/>
-              </a:lnSpc>
-              <a:buFont typeface="Arial" panose="020B0604020202020204" pitchFamily="34" charset="0"/>
-              <a:buChar char="•"/>
-            </a:pPr>
-            <a:r>
-              <a:rPr lang="it-IT" sz="1800" dirty="0"/>
-              <a:t>Implementazione della catena e di </a:t>
-            </a:r>
-            <a:r>
-              <a:rPr lang="it-IT" sz="1800" b="1" dirty="0"/>
-              <a:t>Self Sovereign Identity</a:t>
-            </a:r>
-            <a:r>
-              <a:rPr lang="it-IT" sz="1800" dirty="0"/>
-              <a:t> usando lo </a:t>
-            </a:r>
-          </a:p>
-          <a:p>
-            <a:pPr>
-              <a:lnSpc>
-                <a:spcPct val="150000"/>
-              </a:lnSpc>
-            </a:pPr>
-            <a:r>
-              <a:rPr lang="it-IT" sz="1800" i="1" dirty="0"/>
-              <a:t>    smart contract</a:t>
-            </a:r>
-            <a:r>
-              <a:rPr lang="it-IT" sz="1800" dirty="0"/>
-              <a:t> dello stagista e laureando magistrale presso Ca’ Foscari</a:t>
-            </a:r>
-          </a:p>
-          <a:p>
-            <a:pPr>
-              <a:lnSpc>
-                <a:spcPct val="150000"/>
-              </a:lnSpc>
-            </a:pPr>
-            <a:r>
-              <a:rPr lang="it-IT" sz="1800" dirty="0"/>
-              <a:t>    Alessio De Biasi</a:t>
-            </a:r>
-          </a:p>
-          <a:p>
-            <a:pPr>
-              <a:lnSpc>
-                <a:spcPct val="150000"/>
-              </a:lnSpc>
-            </a:pPr>
-            <a:endParaRPr lang="it-IT" sz="1800" i="1" dirty="0"/>
-          </a:p>
-          <a:p>
-            <a:pPr marL="285750" indent="-285750">
-              <a:lnSpc>
-                <a:spcPct val="150000"/>
-              </a:lnSpc>
-              <a:buFont typeface="Arial" panose="020B0604020202020204" pitchFamily="34" charset="0"/>
-              <a:buChar char="•"/>
-            </a:pPr>
-            <a:r>
-              <a:rPr lang="it-IT" sz="1800" dirty="0"/>
-              <a:t>Meccanismo di verifica dell’età dell’utente in base ai limiti d’età del singolo film basato sulla presentazione di credenziali con </a:t>
-            </a:r>
-            <a:r>
-              <a:rPr lang="it-IT" sz="1800" b="1" dirty="0"/>
-              <a:t>Zero Knowledge Proof</a:t>
-            </a:r>
-            <a:endParaRPr lang="it-IT" sz="1800" dirty="0"/>
+              <a:rPr lang="it-IT" sz="1600" b="1" dirty="0"/>
+              <a:t>      Self Sovereign Identity</a:t>
+            </a:r>
+            <a:endParaRPr lang="it-IT" sz="1600" dirty="0"/>
           </a:p>
         </p:txBody>
       </p:sp>
     </p:spTree>
     <p:extLst>
       <p:ext uri="{BB962C8B-B14F-4D97-AF65-F5344CB8AC3E}">
-        <p14:creationId xmlns:p14="http://schemas.microsoft.com/office/powerpoint/2010/main" val="1213906835"/>
+        <p14:creationId xmlns:p14="http://schemas.microsoft.com/office/powerpoint/2010/main" val="4093727288"/>
       </p:ext>
     </p:extLst>
   </p:cSld>
@@ -10642,7 +10639,7 @@
                   <a:srgbClr val="FFFFFF"/>
                 </a:solidFill>
               </a:rPr>
-              <a:t>Verifica dell’età</a:t>
+              <a:t>Tecnologie del progetto</a:t>
             </a:r>
             <a:endParaRPr sz="3000" dirty="0">
               <a:solidFill>
@@ -10660,8 +10657,8 @@
         </p:nvSpPr>
         <p:spPr>
           <a:xfrm>
-            <a:off x="7772400" y="6479700"/>
-            <a:ext cx="914400" cy="378300"/>
+            <a:off x="7976212" y="6479700"/>
+            <a:ext cx="710588" cy="378300"/>
           </a:xfrm>
           <a:prstGeom prst="rect">
             <a:avLst/>
@@ -10726,372 +10723,7 @@
                   <a:schemeClr val="bg1"/>
                 </a:solidFill>
               </a:rPr>
-              <a:t>14 / 16</a:t>
-            </a:r>
-          </a:p>
-        </p:txBody>
-      </p:sp>
-      <p:sp>
-        <p:nvSpPr>
-          <p:cNvPr id="11" name="CasellaDiTesto 10">
-            <a:extLst>
-              <a:ext uri="{FF2B5EF4-FFF2-40B4-BE49-F238E27FC236}">
-                <a16:creationId xmlns:a16="http://schemas.microsoft.com/office/drawing/2014/main" id="{F491E27B-1C39-7BE6-6BC4-C75C7A0B477E}"/>
-              </a:ext>
-            </a:extLst>
-          </p:cNvPr>
-          <p:cNvSpPr txBox="1"/>
-          <p:nvPr/>
-        </p:nvSpPr>
-        <p:spPr>
-          <a:xfrm>
-            <a:off x="5339930" y="6396333"/>
-            <a:ext cx="3267492" cy="307777"/>
-          </a:xfrm>
-          <a:prstGeom prst="rect">
-            <a:avLst/>
-          </a:prstGeom>
-          <a:noFill/>
-        </p:spPr>
-        <p:txBody>
-          <a:bodyPr wrap="square" rtlCol="0">
-            <a:spAutoFit/>
-          </a:bodyPr>
-          <a:lstStyle/>
-          <a:p>
-            <a:r>
-              <a:rPr lang="it-IT" dirty="0">
-                <a:solidFill>
-                  <a:schemeClr val="bg1"/>
-                </a:solidFill>
-              </a:rPr>
-              <a:t>Gabriel Rovesti - VerifiedMovies</a:t>
-            </a:r>
-          </a:p>
-        </p:txBody>
-      </p:sp>
-      <p:pic>
-        <p:nvPicPr>
-          <p:cNvPr id="4" name="Immagine 3">
-            <a:extLst>
-              <a:ext uri="{FF2B5EF4-FFF2-40B4-BE49-F238E27FC236}">
-                <a16:creationId xmlns:a16="http://schemas.microsoft.com/office/drawing/2014/main" id="{EA217CC8-78DB-5953-DFB9-5FE3913A339D}"/>
-              </a:ext>
-            </a:extLst>
-          </p:cNvPr>
-          <p:cNvPicPr>
-            <a:picLocks noChangeAspect="1"/>
-          </p:cNvPicPr>
-          <p:nvPr/>
-        </p:nvPicPr>
-        <p:blipFill>
-          <a:blip r:embed="rId3"/>
-          <a:stretch>
-            <a:fillRect/>
-          </a:stretch>
-        </p:blipFill>
-        <p:spPr>
-          <a:xfrm>
-            <a:off x="2099095" y="1056823"/>
-            <a:ext cx="4945809" cy="2080440"/>
-          </a:xfrm>
-          <a:prstGeom prst="rect">
-            <a:avLst/>
-          </a:prstGeom>
-        </p:spPr>
-      </p:pic>
-      <p:sp>
-        <p:nvSpPr>
-          <p:cNvPr id="5" name="CasellaDiTesto 4">
-            <a:extLst>
-              <a:ext uri="{FF2B5EF4-FFF2-40B4-BE49-F238E27FC236}">
-                <a16:creationId xmlns:a16="http://schemas.microsoft.com/office/drawing/2014/main" id="{4F81341A-03BB-842C-FDE5-DDB2BE11C067}"/>
-              </a:ext>
-            </a:extLst>
-          </p:cNvPr>
-          <p:cNvSpPr txBox="1"/>
-          <p:nvPr/>
-        </p:nvSpPr>
-        <p:spPr>
-          <a:xfrm>
-            <a:off x="565046" y="3137264"/>
-            <a:ext cx="8411378" cy="3001334"/>
-          </a:xfrm>
-          <a:prstGeom prst="rect">
-            <a:avLst/>
-          </a:prstGeom>
-          <a:noFill/>
-        </p:spPr>
-        <p:txBody>
-          <a:bodyPr wrap="square" rtlCol="0">
-            <a:spAutoFit/>
-          </a:bodyPr>
-          <a:lstStyle/>
-          <a:p>
-            <a:pPr marL="342900" indent="-342900">
-              <a:lnSpc>
-                <a:spcPct val="150000"/>
-              </a:lnSpc>
-              <a:buFont typeface="+mj-lt"/>
-              <a:buAutoNum type="arabicPeriod"/>
-            </a:pPr>
-            <a:r>
-              <a:rPr lang="it-IT" sz="1600" dirty="0"/>
-              <a:t>Creazione di una </a:t>
-            </a:r>
-            <a:r>
-              <a:rPr lang="it-IT" sz="1600" b="1" dirty="0"/>
-              <a:t>Verifiable Credential</a:t>
-            </a:r>
-            <a:r>
-              <a:rPr lang="it-IT" sz="1600" dirty="0"/>
-              <a:t> con i dati dell’utente e il </a:t>
-            </a:r>
-            <a:r>
-              <a:rPr lang="it-IT" sz="1600" b="1" dirty="0"/>
-              <a:t>Decentralized Identifier</a:t>
-            </a:r>
-            <a:r>
-              <a:rPr lang="it-IT" sz="1600" dirty="0"/>
-              <a:t> usato in fase di autenticazione</a:t>
-            </a:r>
-          </a:p>
-          <a:p>
-            <a:pPr marL="342900" indent="-342900">
-              <a:lnSpc>
-                <a:spcPct val="150000"/>
-              </a:lnSpc>
-              <a:buFont typeface="+mj-lt"/>
-              <a:buAutoNum type="arabicPeriod"/>
-            </a:pPr>
-            <a:endParaRPr lang="it-IT" sz="1600" dirty="0"/>
-          </a:p>
-          <a:p>
-            <a:pPr marL="342900" indent="-342900">
-              <a:lnSpc>
-                <a:spcPct val="150000"/>
-              </a:lnSpc>
-              <a:buFont typeface="+mj-lt"/>
-              <a:buAutoNum type="arabicPeriod"/>
-            </a:pPr>
-            <a:r>
-              <a:rPr lang="it-IT" sz="1600" dirty="0"/>
-              <a:t>Creazione di una </a:t>
-            </a:r>
-            <a:r>
-              <a:rPr lang="it-IT" sz="1600" b="1" dirty="0"/>
-              <a:t>Verifiable Presentation </a:t>
-            </a:r>
-            <a:r>
-              <a:rPr lang="it-IT" sz="1600" dirty="0"/>
-              <a:t>usando come prova di correttezza della credenziale presente lo schema </a:t>
-            </a:r>
-            <a:r>
-              <a:rPr lang="it-IT" sz="1600" i="1" dirty="0"/>
-              <a:t>CLSignature2019, </a:t>
-            </a:r>
-            <a:r>
-              <a:rPr lang="it-IT" sz="1600" dirty="0"/>
-              <a:t>utile per </a:t>
-            </a:r>
-            <a:r>
-              <a:rPr lang="it-IT" sz="1600" b="1" dirty="0"/>
-              <a:t>Zero Knowledge Proof</a:t>
-            </a:r>
-            <a:endParaRPr lang="it-IT" sz="1600" dirty="0"/>
-          </a:p>
-          <a:p>
-            <a:pPr marL="342900" indent="-342900">
-              <a:lnSpc>
-                <a:spcPct val="150000"/>
-              </a:lnSpc>
-              <a:buFont typeface="+mj-lt"/>
-              <a:buAutoNum type="arabicPeriod"/>
-            </a:pPr>
-            <a:endParaRPr lang="it-IT" sz="1600" dirty="0"/>
-          </a:p>
-          <a:p>
-            <a:pPr marL="342900" indent="-342900">
-              <a:lnSpc>
-                <a:spcPct val="150000"/>
-              </a:lnSpc>
-              <a:buFont typeface="+mj-lt"/>
-              <a:buAutoNum type="arabicPeriod"/>
-            </a:pPr>
-            <a:r>
-              <a:rPr lang="it-IT" sz="1600" dirty="0"/>
-              <a:t>Risoluzione delle firme digitali presenti e verifica della catena di fiducia usando </a:t>
-            </a:r>
-          </a:p>
-          <a:p>
-            <a:pPr>
-              <a:lnSpc>
-                <a:spcPct val="150000"/>
-              </a:lnSpc>
-            </a:pPr>
-            <a:r>
-              <a:rPr lang="it-IT" sz="1600" b="1" dirty="0"/>
-              <a:t>      Self Sovereign Identity</a:t>
-            </a:r>
-            <a:endParaRPr lang="it-IT" sz="1600" dirty="0"/>
-          </a:p>
-        </p:txBody>
-      </p:sp>
-    </p:spTree>
-    <p:extLst>
-      <p:ext uri="{BB962C8B-B14F-4D97-AF65-F5344CB8AC3E}">
-        <p14:creationId xmlns:p14="http://schemas.microsoft.com/office/powerpoint/2010/main" val="4093727288"/>
-      </p:ext>
-    </p:extLst>
-  </p:cSld>
-  <p:clrMapOvr>
-    <a:masterClrMapping/>
-  </p:clrMapOvr>
-</p:sld>
-</file>
-
-<file path=ppt/slides/slide15.xml><?xml version="1.0" encoding="utf-8"?>
-<p:sld xmlns:a="http://schemas.openxmlformats.org/drawingml/2006/main" xmlns:r="http://schemas.openxmlformats.org/officeDocument/2006/relationships" xmlns:p="http://schemas.openxmlformats.org/presentationml/2006/main">
-  <p:cSld>
-    <p:spTree>
-      <p:nvGrpSpPr>
-        <p:cNvPr id="1" name="Shape 98"/>
-        <p:cNvGrpSpPr/>
-        <p:nvPr/>
-      </p:nvGrpSpPr>
-      <p:grpSpPr>
-        <a:xfrm>
-          <a:off x="0" y="0"/>
-          <a:ext cx="0" cy="0"/>
-          <a:chOff x="0" y="0"/>
-          <a:chExt cx="0" cy="0"/>
-        </a:xfrm>
-      </p:grpSpPr>
-      <p:sp>
-        <p:nvSpPr>
-          <p:cNvPr id="99" name="Shape 99"/>
-          <p:cNvSpPr txBox="1">
-            <a:spLocks noGrp="1"/>
-          </p:cNvSpPr>
-          <p:nvPr>
-            <p:ph type="title" idx="4294967295"/>
-          </p:nvPr>
-        </p:nvSpPr>
-        <p:spPr>
-          <a:xfrm>
-            <a:off x="457200" y="-182567"/>
-            <a:ext cx="5213100" cy="1143300"/>
-          </a:xfrm>
-          <a:prstGeom prst="rect">
-            <a:avLst/>
-          </a:prstGeom>
-        </p:spPr>
-        <p:txBody>
-          <a:bodyPr spcFirstLastPara="1" wrap="square" lIns="82925" tIns="82925" rIns="82925" bIns="82925" anchor="ctr" anchorCtr="0">
-            <a:noAutofit/>
-          </a:bodyPr>
-          <a:lstStyle/>
-          <a:p>
-            <a:pPr marL="0" lvl="0" indent="0" rtl="0">
-              <a:spcBef>
-                <a:spcPts val="0"/>
-              </a:spcBef>
-              <a:spcAft>
-                <a:spcPts val="0"/>
-              </a:spcAft>
-              <a:buNone/>
-            </a:pPr>
-            <a:r>
-              <a:rPr lang="it-IT" sz="3000" dirty="0">
-                <a:solidFill>
-                  <a:srgbClr val="FFFFFF"/>
-                </a:solidFill>
-              </a:rPr>
-              <a:t>Tecnologie del progetto</a:t>
-            </a:r>
-            <a:endParaRPr sz="3000" dirty="0">
-              <a:solidFill>
-                <a:srgbClr val="FFFFFF"/>
-              </a:solidFill>
-            </a:endParaRPr>
-          </a:p>
-        </p:txBody>
-      </p:sp>
-      <p:sp>
-        <p:nvSpPr>
-          <p:cNvPr id="101" name="Shape 101"/>
-          <p:cNvSpPr/>
-          <p:nvPr/>
-        </p:nvSpPr>
-        <p:spPr>
-          <a:xfrm>
-            <a:off x="7976212" y="6479700"/>
-            <a:ext cx="710588" cy="378300"/>
-          </a:xfrm>
-          <a:prstGeom prst="rect">
-            <a:avLst/>
-          </a:prstGeom>
-          <a:solidFill>
-            <a:srgbClr val="9B0014"/>
-          </a:solidFill>
-          <a:ln>
-            <a:noFill/>
-          </a:ln>
-        </p:spPr>
-        <p:txBody>
-          <a:bodyPr spcFirstLastPara="1" wrap="square" lIns="91425" tIns="91425" rIns="91425" bIns="91425" anchor="ctr" anchorCtr="0">
-            <a:noAutofit/>
-          </a:bodyPr>
-          <a:lstStyle/>
-          <a:p>
-            <a:pPr marL="0" lvl="0" indent="0">
-              <a:spcBef>
-                <a:spcPts val="0"/>
-              </a:spcBef>
-              <a:spcAft>
-                <a:spcPts val="0"/>
-              </a:spcAft>
-              <a:buNone/>
-            </a:pPr>
-            <a:endParaRPr/>
-          </a:p>
-        </p:txBody>
-      </p:sp>
-      <p:sp>
-        <p:nvSpPr>
-          <p:cNvPr id="2" name="CasellaDiTesto 1">
-            <a:extLst>
-              <a:ext uri="{FF2B5EF4-FFF2-40B4-BE49-F238E27FC236}">
-                <a16:creationId xmlns:a16="http://schemas.microsoft.com/office/drawing/2014/main" id="{ADC0F51E-4553-1FA2-DDDB-E5BC3CE52270}"/>
-              </a:ext>
-            </a:extLst>
-          </p:cNvPr>
-          <p:cNvSpPr txBox="1"/>
-          <p:nvPr/>
-        </p:nvSpPr>
-        <p:spPr>
-          <a:xfrm>
-            <a:off x="8368796" y="6396334"/>
-            <a:ext cx="914400" cy="307777"/>
-          </a:xfrm>
-          <a:prstGeom prst="rect">
-            <a:avLst/>
-          </a:prstGeom>
-          <a:noFill/>
-        </p:spPr>
-        <p:txBody>
-          <a:bodyPr wrap="square" rtlCol="0">
-            <a:spAutoFit/>
-          </a:bodyPr>
-          <a:lstStyle/>
-          <a:p>
-            <a:r>
-              <a:rPr lang="it-IT" dirty="0">
-                <a:solidFill>
-                  <a:schemeClr val="bg1"/>
-                </a:solidFill>
-              </a:rPr>
-              <a:t>15 / 16</a:t>
+              <a:t>14 / 15</a:t>
             </a:r>
           </a:p>
         </p:txBody>
@@ -11676,7 +11308,7 @@
 </p:sld>
 </file>
 
-<file path=ppt/slides/slide16.xml><?xml version="1.0" encoding="utf-8"?>
+<file path=ppt/slides/slide15.xml><?xml version="1.0" encoding="utf-8"?>
 <p:sld xmlns:a="http://schemas.openxmlformats.org/drawingml/2006/main" xmlns:r="http://schemas.openxmlformats.org/officeDocument/2006/relationships" xmlns:p="http://schemas.openxmlformats.org/presentationml/2006/main">
   <p:cSld>
     <p:spTree>
@@ -11817,7 +11449,7 @@
                   <a:schemeClr val="bg1"/>
                 </a:solidFill>
               </a:rPr>
-              <a:t>16 / 16</a:t>
+              <a:t>15 / 15</a:t>
             </a:r>
           </a:p>
         </p:txBody>
@@ -12172,7 +11804,7 @@
                   <a:schemeClr val="bg1"/>
                 </a:solidFill>
               </a:rPr>
-              <a:t>2 / 16</a:t>
+              <a:t>2 / 15</a:t>
             </a:r>
           </a:p>
         </p:txBody>
@@ -12641,7 +12273,7 @@
                   <a:schemeClr val="bg1"/>
                 </a:solidFill>
               </a:rPr>
-              <a:t>3 / 16</a:t>
+              <a:t>3 / 15</a:t>
             </a:r>
           </a:p>
         </p:txBody>
@@ -12690,7 +12322,7 @@
         </p:nvSpPr>
         <p:spPr>
           <a:xfrm>
-            <a:off x="457199" y="2947742"/>
+            <a:off x="457198" y="2780303"/>
             <a:ext cx="8411378" cy="3365024"/>
           </a:xfrm>
           <a:prstGeom prst="rect">
@@ -12976,7 +12608,7 @@
                   <a:schemeClr val="bg1"/>
                 </a:solidFill>
               </a:rPr>
-              <a:t>4 / 16</a:t>
+              <a:t>4 / 15</a:t>
             </a:r>
           </a:p>
         </p:txBody>
@@ -13356,7 +12988,7 @@
                   <a:schemeClr val="bg1"/>
                 </a:solidFill>
               </a:rPr>
-              <a:t>5 / 16</a:t>
+              <a:t>5 / 15</a:t>
             </a:r>
           </a:p>
         </p:txBody>
@@ -13756,7 +13388,7 @@
                   <a:schemeClr val="bg1"/>
                 </a:solidFill>
               </a:rPr>
-              <a:t>6 / 16</a:t>
+              <a:t>6 / 15</a:t>
             </a:r>
           </a:p>
         </p:txBody>
@@ -14099,7 +13731,7 @@
                   <a:schemeClr val="bg1"/>
                 </a:solidFill>
               </a:rPr>
-              <a:t>7 / 16</a:t>
+              <a:t>7 / 15</a:t>
             </a:r>
           </a:p>
         </p:txBody>
@@ -14429,7 +14061,7 @@
                   <a:schemeClr val="bg1"/>
                 </a:solidFill>
               </a:rPr>
-              <a:t>8 / 16</a:t>
+              <a:t>8 / 15</a:t>
             </a:r>
           </a:p>
         </p:txBody>
@@ -14738,7 +14370,7 @@
                   <a:schemeClr val="bg1"/>
                 </a:solidFill>
               </a:rPr>
-              <a:t>9 / 16</a:t>
+              <a:t>9 / 15</a:t>
             </a:r>
           </a:p>
         </p:txBody>

</xml_diff>

<commit_message>
Correzioni slide da indicazioni prof.ssa
- Indicazioni per starci entro i 12 minuti più domande
- Aggiunti appunti al file di FAQ
- Modifiche e correzioni sulle slide a livello generale
- Inserito file orari aggiornati discussione
</commit_message>
<xml_diff>
--- a/Presentazione/Presentazione Gabriel Rovesti.pptx
+++ b/Presentazione/Presentazione Gabriel Rovesti.pptx
@@ -23,9 +23,9 @@
     <p:sldId id="270" r:id="rId11"/>
     <p:sldId id="275" r:id="rId12"/>
     <p:sldId id="271" r:id="rId13"/>
-    <p:sldId id="266" r:id="rId14"/>
-    <p:sldId id="278" r:id="rId15"/>
-    <p:sldId id="272" r:id="rId16"/>
+    <p:sldId id="272" r:id="rId14"/>
+    <p:sldId id="266" r:id="rId15"/>
+    <p:sldId id="278" r:id="rId16"/>
     <p:sldId id="265" r:id="rId17"/>
   </p:sldIdLst>
   <p:sldSz cx="9144000" cy="6858000" type="screen4x3"/>
@@ -357,7 +357,7 @@
           <a:p>
             <a:fld id="{6469F890-3609-4E18-B68A-510CF7125ACB}" type="datetimeFigureOut">
               <a:rPr lang="it-IT" smtClean="0"/>
-              <a:t>10/07/2023</a:t>
+              <a:t>14/07/2023</a:t>
             </a:fld>
             <a:endParaRPr lang="it-IT"/>
           </a:p>
@@ -1177,7 +1177,7 @@
     </p:spTree>
     <p:extLst>
       <p:ext uri="{BB962C8B-B14F-4D97-AF65-F5344CB8AC3E}">
-        <p14:creationId xmlns:p14="http://schemas.microsoft.com/office/powerpoint/2010/main" val="2777132999"/>
+        <p14:creationId xmlns:p14="http://schemas.microsoft.com/office/powerpoint/2010/main" val="1046887117"/>
       </p:ext>
     </p:extLst>
   </p:cSld>
@@ -1286,7 +1286,7 @@
     </p:spTree>
     <p:extLst>
       <p:ext uri="{BB962C8B-B14F-4D97-AF65-F5344CB8AC3E}">
-        <p14:creationId xmlns:p14="http://schemas.microsoft.com/office/powerpoint/2010/main" val="744482108"/>
+        <p14:creationId xmlns:p14="http://schemas.microsoft.com/office/powerpoint/2010/main" val="2777132999"/>
       </p:ext>
     </p:extLst>
   </p:cSld>
@@ -1395,7 +1395,7 @@
     </p:spTree>
     <p:extLst>
       <p:ext uri="{BB962C8B-B14F-4D97-AF65-F5344CB8AC3E}">
-        <p14:creationId xmlns:p14="http://schemas.microsoft.com/office/powerpoint/2010/main" val="1046887117"/>
+        <p14:creationId xmlns:p14="http://schemas.microsoft.com/office/powerpoint/2010/main" val="744482108"/>
       </p:ext>
     </p:extLst>
   </p:cSld>
@@ -9431,15 +9431,7 @@
             </a:pPr>
             <a:r>
               <a:rPr lang="it-IT" sz="1600" dirty="0"/>
-              <a:t>L’utente presenta la credenziale nel proprio </a:t>
-            </a:r>
-            <a:r>
-              <a:rPr lang="it-IT" sz="1600" i="1" dirty="0"/>
-              <a:t>wallet </a:t>
-            </a:r>
-            <a:r>
-              <a:rPr lang="it-IT" sz="1600" dirty="0"/>
-              <a:t>e li presenta come </a:t>
+              <a:t>L’utente presenta la credenziale con i propri dati in qualità di </a:t>
             </a:r>
             <a:r>
               <a:rPr lang="it-IT" sz="1600" b="1" dirty="0"/>
@@ -9480,7 +9472,7 @@
             </a:r>
             <a:r>
               <a:rPr lang="it-IT" sz="1600" dirty="0"/>
-              <a:t>).</a:t>
+              <a:t>)</a:t>
             </a:r>
           </a:p>
         </p:txBody>
@@ -9697,7 +9689,7 @@
         </p:nvSpPr>
         <p:spPr>
           <a:xfrm>
-            <a:off x="576062" y="3653572"/>
+            <a:off x="457199" y="3528204"/>
             <a:ext cx="8411378" cy="2534027"/>
           </a:xfrm>
           <a:prstGeom prst="rect">
@@ -9711,7 +9703,7 @@
           </a:bodyPr>
           <a:lstStyle/>
           <a:p>
-            <a:pPr marL="285750" indent="-285750">
+            <a:pPr marL="285750" indent="-285750" algn="just">
               <a:lnSpc>
                 <a:spcPct val="150000"/>
               </a:lnSpc>
@@ -9724,7 +9716,7 @@
             </a:r>
           </a:p>
           <a:p>
-            <a:pPr marL="285750" indent="-285750">
+            <a:pPr marL="285750" indent="-285750" algn="just">
               <a:lnSpc>
                 <a:spcPct val="150000"/>
               </a:lnSpc>
@@ -9734,7 +9726,7 @@
             <a:endParaRPr lang="it-IT" sz="1800" dirty="0"/>
           </a:p>
           <a:p>
-            <a:pPr marL="285750" indent="-285750">
+            <a:pPr marL="285750" indent="-285750" algn="just">
               <a:lnSpc>
                 <a:spcPct val="150000"/>
               </a:lnSpc>
@@ -9845,8 +9837,8 @@
         </p:nvSpPr>
         <p:spPr>
           <a:xfrm>
-            <a:off x="457199" y="-182567"/>
-            <a:ext cx="6053769" cy="1143300"/>
+            <a:off x="457200" y="-182567"/>
+            <a:ext cx="5213100" cy="1143300"/>
           </a:xfrm>
           <a:prstGeom prst="rect">
             <a:avLst/>
@@ -9873,7 +9865,7 @@
                   <a:srgbClr val="FFFFFF"/>
                 </a:solidFill>
               </a:rPr>
-              <a:t>Le caratteristiche del progetto</a:t>
+              <a:t>Tecnologie del progetto</a:t>
             </a:r>
             <a:endParaRPr sz="3000" dirty="0">
               <a:solidFill>
@@ -9891,8 +9883,8 @@
         </p:nvSpPr>
         <p:spPr>
           <a:xfrm>
-            <a:off x="7772400" y="6479700"/>
-            <a:ext cx="914400" cy="378300"/>
+            <a:off x="7976212" y="6479700"/>
+            <a:ext cx="710588" cy="378300"/>
           </a:xfrm>
           <a:prstGeom prst="rect">
             <a:avLst/>
@@ -9958,772 +9950,6 @@
                 </a:solidFill>
               </a:rPr>
               <a:t>12 / 15</a:t>
-            </a:r>
-          </a:p>
-        </p:txBody>
-      </p:sp>
-      <p:sp>
-        <p:nvSpPr>
-          <p:cNvPr id="11" name="CasellaDiTesto 10">
-            <a:extLst>
-              <a:ext uri="{FF2B5EF4-FFF2-40B4-BE49-F238E27FC236}">
-                <a16:creationId xmlns:a16="http://schemas.microsoft.com/office/drawing/2014/main" id="{F491E27B-1C39-7BE6-6BC4-C75C7A0B477E}"/>
-              </a:ext>
-            </a:extLst>
-          </p:cNvPr>
-          <p:cNvSpPr txBox="1"/>
-          <p:nvPr/>
-        </p:nvSpPr>
-        <p:spPr>
-          <a:xfrm>
-            <a:off x="5339930" y="6396333"/>
-            <a:ext cx="3267492" cy="307777"/>
-          </a:xfrm>
-          <a:prstGeom prst="rect">
-            <a:avLst/>
-          </a:prstGeom>
-          <a:noFill/>
-        </p:spPr>
-        <p:txBody>
-          <a:bodyPr wrap="square" rtlCol="0">
-            <a:spAutoFit/>
-          </a:bodyPr>
-          <a:lstStyle/>
-          <a:p>
-            <a:r>
-              <a:rPr lang="it-IT" dirty="0">
-                <a:solidFill>
-                  <a:schemeClr val="bg1"/>
-                </a:solidFill>
-              </a:rPr>
-              <a:t>Gabriel Rovesti - VerifiedMovies</a:t>
-            </a:r>
-          </a:p>
-        </p:txBody>
-      </p:sp>
-      <p:sp>
-        <p:nvSpPr>
-          <p:cNvPr id="12" name="CasellaDiTesto 11">
-            <a:extLst>
-              <a:ext uri="{FF2B5EF4-FFF2-40B4-BE49-F238E27FC236}">
-                <a16:creationId xmlns:a16="http://schemas.microsoft.com/office/drawing/2014/main" id="{C5DF3E3C-D423-9AA2-3150-1F49E451CE59}"/>
-              </a:ext>
-            </a:extLst>
-          </p:cNvPr>
-          <p:cNvSpPr txBox="1"/>
-          <p:nvPr/>
-        </p:nvSpPr>
-        <p:spPr>
-          <a:xfrm>
-            <a:off x="349949" y="2556996"/>
-            <a:ext cx="8444101" cy="3739998"/>
-          </a:xfrm>
-          <a:prstGeom prst="rect">
-            <a:avLst/>
-          </a:prstGeom>
-          <a:noFill/>
-        </p:spPr>
-        <p:txBody>
-          <a:bodyPr wrap="square" rtlCol="0">
-            <a:spAutoFit/>
-          </a:bodyPr>
-          <a:lstStyle/>
-          <a:p>
-            <a:pPr marL="285750" indent="-285750">
-              <a:lnSpc>
-                <a:spcPct val="150000"/>
-              </a:lnSpc>
-              <a:buFont typeface="Arial" panose="020B0604020202020204" pitchFamily="34" charset="0"/>
-              <a:buChar char="•"/>
-            </a:pPr>
-            <a:r>
-              <a:rPr lang="it-IT" sz="1600" dirty="0"/>
-              <a:t>Registrazione e login basate su un meccanismo </a:t>
-            </a:r>
-          </a:p>
-          <a:p>
-            <a:pPr>
-              <a:lnSpc>
-                <a:spcPct val="150000"/>
-              </a:lnSpc>
-            </a:pPr>
-            <a:r>
-              <a:rPr lang="it-IT" sz="1600" i="1" dirty="0"/>
-              <a:t>     challenge-response </a:t>
-            </a:r>
-            <a:r>
-              <a:rPr lang="it-IT" sz="1600" dirty="0"/>
-              <a:t>per associare all’utente un </a:t>
-            </a:r>
-            <a:r>
-              <a:rPr lang="it-IT" sz="1600" b="1" dirty="0"/>
-              <a:t>Decentralized Identifier</a:t>
-            </a:r>
-            <a:r>
-              <a:rPr lang="it-IT" sz="1600" dirty="0"/>
-              <a:t> </a:t>
-            </a:r>
-          </a:p>
-          <a:p>
-            <a:pPr>
-              <a:lnSpc>
-                <a:spcPct val="150000"/>
-              </a:lnSpc>
-            </a:pPr>
-            <a:r>
-              <a:rPr lang="it-IT" sz="1600" dirty="0"/>
-              <a:t>     firmato con la propria chiave privata</a:t>
-            </a:r>
-          </a:p>
-          <a:p>
-            <a:pPr>
-              <a:lnSpc>
-                <a:spcPct val="150000"/>
-              </a:lnSpc>
-            </a:pPr>
-            <a:endParaRPr lang="it-IT" sz="1600" i="1" dirty="0"/>
-          </a:p>
-          <a:p>
-            <a:pPr marL="285750" indent="-285750">
-              <a:lnSpc>
-                <a:spcPct val="150000"/>
-              </a:lnSpc>
-              <a:buFont typeface="Arial" panose="020B0604020202020204" pitchFamily="34" charset="0"/>
-              <a:buChar char="•"/>
-            </a:pPr>
-            <a:r>
-              <a:rPr lang="it-IT" sz="1600" dirty="0"/>
-              <a:t>Implementazione della catena e di </a:t>
-            </a:r>
-            <a:r>
-              <a:rPr lang="it-IT" sz="1600" b="1" dirty="0"/>
-              <a:t>Self Sovereign Identity</a:t>
-            </a:r>
-            <a:r>
-              <a:rPr lang="it-IT" sz="1600" dirty="0"/>
-              <a:t> usando lo </a:t>
-            </a:r>
-          </a:p>
-          <a:p>
-            <a:pPr>
-              <a:lnSpc>
-                <a:spcPct val="150000"/>
-              </a:lnSpc>
-            </a:pPr>
-            <a:r>
-              <a:rPr lang="it-IT" sz="1600" i="1" dirty="0"/>
-              <a:t>     smart contract</a:t>
-            </a:r>
-            <a:r>
-              <a:rPr lang="it-IT" sz="1600" dirty="0"/>
-              <a:t> dello stagista e laureando magistrale presso Ca’ Foscari</a:t>
-            </a:r>
-          </a:p>
-          <a:p>
-            <a:pPr>
-              <a:lnSpc>
-                <a:spcPct val="150000"/>
-              </a:lnSpc>
-            </a:pPr>
-            <a:r>
-              <a:rPr lang="it-IT" sz="1600" dirty="0"/>
-              <a:t>     Alessio De Biasi</a:t>
-            </a:r>
-          </a:p>
-          <a:p>
-            <a:pPr>
-              <a:lnSpc>
-                <a:spcPct val="150000"/>
-              </a:lnSpc>
-            </a:pPr>
-            <a:endParaRPr lang="it-IT" sz="1600" i="1" dirty="0"/>
-          </a:p>
-          <a:p>
-            <a:pPr marL="285750" indent="-285750">
-              <a:lnSpc>
-                <a:spcPct val="150000"/>
-              </a:lnSpc>
-              <a:buFont typeface="Arial" panose="020B0604020202020204" pitchFamily="34" charset="0"/>
-              <a:buChar char="•"/>
-            </a:pPr>
-            <a:r>
-              <a:rPr lang="it-IT" sz="1600" dirty="0"/>
-              <a:t>Meccanismo di verifica dell’età dell’utente in base ai limiti d’età del singolo film basato sulla presentazione di credenziali con </a:t>
-            </a:r>
-            <a:r>
-              <a:rPr lang="it-IT" sz="1600" b="1" dirty="0"/>
-              <a:t>Zero Knowledge Proof</a:t>
-            </a:r>
-            <a:endParaRPr lang="it-IT" sz="1600" dirty="0"/>
-          </a:p>
-        </p:txBody>
-      </p:sp>
-      <p:pic>
-        <p:nvPicPr>
-          <p:cNvPr id="3" name="Immagine 2" descr="Immagine che contiene testo, Carattere, logo, schermata&#10;&#10;Descrizione generata automaticamente">
-            <a:extLst>
-              <a:ext uri="{FF2B5EF4-FFF2-40B4-BE49-F238E27FC236}">
-                <a16:creationId xmlns:a16="http://schemas.microsoft.com/office/drawing/2014/main" id="{5D45E86E-072D-87D3-D6AA-4D89B2303C13}"/>
-              </a:ext>
-            </a:extLst>
-          </p:cNvPr>
-          <p:cNvPicPr>
-            <a:picLocks noChangeAspect="1"/>
-          </p:cNvPicPr>
-          <p:nvPr/>
-        </p:nvPicPr>
-        <p:blipFill>
-          <a:blip r:embed="rId3"/>
-          <a:stretch>
-            <a:fillRect/>
-          </a:stretch>
-        </p:blipFill>
-        <p:spPr>
-          <a:xfrm>
-            <a:off x="3398195" y="960733"/>
-            <a:ext cx="2347607" cy="1414541"/>
-          </a:xfrm>
-          <a:prstGeom prst="round2DiagRect">
-            <a:avLst>
-              <a:gd name="adj1" fmla="val 16667"/>
-              <a:gd name="adj2" fmla="val 0"/>
-            </a:avLst>
-          </a:prstGeom>
-          <a:ln w="88900" cap="sq">
-            <a:solidFill>
-              <a:srgbClr val="FFFFFF"/>
-            </a:solidFill>
-            <a:miter lim="800000"/>
-          </a:ln>
-          <a:effectLst>
-            <a:outerShdw blurRad="254000" algn="tl" rotWithShape="0">
-              <a:srgbClr val="000000">
-                <a:alpha val="43000"/>
-              </a:srgbClr>
-            </a:outerShdw>
-          </a:effectLst>
-        </p:spPr>
-      </p:pic>
-    </p:spTree>
-    <p:extLst>
-      <p:ext uri="{BB962C8B-B14F-4D97-AF65-F5344CB8AC3E}">
-        <p14:creationId xmlns:p14="http://schemas.microsoft.com/office/powerpoint/2010/main" val="1213906835"/>
-      </p:ext>
-    </p:extLst>
-  </p:cSld>
-  <p:clrMapOvr>
-    <a:masterClrMapping/>
-  </p:clrMapOvr>
-</p:sld>
-</file>
-
-<file path=ppt/slides/slide13.xml><?xml version="1.0" encoding="utf-8"?>
-<p:sld xmlns:a="http://schemas.openxmlformats.org/drawingml/2006/main" xmlns:r="http://schemas.openxmlformats.org/officeDocument/2006/relationships" xmlns:p="http://schemas.openxmlformats.org/presentationml/2006/main">
-  <p:cSld>
-    <p:spTree>
-      <p:nvGrpSpPr>
-        <p:cNvPr id="1" name="Shape 98"/>
-        <p:cNvGrpSpPr/>
-        <p:nvPr/>
-      </p:nvGrpSpPr>
-      <p:grpSpPr>
-        <a:xfrm>
-          <a:off x="0" y="0"/>
-          <a:ext cx="0" cy="0"/>
-          <a:chOff x="0" y="0"/>
-          <a:chExt cx="0" cy="0"/>
-        </a:xfrm>
-      </p:grpSpPr>
-      <p:sp>
-        <p:nvSpPr>
-          <p:cNvPr id="99" name="Shape 99"/>
-          <p:cNvSpPr txBox="1">
-            <a:spLocks noGrp="1"/>
-          </p:cNvSpPr>
-          <p:nvPr>
-            <p:ph type="title" idx="4294967295"/>
-          </p:nvPr>
-        </p:nvSpPr>
-        <p:spPr>
-          <a:xfrm>
-            <a:off x="457200" y="-182567"/>
-            <a:ext cx="5213100" cy="1143300"/>
-          </a:xfrm>
-          <a:prstGeom prst="rect">
-            <a:avLst/>
-          </a:prstGeom>
-        </p:spPr>
-        <p:txBody>
-          <a:bodyPr spcFirstLastPara="1" wrap="square" lIns="82925" tIns="82925" rIns="82925" bIns="82925" anchor="ctr" anchorCtr="0">
-            <a:noAutofit/>
-          </a:bodyPr>
-          <a:lstStyle/>
-          <a:p>
-            <a:pPr marL="0" lvl="0" indent="0" rtl="0">
-              <a:spcBef>
-                <a:spcPts val="0"/>
-              </a:spcBef>
-              <a:spcAft>
-                <a:spcPts val="0"/>
-              </a:spcAft>
-              <a:buNone/>
-            </a:pPr>
-            <a:r>
-              <a:rPr lang="it-IT" sz="3000" dirty="0">
-                <a:solidFill>
-                  <a:srgbClr val="FFFFFF"/>
-                </a:solidFill>
-              </a:rPr>
-              <a:t>Verifica dell’età</a:t>
-            </a:r>
-            <a:endParaRPr sz="3000" dirty="0">
-              <a:solidFill>
-                <a:srgbClr val="FFFFFF"/>
-              </a:solidFill>
-            </a:endParaRPr>
-          </a:p>
-        </p:txBody>
-      </p:sp>
-      <p:sp>
-        <p:nvSpPr>
-          <p:cNvPr id="101" name="Shape 101"/>
-          <p:cNvSpPr/>
-          <p:nvPr/>
-        </p:nvSpPr>
-        <p:spPr>
-          <a:xfrm>
-            <a:off x="7772400" y="6479700"/>
-            <a:ext cx="914400" cy="378300"/>
-          </a:xfrm>
-          <a:prstGeom prst="rect">
-            <a:avLst/>
-          </a:prstGeom>
-          <a:solidFill>
-            <a:srgbClr val="9B0014"/>
-          </a:solidFill>
-          <a:ln>
-            <a:noFill/>
-          </a:ln>
-        </p:spPr>
-        <p:txBody>
-          <a:bodyPr spcFirstLastPara="1" wrap="square" lIns="91425" tIns="91425" rIns="91425" bIns="91425" anchor="ctr" anchorCtr="0">
-            <a:noAutofit/>
-          </a:bodyPr>
-          <a:lstStyle/>
-          <a:p>
-            <a:pPr marL="0" lvl="0" indent="0">
-              <a:spcBef>
-                <a:spcPts val="0"/>
-              </a:spcBef>
-              <a:spcAft>
-                <a:spcPts val="0"/>
-              </a:spcAft>
-              <a:buNone/>
-            </a:pPr>
-            <a:endParaRPr/>
-          </a:p>
-        </p:txBody>
-      </p:sp>
-      <p:sp>
-        <p:nvSpPr>
-          <p:cNvPr id="2" name="CasellaDiTesto 1">
-            <a:extLst>
-              <a:ext uri="{FF2B5EF4-FFF2-40B4-BE49-F238E27FC236}">
-                <a16:creationId xmlns:a16="http://schemas.microsoft.com/office/drawing/2014/main" id="{ADC0F51E-4553-1FA2-DDDB-E5BC3CE52270}"/>
-              </a:ext>
-            </a:extLst>
-          </p:cNvPr>
-          <p:cNvSpPr txBox="1"/>
-          <p:nvPr/>
-        </p:nvSpPr>
-        <p:spPr>
-          <a:xfrm>
-            <a:off x="8368796" y="6396334"/>
-            <a:ext cx="914400" cy="307777"/>
-          </a:xfrm>
-          <a:prstGeom prst="rect">
-            <a:avLst/>
-          </a:prstGeom>
-          <a:noFill/>
-        </p:spPr>
-        <p:txBody>
-          <a:bodyPr wrap="square" rtlCol="0">
-            <a:spAutoFit/>
-          </a:bodyPr>
-          <a:lstStyle/>
-          <a:p>
-            <a:r>
-              <a:rPr lang="it-IT" dirty="0">
-                <a:solidFill>
-                  <a:schemeClr val="bg1"/>
-                </a:solidFill>
-              </a:rPr>
-              <a:t>13 / 15</a:t>
-            </a:r>
-          </a:p>
-        </p:txBody>
-      </p:sp>
-      <p:sp>
-        <p:nvSpPr>
-          <p:cNvPr id="11" name="CasellaDiTesto 10">
-            <a:extLst>
-              <a:ext uri="{FF2B5EF4-FFF2-40B4-BE49-F238E27FC236}">
-                <a16:creationId xmlns:a16="http://schemas.microsoft.com/office/drawing/2014/main" id="{F491E27B-1C39-7BE6-6BC4-C75C7A0B477E}"/>
-              </a:ext>
-            </a:extLst>
-          </p:cNvPr>
-          <p:cNvSpPr txBox="1"/>
-          <p:nvPr/>
-        </p:nvSpPr>
-        <p:spPr>
-          <a:xfrm>
-            <a:off x="5339930" y="6396333"/>
-            <a:ext cx="3267492" cy="307777"/>
-          </a:xfrm>
-          <a:prstGeom prst="rect">
-            <a:avLst/>
-          </a:prstGeom>
-          <a:noFill/>
-        </p:spPr>
-        <p:txBody>
-          <a:bodyPr wrap="square" rtlCol="0">
-            <a:spAutoFit/>
-          </a:bodyPr>
-          <a:lstStyle/>
-          <a:p>
-            <a:r>
-              <a:rPr lang="it-IT" dirty="0">
-                <a:solidFill>
-                  <a:schemeClr val="bg1"/>
-                </a:solidFill>
-              </a:rPr>
-              <a:t>Gabriel Rovesti - VerifiedMovies</a:t>
-            </a:r>
-          </a:p>
-        </p:txBody>
-      </p:sp>
-      <p:pic>
-        <p:nvPicPr>
-          <p:cNvPr id="4" name="Immagine 3">
-            <a:extLst>
-              <a:ext uri="{FF2B5EF4-FFF2-40B4-BE49-F238E27FC236}">
-                <a16:creationId xmlns:a16="http://schemas.microsoft.com/office/drawing/2014/main" id="{EA217CC8-78DB-5953-DFB9-5FE3913A339D}"/>
-              </a:ext>
-            </a:extLst>
-          </p:cNvPr>
-          <p:cNvPicPr>
-            <a:picLocks noChangeAspect="1"/>
-          </p:cNvPicPr>
-          <p:nvPr/>
-        </p:nvPicPr>
-        <p:blipFill>
-          <a:blip r:embed="rId3"/>
-          <a:stretch>
-            <a:fillRect/>
-          </a:stretch>
-        </p:blipFill>
-        <p:spPr>
-          <a:xfrm>
-            <a:off x="2099095" y="1056823"/>
-            <a:ext cx="4945809" cy="2080440"/>
-          </a:xfrm>
-          <a:prstGeom prst="rect">
-            <a:avLst/>
-          </a:prstGeom>
-        </p:spPr>
-      </p:pic>
-      <p:sp>
-        <p:nvSpPr>
-          <p:cNvPr id="5" name="CasellaDiTesto 4">
-            <a:extLst>
-              <a:ext uri="{FF2B5EF4-FFF2-40B4-BE49-F238E27FC236}">
-                <a16:creationId xmlns:a16="http://schemas.microsoft.com/office/drawing/2014/main" id="{4F81341A-03BB-842C-FDE5-DDB2BE11C067}"/>
-              </a:ext>
-            </a:extLst>
-          </p:cNvPr>
-          <p:cNvSpPr txBox="1"/>
-          <p:nvPr/>
-        </p:nvSpPr>
-        <p:spPr>
-          <a:xfrm>
-            <a:off x="565046" y="3137264"/>
-            <a:ext cx="8411378" cy="3001334"/>
-          </a:xfrm>
-          <a:prstGeom prst="rect">
-            <a:avLst/>
-          </a:prstGeom>
-          <a:noFill/>
-        </p:spPr>
-        <p:txBody>
-          <a:bodyPr wrap="square" rtlCol="0">
-            <a:spAutoFit/>
-          </a:bodyPr>
-          <a:lstStyle/>
-          <a:p>
-            <a:pPr marL="342900" indent="-342900">
-              <a:lnSpc>
-                <a:spcPct val="150000"/>
-              </a:lnSpc>
-              <a:buFont typeface="+mj-lt"/>
-              <a:buAutoNum type="arabicPeriod"/>
-            </a:pPr>
-            <a:r>
-              <a:rPr lang="it-IT" sz="1600" dirty="0"/>
-              <a:t>Creazione di una </a:t>
-            </a:r>
-            <a:r>
-              <a:rPr lang="it-IT" sz="1600" b="1" dirty="0"/>
-              <a:t>Verifiable Credential</a:t>
-            </a:r>
-            <a:r>
-              <a:rPr lang="it-IT" sz="1600" dirty="0"/>
-              <a:t> con i dati dell’utente e il </a:t>
-            </a:r>
-            <a:r>
-              <a:rPr lang="it-IT" sz="1600" b="1" dirty="0"/>
-              <a:t>Decentralized Identifier</a:t>
-            </a:r>
-            <a:r>
-              <a:rPr lang="it-IT" sz="1600" dirty="0"/>
-              <a:t> usato in fase di autenticazione</a:t>
-            </a:r>
-          </a:p>
-          <a:p>
-            <a:pPr marL="342900" indent="-342900">
-              <a:lnSpc>
-                <a:spcPct val="150000"/>
-              </a:lnSpc>
-              <a:buFont typeface="+mj-lt"/>
-              <a:buAutoNum type="arabicPeriod"/>
-            </a:pPr>
-            <a:endParaRPr lang="it-IT" sz="1600" dirty="0"/>
-          </a:p>
-          <a:p>
-            <a:pPr marL="342900" indent="-342900">
-              <a:lnSpc>
-                <a:spcPct val="150000"/>
-              </a:lnSpc>
-              <a:buFont typeface="+mj-lt"/>
-              <a:buAutoNum type="arabicPeriod"/>
-            </a:pPr>
-            <a:r>
-              <a:rPr lang="it-IT" sz="1600" dirty="0"/>
-              <a:t>Creazione di una </a:t>
-            </a:r>
-            <a:r>
-              <a:rPr lang="it-IT" sz="1600" b="1" dirty="0"/>
-              <a:t>Verifiable Presentation </a:t>
-            </a:r>
-            <a:r>
-              <a:rPr lang="it-IT" sz="1600" dirty="0"/>
-              <a:t>usando come prova di correttezza della credenziale presente lo schema </a:t>
-            </a:r>
-            <a:r>
-              <a:rPr lang="it-IT" sz="1600" i="1" dirty="0"/>
-              <a:t>CLSignature2019, </a:t>
-            </a:r>
-            <a:r>
-              <a:rPr lang="it-IT" sz="1600" dirty="0"/>
-              <a:t>utile per </a:t>
-            </a:r>
-            <a:r>
-              <a:rPr lang="it-IT" sz="1600" b="1" dirty="0"/>
-              <a:t>Zero Knowledge Proof</a:t>
-            </a:r>
-            <a:endParaRPr lang="it-IT" sz="1600" dirty="0"/>
-          </a:p>
-          <a:p>
-            <a:pPr marL="342900" indent="-342900">
-              <a:lnSpc>
-                <a:spcPct val="150000"/>
-              </a:lnSpc>
-              <a:buFont typeface="+mj-lt"/>
-              <a:buAutoNum type="arabicPeriod"/>
-            </a:pPr>
-            <a:endParaRPr lang="it-IT" sz="1600" dirty="0"/>
-          </a:p>
-          <a:p>
-            <a:pPr marL="342900" indent="-342900">
-              <a:lnSpc>
-                <a:spcPct val="150000"/>
-              </a:lnSpc>
-              <a:buFont typeface="+mj-lt"/>
-              <a:buAutoNum type="arabicPeriod"/>
-            </a:pPr>
-            <a:r>
-              <a:rPr lang="it-IT" sz="1600" dirty="0"/>
-              <a:t>Risoluzione delle firme digitali presenti e verifica della catena di fiducia usando </a:t>
-            </a:r>
-          </a:p>
-          <a:p>
-            <a:pPr>
-              <a:lnSpc>
-                <a:spcPct val="150000"/>
-              </a:lnSpc>
-            </a:pPr>
-            <a:r>
-              <a:rPr lang="it-IT" sz="1600" b="1" dirty="0"/>
-              <a:t>      Self Sovereign Identity</a:t>
-            </a:r>
-            <a:endParaRPr lang="it-IT" sz="1600" dirty="0"/>
-          </a:p>
-        </p:txBody>
-      </p:sp>
-    </p:spTree>
-    <p:extLst>
-      <p:ext uri="{BB962C8B-B14F-4D97-AF65-F5344CB8AC3E}">
-        <p14:creationId xmlns:p14="http://schemas.microsoft.com/office/powerpoint/2010/main" val="4093727288"/>
-      </p:ext>
-    </p:extLst>
-  </p:cSld>
-  <p:clrMapOvr>
-    <a:masterClrMapping/>
-  </p:clrMapOvr>
-</p:sld>
-</file>
-
-<file path=ppt/slides/slide14.xml><?xml version="1.0" encoding="utf-8"?>
-<p:sld xmlns:a="http://schemas.openxmlformats.org/drawingml/2006/main" xmlns:r="http://schemas.openxmlformats.org/officeDocument/2006/relationships" xmlns:p="http://schemas.openxmlformats.org/presentationml/2006/main">
-  <p:cSld>
-    <p:spTree>
-      <p:nvGrpSpPr>
-        <p:cNvPr id="1" name="Shape 98"/>
-        <p:cNvGrpSpPr/>
-        <p:nvPr/>
-      </p:nvGrpSpPr>
-      <p:grpSpPr>
-        <a:xfrm>
-          <a:off x="0" y="0"/>
-          <a:ext cx="0" cy="0"/>
-          <a:chOff x="0" y="0"/>
-          <a:chExt cx="0" cy="0"/>
-        </a:xfrm>
-      </p:grpSpPr>
-      <p:sp>
-        <p:nvSpPr>
-          <p:cNvPr id="99" name="Shape 99"/>
-          <p:cNvSpPr txBox="1">
-            <a:spLocks noGrp="1"/>
-          </p:cNvSpPr>
-          <p:nvPr>
-            <p:ph type="title" idx="4294967295"/>
-          </p:nvPr>
-        </p:nvSpPr>
-        <p:spPr>
-          <a:xfrm>
-            <a:off x="457200" y="-182567"/>
-            <a:ext cx="5213100" cy="1143300"/>
-          </a:xfrm>
-          <a:prstGeom prst="rect">
-            <a:avLst/>
-          </a:prstGeom>
-        </p:spPr>
-        <p:txBody>
-          <a:bodyPr spcFirstLastPara="1" wrap="square" lIns="82925" tIns="82925" rIns="82925" bIns="82925" anchor="ctr" anchorCtr="0">
-            <a:noAutofit/>
-          </a:bodyPr>
-          <a:lstStyle/>
-          <a:p>
-            <a:pPr marL="0" lvl="0" indent="0" rtl="0">
-              <a:spcBef>
-                <a:spcPts val="0"/>
-              </a:spcBef>
-              <a:spcAft>
-                <a:spcPts val="0"/>
-              </a:spcAft>
-              <a:buNone/>
-            </a:pPr>
-            <a:r>
-              <a:rPr lang="it-IT" sz="3000" dirty="0">
-                <a:solidFill>
-                  <a:srgbClr val="FFFFFF"/>
-                </a:solidFill>
-              </a:rPr>
-              <a:t>Tecnologie del progetto</a:t>
-            </a:r>
-            <a:endParaRPr sz="3000" dirty="0">
-              <a:solidFill>
-                <a:srgbClr val="FFFFFF"/>
-              </a:solidFill>
-            </a:endParaRPr>
-          </a:p>
-        </p:txBody>
-      </p:sp>
-      <p:sp>
-        <p:nvSpPr>
-          <p:cNvPr id="101" name="Shape 101"/>
-          <p:cNvSpPr/>
-          <p:nvPr/>
-        </p:nvSpPr>
-        <p:spPr>
-          <a:xfrm>
-            <a:off x="7976212" y="6479700"/>
-            <a:ext cx="710588" cy="378300"/>
-          </a:xfrm>
-          <a:prstGeom prst="rect">
-            <a:avLst/>
-          </a:prstGeom>
-          <a:solidFill>
-            <a:srgbClr val="9B0014"/>
-          </a:solidFill>
-          <a:ln>
-            <a:noFill/>
-          </a:ln>
-        </p:spPr>
-        <p:txBody>
-          <a:bodyPr spcFirstLastPara="1" wrap="square" lIns="91425" tIns="91425" rIns="91425" bIns="91425" anchor="ctr" anchorCtr="0">
-            <a:noAutofit/>
-          </a:bodyPr>
-          <a:lstStyle/>
-          <a:p>
-            <a:pPr marL="0" lvl="0" indent="0">
-              <a:spcBef>
-                <a:spcPts val="0"/>
-              </a:spcBef>
-              <a:spcAft>
-                <a:spcPts val="0"/>
-              </a:spcAft>
-              <a:buNone/>
-            </a:pPr>
-            <a:endParaRPr/>
-          </a:p>
-        </p:txBody>
-      </p:sp>
-      <p:sp>
-        <p:nvSpPr>
-          <p:cNvPr id="2" name="CasellaDiTesto 1">
-            <a:extLst>
-              <a:ext uri="{FF2B5EF4-FFF2-40B4-BE49-F238E27FC236}">
-                <a16:creationId xmlns:a16="http://schemas.microsoft.com/office/drawing/2014/main" id="{ADC0F51E-4553-1FA2-DDDB-E5BC3CE52270}"/>
-              </a:ext>
-            </a:extLst>
-          </p:cNvPr>
-          <p:cNvSpPr txBox="1"/>
-          <p:nvPr/>
-        </p:nvSpPr>
-        <p:spPr>
-          <a:xfrm>
-            <a:off x="8368796" y="6396334"/>
-            <a:ext cx="914400" cy="307777"/>
-          </a:xfrm>
-          <a:prstGeom prst="rect">
-            <a:avLst/>
-          </a:prstGeom>
-          <a:noFill/>
-        </p:spPr>
-        <p:txBody>
-          <a:bodyPr wrap="square" rtlCol="0">
-            <a:spAutoFit/>
-          </a:bodyPr>
-          <a:lstStyle/>
-          <a:p>
-            <a:r>
-              <a:rPr lang="it-IT" dirty="0">
-                <a:solidFill>
-                  <a:schemeClr val="bg1"/>
-                </a:solidFill>
-              </a:rPr>
-              <a:t>14 / 15</a:t>
             </a:r>
           </a:p>
         </p:txBody>
@@ -11308,6 +10534,754 @@
 </p:sld>
 </file>
 
+<file path=ppt/slides/slide13.xml><?xml version="1.0" encoding="utf-8"?>
+<p:sld xmlns:a="http://schemas.openxmlformats.org/drawingml/2006/main" xmlns:r="http://schemas.openxmlformats.org/officeDocument/2006/relationships" xmlns:p="http://schemas.openxmlformats.org/presentationml/2006/main">
+  <p:cSld>
+    <p:spTree>
+      <p:nvGrpSpPr>
+        <p:cNvPr id="1" name="Shape 98"/>
+        <p:cNvGrpSpPr/>
+        <p:nvPr/>
+      </p:nvGrpSpPr>
+      <p:grpSpPr>
+        <a:xfrm>
+          <a:off x="0" y="0"/>
+          <a:ext cx="0" cy="0"/>
+          <a:chOff x="0" y="0"/>
+          <a:chExt cx="0" cy="0"/>
+        </a:xfrm>
+      </p:grpSpPr>
+      <p:sp>
+        <p:nvSpPr>
+          <p:cNvPr id="99" name="Shape 99"/>
+          <p:cNvSpPr txBox="1">
+            <a:spLocks noGrp="1"/>
+          </p:cNvSpPr>
+          <p:nvPr>
+            <p:ph type="title" idx="4294967295"/>
+          </p:nvPr>
+        </p:nvSpPr>
+        <p:spPr>
+          <a:xfrm>
+            <a:off x="457199" y="-182567"/>
+            <a:ext cx="6053769" cy="1143300"/>
+          </a:xfrm>
+          <a:prstGeom prst="rect">
+            <a:avLst/>
+          </a:prstGeom>
+        </p:spPr>
+        <p:txBody>
+          <a:bodyPr spcFirstLastPara="1" wrap="square" lIns="82925" tIns="82925" rIns="82925" bIns="82925" anchor="ctr" anchorCtr="0">
+            <a:noAutofit/>
+          </a:bodyPr>
+          <a:lstStyle/>
+          <a:p>
+            <a:pPr marL="0" lvl="0" indent="0" rtl="0">
+              <a:spcBef>
+                <a:spcPts val="0"/>
+              </a:spcBef>
+              <a:spcAft>
+                <a:spcPts val="0"/>
+              </a:spcAft>
+              <a:buNone/>
+            </a:pPr>
+            <a:r>
+              <a:rPr lang="it-IT" sz="3000" dirty="0">
+                <a:solidFill>
+                  <a:srgbClr val="FFFFFF"/>
+                </a:solidFill>
+              </a:rPr>
+              <a:t>Le caratteristiche del progetto</a:t>
+            </a:r>
+            <a:endParaRPr sz="3000" dirty="0">
+              <a:solidFill>
+                <a:srgbClr val="FFFFFF"/>
+              </a:solidFill>
+            </a:endParaRPr>
+          </a:p>
+        </p:txBody>
+      </p:sp>
+      <p:sp>
+        <p:nvSpPr>
+          <p:cNvPr id="101" name="Shape 101"/>
+          <p:cNvSpPr/>
+          <p:nvPr/>
+        </p:nvSpPr>
+        <p:spPr>
+          <a:xfrm>
+            <a:off x="7772400" y="6479700"/>
+            <a:ext cx="914400" cy="378300"/>
+          </a:xfrm>
+          <a:prstGeom prst="rect">
+            <a:avLst/>
+          </a:prstGeom>
+          <a:solidFill>
+            <a:srgbClr val="9B0014"/>
+          </a:solidFill>
+          <a:ln>
+            <a:noFill/>
+          </a:ln>
+        </p:spPr>
+        <p:txBody>
+          <a:bodyPr spcFirstLastPara="1" wrap="square" lIns="91425" tIns="91425" rIns="91425" bIns="91425" anchor="ctr" anchorCtr="0">
+            <a:noAutofit/>
+          </a:bodyPr>
+          <a:lstStyle/>
+          <a:p>
+            <a:pPr marL="0" lvl="0" indent="0">
+              <a:spcBef>
+                <a:spcPts val="0"/>
+              </a:spcBef>
+              <a:spcAft>
+                <a:spcPts val="0"/>
+              </a:spcAft>
+              <a:buNone/>
+            </a:pPr>
+            <a:endParaRPr/>
+          </a:p>
+        </p:txBody>
+      </p:sp>
+      <p:sp>
+        <p:nvSpPr>
+          <p:cNvPr id="2" name="CasellaDiTesto 1">
+            <a:extLst>
+              <a:ext uri="{FF2B5EF4-FFF2-40B4-BE49-F238E27FC236}">
+                <a16:creationId xmlns:a16="http://schemas.microsoft.com/office/drawing/2014/main" id="{ADC0F51E-4553-1FA2-DDDB-E5BC3CE52270}"/>
+              </a:ext>
+            </a:extLst>
+          </p:cNvPr>
+          <p:cNvSpPr txBox="1"/>
+          <p:nvPr/>
+        </p:nvSpPr>
+        <p:spPr>
+          <a:xfrm>
+            <a:off x="8368796" y="6396334"/>
+            <a:ext cx="914400" cy="307777"/>
+          </a:xfrm>
+          <a:prstGeom prst="rect">
+            <a:avLst/>
+          </a:prstGeom>
+          <a:noFill/>
+        </p:spPr>
+        <p:txBody>
+          <a:bodyPr wrap="square" rtlCol="0">
+            <a:spAutoFit/>
+          </a:bodyPr>
+          <a:lstStyle/>
+          <a:p>
+            <a:r>
+              <a:rPr lang="it-IT" dirty="0">
+                <a:solidFill>
+                  <a:schemeClr val="bg1"/>
+                </a:solidFill>
+              </a:rPr>
+              <a:t>13 / 15</a:t>
+            </a:r>
+          </a:p>
+        </p:txBody>
+      </p:sp>
+      <p:sp>
+        <p:nvSpPr>
+          <p:cNvPr id="11" name="CasellaDiTesto 10">
+            <a:extLst>
+              <a:ext uri="{FF2B5EF4-FFF2-40B4-BE49-F238E27FC236}">
+                <a16:creationId xmlns:a16="http://schemas.microsoft.com/office/drawing/2014/main" id="{F491E27B-1C39-7BE6-6BC4-C75C7A0B477E}"/>
+              </a:ext>
+            </a:extLst>
+          </p:cNvPr>
+          <p:cNvSpPr txBox="1"/>
+          <p:nvPr/>
+        </p:nvSpPr>
+        <p:spPr>
+          <a:xfrm>
+            <a:off x="5339930" y="6396333"/>
+            <a:ext cx="3267492" cy="307777"/>
+          </a:xfrm>
+          <a:prstGeom prst="rect">
+            <a:avLst/>
+          </a:prstGeom>
+          <a:noFill/>
+        </p:spPr>
+        <p:txBody>
+          <a:bodyPr wrap="square" rtlCol="0">
+            <a:spAutoFit/>
+          </a:bodyPr>
+          <a:lstStyle/>
+          <a:p>
+            <a:r>
+              <a:rPr lang="it-IT" dirty="0">
+                <a:solidFill>
+                  <a:schemeClr val="bg1"/>
+                </a:solidFill>
+              </a:rPr>
+              <a:t>Gabriel Rovesti - VerifiedMovies</a:t>
+            </a:r>
+          </a:p>
+        </p:txBody>
+      </p:sp>
+      <p:sp>
+        <p:nvSpPr>
+          <p:cNvPr id="12" name="CasellaDiTesto 11">
+            <a:extLst>
+              <a:ext uri="{FF2B5EF4-FFF2-40B4-BE49-F238E27FC236}">
+                <a16:creationId xmlns:a16="http://schemas.microsoft.com/office/drawing/2014/main" id="{C5DF3E3C-D423-9AA2-3150-1F49E451CE59}"/>
+              </a:ext>
+            </a:extLst>
+          </p:cNvPr>
+          <p:cNvSpPr txBox="1"/>
+          <p:nvPr/>
+        </p:nvSpPr>
+        <p:spPr>
+          <a:xfrm>
+            <a:off x="349945" y="2665208"/>
+            <a:ext cx="8444101" cy="3370666"/>
+          </a:xfrm>
+          <a:prstGeom prst="rect">
+            <a:avLst/>
+          </a:prstGeom>
+          <a:noFill/>
+        </p:spPr>
+        <p:txBody>
+          <a:bodyPr wrap="square" rtlCol="0">
+            <a:spAutoFit/>
+          </a:bodyPr>
+          <a:lstStyle/>
+          <a:p>
+            <a:pPr marL="285750" indent="-285750" algn="just">
+              <a:lnSpc>
+                <a:spcPct val="150000"/>
+              </a:lnSpc>
+              <a:buFont typeface="Arial" panose="020B0604020202020204" pitchFamily="34" charset="0"/>
+              <a:buChar char="•"/>
+            </a:pPr>
+            <a:r>
+              <a:rPr lang="it-IT" sz="1600" dirty="0"/>
+              <a:t>Registrazione e login basate su un meccanismo </a:t>
+            </a:r>
+          </a:p>
+          <a:p>
+            <a:pPr algn="just">
+              <a:lnSpc>
+                <a:spcPct val="150000"/>
+              </a:lnSpc>
+            </a:pPr>
+            <a:r>
+              <a:rPr lang="it-IT" sz="1600" i="1" dirty="0"/>
+              <a:t>     challenge-response </a:t>
+            </a:r>
+            <a:r>
+              <a:rPr lang="it-IT" sz="1600" dirty="0"/>
+              <a:t>per associare all’utente un </a:t>
+            </a:r>
+            <a:r>
+              <a:rPr lang="it-IT" sz="1600" b="1" dirty="0"/>
+              <a:t>Decentralized Identifier</a:t>
+            </a:r>
+            <a:r>
+              <a:rPr lang="it-IT" sz="1600" dirty="0"/>
+              <a:t> </a:t>
+            </a:r>
+          </a:p>
+          <a:p>
+            <a:pPr algn="just">
+              <a:lnSpc>
+                <a:spcPct val="150000"/>
+              </a:lnSpc>
+            </a:pPr>
+            <a:r>
+              <a:rPr lang="it-IT" sz="1600" dirty="0"/>
+              <a:t>     firmato con la propria chiave privata</a:t>
+            </a:r>
+          </a:p>
+          <a:p>
+            <a:pPr algn="just">
+              <a:lnSpc>
+                <a:spcPct val="150000"/>
+              </a:lnSpc>
+            </a:pPr>
+            <a:endParaRPr lang="it-IT" sz="1600" i="1" dirty="0"/>
+          </a:p>
+          <a:p>
+            <a:pPr marL="285750" indent="-285750" algn="just">
+              <a:lnSpc>
+                <a:spcPct val="150000"/>
+              </a:lnSpc>
+              <a:buFont typeface="Arial" panose="020B0604020202020204" pitchFamily="34" charset="0"/>
+              <a:buChar char="•"/>
+            </a:pPr>
+            <a:r>
+              <a:rPr lang="it-IT" sz="1600" dirty="0"/>
+              <a:t>Implementazione della «catena di fiducia» e applicazione di </a:t>
+            </a:r>
+            <a:r>
+              <a:rPr lang="it-IT" sz="1600" b="1" dirty="0"/>
+              <a:t>Self Sovereign Identity</a:t>
+            </a:r>
+            <a:r>
+              <a:rPr lang="it-IT" sz="1600" dirty="0"/>
+              <a:t> usando lo </a:t>
+            </a:r>
+            <a:r>
+              <a:rPr lang="it-IT" sz="1600" i="1" dirty="0"/>
+              <a:t>smart contract </a:t>
+            </a:r>
+            <a:r>
+              <a:rPr lang="it-IT" sz="1600" dirty="0"/>
+              <a:t>del laureando magistrale presso Ca’ Foscari Alessio de Biasi</a:t>
+            </a:r>
+          </a:p>
+          <a:p>
+            <a:pPr algn="just">
+              <a:lnSpc>
+                <a:spcPct val="150000"/>
+              </a:lnSpc>
+            </a:pPr>
+            <a:endParaRPr lang="it-IT" sz="1600" i="1" dirty="0"/>
+          </a:p>
+          <a:p>
+            <a:pPr marL="285750" indent="-285750" algn="just">
+              <a:lnSpc>
+                <a:spcPct val="150000"/>
+              </a:lnSpc>
+              <a:buFont typeface="Arial" panose="020B0604020202020204" pitchFamily="34" charset="0"/>
+              <a:buChar char="•"/>
+            </a:pPr>
+            <a:r>
+              <a:rPr lang="it-IT" sz="1600" dirty="0"/>
+              <a:t>Meccanismo di verifica dell’età dell’utente in base ai limiti d’età del singolo film basato sulla presentazione di credenziali con </a:t>
+            </a:r>
+            <a:r>
+              <a:rPr lang="it-IT" sz="1600" b="1" dirty="0"/>
+              <a:t>Zero Knowledge Proof</a:t>
+            </a:r>
+            <a:endParaRPr lang="it-IT" sz="1600" dirty="0"/>
+          </a:p>
+        </p:txBody>
+      </p:sp>
+      <p:pic>
+        <p:nvPicPr>
+          <p:cNvPr id="3" name="Immagine 2" descr="Immagine che contiene testo, Carattere, logo, schermata&#10;&#10;Descrizione generata automaticamente">
+            <a:extLst>
+              <a:ext uri="{FF2B5EF4-FFF2-40B4-BE49-F238E27FC236}">
+                <a16:creationId xmlns:a16="http://schemas.microsoft.com/office/drawing/2014/main" id="{5D45E86E-072D-87D3-D6AA-4D89B2303C13}"/>
+              </a:ext>
+            </a:extLst>
+          </p:cNvPr>
+          <p:cNvPicPr>
+            <a:picLocks noChangeAspect="1"/>
+          </p:cNvPicPr>
+          <p:nvPr/>
+        </p:nvPicPr>
+        <p:blipFill>
+          <a:blip r:embed="rId3"/>
+          <a:stretch>
+            <a:fillRect/>
+          </a:stretch>
+        </p:blipFill>
+        <p:spPr>
+          <a:xfrm>
+            <a:off x="3398191" y="960733"/>
+            <a:ext cx="2347607" cy="1414541"/>
+          </a:xfrm>
+          <a:prstGeom prst="round2DiagRect">
+            <a:avLst>
+              <a:gd name="adj1" fmla="val 16667"/>
+              <a:gd name="adj2" fmla="val 0"/>
+            </a:avLst>
+          </a:prstGeom>
+          <a:ln w="88900" cap="sq">
+            <a:solidFill>
+              <a:srgbClr val="FFFFFF"/>
+            </a:solidFill>
+            <a:miter lim="800000"/>
+          </a:ln>
+          <a:effectLst>
+            <a:outerShdw blurRad="254000" algn="tl" rotWithShape="0">
+              <a:srgbClr val="000000">
+                <a:alpha val="43000"/>
+              </a:srgbClr>
+            </a:outerShdw>
+          </a:effectLst>
+        </p:spPr>
+      </p:pic>
+    </p:spTree>
+    <p:extLst>
+      <p:ext uri="{BB962C8B-B14F-4D97-AF65-F5344CB8AC3E}">
+        <p14:creationId xmlns:p14="http://schemas.microsoft.com/office/powerpoint/2010/main" val="1213906835"/>
+      </p:ext>
+    </p:extLst>
+  </p:cSld>
+  <p:clrMapOvr>
+    <a:masterClrMapping/>
+  </p:clrMapOvr>
+</p:sld>
+</file>
+
+<file path=ppt/slides/slide14.xml><?xml version="1.0" encoding="utf-8"?>
+<p:sld xmlns:a="http://schemas.openxmlformats.org/drawingml/2006/main" xmlns:r="http://schemas.openxmlformats.org/officeDocument/2006/relationships" xmlns:p="http://schemas.openxmlformats.org/presentationml/2006/main">
+  <p:cSld>
+    <p:spTree>
+      <p:nvGrpSpPr>
+        <p:cNvPr id="1" name="Shape 98"/>
+        <p:cNvGrpSpPr/>
+        <p:nvPr/>
+      </p:nvGrpSpPr>
+      <p:grpSpPr>
+        <a:xfrm>
+          <a:off x="0" y="0"/>
+          <a:ext cx="0" cy="0"/>
+          <a:chOff x="0" y="0"/>
+          <a:chExt cx="0" cy="0"/>
+        </a:xfrm>
+      </p:grpSpPr>
+      <p:sp>
+        <p:nvSpPr>
+          <p:cNvPr id="99" name="Shape 99"/>
+          <p:cNvSpPr txBox="1">
+            <a:spLocks noGrp="1"/>
+          </p:cNvSpPr>
+          <p:nvPr>
+            <p:ph type="title" idx="4294967295"/>
+          </p:nvPr>
+        </p:nvSpPr>
+        <p:spPr>
+          <a:xfrm>
+            <a:off x="457200" y="-182567"/>
+            <a:ext cx="5213100" cy="1143300"/>
+          </a:xfrm>
+          <a:prstGeom prst="rect">
+            <a:avLst/>
+          </a:prstGeom>
+        </p:spPr>
+        <p:txBody>
+          <a:bodyPr spcFirstLastPara="1" wrap="square" lIns="82925" tIns="82925" rIns="82925" bIns="82925" anchor="ctr" anchorCtr="0">
+            <a:noAutofit/>
+          </a:bodyPr>
+          <a:lstStyle/>
+          <a:p>
+            <a:pPr marL="0" lvl="0" indent="0" rtl="0">
+              <a:spcBef>
+                <a:spcPts val="0"/>
+              </a:spcBef>
+              <a:spcAft>
+                <a:spcPts val="0"/>
+              </a:spcAft>
+              <a:buNone/>
+            </a:pPr>
+            <a:r>
+              <a:rPr lang="it-IT" sz="3000" dirty="0">
+                <a:solidFill>
+                  <a:srgbClr val="FFFFFF"/>
+                </a:solidFill>
+              </a:rPr>
+              <a:t>Verifica dell’età</a:t>
+            </a:r>
+            <a:endParaRPr sz="3000" dirty="0">
+              <a:solidFill>
+                <a:srgbClr val="FFFFFF"/>
+              </a:solidFill>
+            </a:endParaRPr>
+          </a:p>
+        </p:txBody>
+      </p:sp>
+      <p:sp>
+        <p:nvSpPr>
+          <p:cNvPr id="101" name="Shape 101"/>
+          <p:cNvSpPr/>
+          <p:nvPr/>
+        </p:nvSpPr>
+        <p:spPr>
+          <a:xfrm>
+            <a:off x="7772400" y="6479700"/>
+            <a:ext cx="914400" cy="378300"/>
+          </a:xfrm>
+          <a:prstGeom prst="rect">
+            <a:avLst/>
+          </a:prstGeom>
+          <a:solidFill>
+            <a:srgbClr val="9B0014"/>
+          </a:solidFill>
+          <a:ln>
+            <a:noFill/>
+          </a:ln>
+        </p:spPr>
+        <p:txBody>
+          <a:bodyPr spcFirstLastPara="1" wrap="square" lIns="91425" tIns="91425" rIns="91425" bIns="91425" anchor="ctr" anchorCtr="0">
+            <a:noAutofit/>
+          </a:bodyPr>
+          <a:lstStyle/>
+          <a:p>
+            <a:pPr marL="0" lvl="0" indent="0">
+              <a:spcBef>
+                <a:spcPts val="0"/>
+              </a:spcBef>
+              <a:spcAft>
+                <a:spcPts val="0"/>
+              </a:spcAft>
+              <a:buNone/>
+            </a:pPr>
+            <a:endParaRPr/>
+          </a:p>
+        </p:txBody>
+      </p:sp>
+      <p:sp>
+        <p:nvSpPr>
+          <p:cNvPr id="2" name="CasellaDiTesto 1">
+            <a:extLst>
+              <a:ext uri="{FF2B5EF4-FFF2-40B4-BE49-F238E27FC236}">
+                <a16:creationId xmlns:a16="http://schemas.microsoft.com/office/drawing/2014/main" id="{ADC0F51E-4553-1FA2-DDDB-E5BC3CE52270}"/>
+              </a:ext>
+            </a:extLst>
+          </p:cNvPr>
+          <p:cNvSpPr txBox="1"/>
+          <p:nvPr/>
+        </p:nvSpPr>
+        <p:spPr>
+          <a:xfrm>
+            <a:off x="8368796" y="6396334"/>
+            <a:ext cx="914400" cy="307777"/>
+          </a:xfrm>
+          <a:prstGeom prst="rect">
+            <a:avLst/>
+          </a:prstGeom>
+          <a:noFill/>
+        </p:spPr>
+        <p:txBody>
+          <a:bodyPr wrap="square" rtlCol="0">
+            <a:spAutoFit/>
+          </a:bodyPr>
+          <a:lstStyle/>
+          <a:p>
+            <a:r>
+              <a:rPr lang="it-IT" dirty="0">
+                <a:solidFill>
+                  <a:schemeClr val="bg1"/>
+                </a:solidFill>
+              </a:rPr>
+              <a:t>14 / 15</a:t>
+            </a:r>
+          </a:p>
+        </p:txBody>
+      </p:sp>
+      <p:sp>
+        <p:nvSpPr>
+          <p:cNvPr id="11" name="CasellaDiTesto 10">
+            <a:extLst>
+              <a:ext uri="{FF2B5EF4-FFF2-40B4-BE49-F238E27FC236}">
+                <a16:creationId xmlns:a16="http://schemas.microsoft.com/office/drawing/2014/main" id="{F491E27B-1C39-7BE6-6BC4-C75C7A0B477E}"/>
+              </a:ext>
+            </a:extLst>
+          </p:cNvPr>
+          <p:cNvSpPr txBox="1"/>
+          <p:nvPr/>
+        </p:nvSpPr>
+        <p:spPr>
+          <a:xfrm>
+            <a:off x="5339930" y="6396333"/>
+            <a:ext cx="3267492" cy="307777"/>
+          </a:xfrm>
+          <a:prstGeom prst="rect">
+            <a:avLst/>
+          </a:prstGeom>
+          <a:noFill/>
+        </p:spPr>
+        <p:txBody>
+          <a:bodyPr wrap="square" rtlCol="0">
+            <a:spAutoFit/>
+          </a:bodyPr>
+          <a:lstStyle/>
+          <a:p>
+            <a:r>
+              <a:rPr lang="it-IT" dirty="0">
+                <a:solidFill>
+                  <a:schemeClr val="bg1"/>
+                </a:solidFill>
+              </a:rPr>
+              <a:t>Gabriel Rovesti - VerifiedMovies</a:t>
+            </a:r>
+          </a:p>
+        </p:txBody>
+      </p:sp>
+      <p:pic>
+        <p:nvPicPr>
+          <p:cNvPr id="4" name="Immagine 3">
+            <a:extLst>
+              <a:ext uri="{FF2B5EF4-FFF2-40B4-BE49-F238E27FC236}">
+                <a16:creationId xmlns:a16="http://schemas.microsoft.com/office/drawing/2014/main" id="{EA217CC8-78DB-5953-DFB9-5FE3913A339D}"/>
+              </a:ext>
+            </a:extLst>
+          </p:cNvPr>
+          <p:cNvPicPr>
+            <a:picLocks noChangeAspect="1"/>
+          </p:cNvPicPr>
+          <p:nvPr/>
+        </p:nvPicPr>
+        <p:blipFill>
+          <a:blip r:embed="rId3"/>
+          <a:stretch>
+            <a:fillRect/>
+          </a:stretch>
+        </p:blipFill>
+        <p:spPr>
+          <a:xfrm>
+            <a:off x="2099095" y="1056823"/>
+            <a:ext cx="4945809" cy="2080440"/>
+          </a:xfrm>
+          <a:prstGeom prst="rect">
+            <a:avLst/>
+          </a:prstGeom>
+        </p:spPr>
+      </p:pic>
+      <p:sp>
+        <p:nvSpPr>
+          <p:cNvPr id="5" name="CasellaDiTesto 4">
+            <a:extLst>
+              <a:ext uri="{FF2B5EF4-FFF2-40B4-BE49-F238E27FC236}">
+                <a16:creationId xmlns:a16="http://schemas.microsoft.com/office/drawing/2014/main" id="{4F81341A-03BB-842C-FDE5-DDB2BE11C067}"/>
+              </a:ext>
+            </a:extLst>
+          </p:cNvPr>
+          <p:cNvSpPr txBox="1"/>
+          <p:nvPr/>
+        </p:nvSpPr>
+        <p:spPr>
+          <a:xfrm>
+            <a:off x="534901" y="3137263"/>
+            <a:ext cx="8411378" cy="3001334"/>
+          </a:xfrm>
+          <a:prstGeom prst="rect">
+            <a:avLst/>
+          </a:prstGeom>
+          <a:noFill/>
+        </p:spPr>
+        <p:txBody>
+          <a:bodyPr wrap="square" rtlCol="0">
+            <a:spAutoFit/>
+          </a:bodyPr>
+          <a:lstStyle/>
+          <a:p>
+            <a:pPr marL="342900" indent="-342900" algn="just">
+              <a:lnSpc>
+                <a:spcPct val="150000"/>
+              </a:lnSpc>
+              <a:buFont typeface="+mj-lt"/>
+              <a:buAutoNum type="arabicPeriod"/>
+            </a:pPr>
+            <a:r>
+              <a:rPr lang="it-IT" sz="1600" dirty="0"/>
+              <a:t>Creazione di una </a:t>
+            </a:r>
+            <a:r>
+              <a:rPr lang="it-IT" sz="1600" b="1" dirty="0"/>
+              <a:t>Verifiable Credential</a:t>
+            </a:r>
+            <a:r>
+              <a:rPr lang="it-IT" sz="1600" dirty="0"/>
+              <a:t> con i dati dell’utente e il </a:t>
+            </a:r>
+            <a:r>
+              <a:rPr lang="it-IT" sz="1600" b="1" dirty="0"/>
+              <a:t>Decentralized Identifier</a:t>
+            </a:r>
+            <a:r>
+              <a:rPr lang="it-IT" sz="1600" dirty="0"/>
+              <a:t> usato in fase di autenticazione</a:t>
+            </a:r>
+          </a:p>
+          <a:p>
+            <a:pPr marL="342900" indent="-342900" algn="just">
+              <a:lnSpc>
+                <a:spcPct val="150000"/>
+              </a:lnSpc>
+              <a:buFont typeface="+mj-lt"/>
+              <a:buAutoNum type="arabicPeriod"/>
+            </a:pPr>
+            <a:endParaRPr lang="it-IT" sz="1600" dirty="0"/>
+          </a:p>
+          <a:p>
+            <a:pPr marL="342900" indent="-342900" algn="just">
+              <a:lnSpc>
+                <a:spcPct val="150000"/>
+              </a:lnSpc>
+              <a:buFont typeface="+mj-lt"/>
+              <a:buAutoNum type="arabicPeriod"/>
+            </a:pPr>
+            <a:r>
+              <a:rPr lang="it-IT" sz="1600" dirty="0"/>
+              <a:t>Creazione di una </a:t>
+            </a:r>
+            <a:r>
+              <a:rPr lang="it-IT" sz="1600" b="1" dirty="0"/>
+              <a:t>Verifiable Presentation </a:t>
+            </a:r>
+            <a:r>
+              <a:rPr lang="it-IT" sz="1600" dirty="0"/>
+              <a:t>usando come prova di correttezza della credenziale presente lo schema </a:t>
+            </a:r>
+            <a:r>
+              <a:rPr lang="it-IT" sz="1600" i="1" dirty="0"/>
+              <a:t>CLSignature2019, </a:t>
+            </a:r>
+            <a:r>
+              <a:rPr lang="it-IT" sz="1600" dirty="0"/>
+              <a:t>utile per </a:t>
+            </a:r>
+            <a:r>
+              <a:rPr lang="it-IT" sz="1600" b="1" dirty="0"/>
+              <a:t>Zero Knowledge Proof</a:t>
+            </a:r>
+            <a:endParaRPr lang="it-IT" sz="1600" dirty="0"/>
+          </a:p>
+          <a:p>
+            <a:pPr marL="342900" indent="-342900" algn="just">
+              <a:lnSpc>
+                <a:spcPct val="150000"/>
+              </a:lnSpc>
+              <a:buFont typeface="+mj-lt"/>
+              <a:buAutoNum type="arabicPeriod"/>
+            </a:pPr>
+            <a:endParaRPr lang="it-IT" sz="1600" dirty="0"/>
+          </a:p>
+          <a:p>
+            <a:pPr marL="342900" indent="-342900" algn="just">
+              <a:lnSpc>
+                <a:spcPct val="150000"/>
+              </a:lnSpc>
+              <a:buFont typeface="+mj-lt"/>
+              <a:buAutoNum type="arabicPeriod"/>
+            </a:pPr>
+            <a:r>
+              <a:rPr lang="it-IT" sz="1600" dirty="0"/>
+              <a:t>Risoluzione delle firme digitali presenti e verifica della catena di fiducia usando </a:t>
+            </a:r>
+          </a:p>
+          <a:p>
+            <a:pPr algn="just">
+              <a:lnSpc>
+                <a:spcPct val="150000"/>
+              </a:lnSpc>
+            </a:pPr>
+            <a:r>
+              <a:rPr lang="it-IT" sz="1600" b="1" dirty="0"/>
+              <a:t>      Self Sovereign Identity</a:t>
+            </a:r>
+            <a:endParaRPr lang="it-IT" sz="1600" dirty="0"/>
+          </a:p>
+        </p:txBody>
+      </p:sp>
+    </p:spTree>
+    <p:extLst>
+      <p:ext uri="{BB962C8B-B14F-4D97-AF65-F5344CB8AC3E}">
+        <p14:creationId xmlns:p14="http://schemas.microsoft.com/office/powerpoint/2010/main" val="4093727288"/>
+      </p:ext>
+    </p:extLst>
+  </p:cSld>
+  <p:clrMapOvr>
+    <a:masterClrMapping/>
+  </p:clrMapOvr>
+</p:sld>
+</file>
+
 <file path=ppt/slides/slide15.xml><?xml version="1.0" encoding="utf-8"?>
 <p:sld xmlns:a="http://schemas.openxmlformats.org/drawingml/2006/main" xmlns:r="http://schemas.openxmlformats.org/officeDocument/2006/relationships" xmlns:p="http://schemas.openxmlformats.org/presentationml/2006/main">
   <p:cSld>
@@ -11507,7 +11481,7 @@
         </p:nvSpPr>
         <p:spPr>
           <a:xfrm>
-            <a:off x="414618" y="1223907"/>
+            <a:off x="457200" y="1438566"/>
             <a:ext cx="8411378" cy="4196020"/>
           </a:xfrm>
           <a:prstGeom prst="rect">
@@ -11521,7 +11495,7 @@
           </a:bodyPr>
           <a:lstStyle/>
           <a:p>
-            <a:pPr>
+            <a:pPr algn="just">
               <a:lnSpc>
                 <a:spcPct val="150000"/>
               </a:lnSpc>
@@ -11532,7 +11506,7 @@
             </a:r>
           </a:p>
           <a:p>
-            <a:pPr marL="285750" indent="-285750">
+            <a:pPr marL="285750" indent="-285750" algn="just">
               <a:lnSpc>
                 <a:spcPct val="150000"/>
               </a:lnSpc>
@@ -11541,11 +11515,11 @@
             </a:pPr>
             <a:r>
               <a:rPr lang="it-IT" sz="1800" dirty="0"/>
-              <a:t>Soddisfazione totale degli obiettivi obbligatori e desiderabili</a:t>
-            </a:r>
-          </a:p>
-          <a:p>
-            <a:pPr marL="285750" indent="-285750">
+              <a:t>Studio approfondito di blockchain e degli standard di identità digitale</a:t>
+            </a:r>
+          </a:p>
+          <a:p>
+            <a:pPr marL="285750" indent="-285750" algn="just">
               <a:lnSpc>
                 <a:spcPct val="150000"/>
               </a:lnSpc>
@@ -11566,7 +11540,7 @@
             </a:r>
           </a:p>
           <a:p>
-            <a:pPr>
+            <a:pPr algn="just">
               <a:lnSpc>
                 <a:spcPct val="150000"/>
               </a:lnSpc>
@@ -11589,7 +11563,7 @@
             </a:r>
           </a:p>
           <a:p>
-            <a:pPr marL="285750" indent="-285750">
+            <a:pPr marL="285750" indent="-285750" algn="just">
               <a:lnSpc>
                 <a:spcPct val="150000"/>
               </a:lnSpc>
@@ -11599,7 +11573,7 @@
             <a:endParaRPr lang="it-IT" sz="1800" dirty="0"/>
           </a:p>
           <a:p>
-            <a:pPr>
+            <a:pPr algn="just">
               <a:lnSpc>
                 <a:spcPct val="150000"/>
               </a:lnSpc>
@@ -11610,7 +11584,7 @@
             </a:r>
           </a:p>
           <a:p>
-            <a:pPr marL="285750" indent="-285750">
+            <a:pPr marL="285750" indent="-285750" algn="just">
               <a:lnSpc>
                 <a:spcPct val="150000"/>
               </a:lnSpc>
@@ -11623,7 +11597,7 @@
             </a:r>
           </a:p>
           <a:p>
-            <a:pPr marL="285750" indent="-285750">
+            <a:pPr marL="285750" indent="-285750" algn="just">
               <a:lnSpc>
                 <a:spcPct val="150000"/>
               </a:lnSpc>
@@ -11636,7 +11610,7 @@
             </a:r>
           </a:p>
           <a:p>
-            <a:pPr marL="285750" indent="-285750">
+            <a:pPr marL="285750" indent="-285750" algn="just">
               <a:lnSpc>
                 <a:spcPct val="150000"/>
               </a:lnSpc>
@@ -11831,7 +11805,7 @@
         </p:blipFill>
         <p:spPr>
           <a:xfrm>
-            <a:off x="457200" y="1928185"/>
+            <a:off x="586292" y="1534681"/>
             <a:ext cx="3408297" cy="1292592"/>
           </a:xfrm>
           <a:prstGeom prst="roundRect">
@@ -11866,8 +11840,8 @@
         </p:nvSpPr>
         <p:spPr>
           <a:xfrm>
-            <a:off x="3967110" y="1238705"/>
-            <a:ext cx="4401686" cy="2949525"/>
+            <a:off x="4285114" y="1539741"/>
+            <a:ext cx="4401686" cy="1287532"/>
           </a:xfrm>
           <a:prstGeom prst="rect">
             <a:avLst/>
@@ -11880,7 +11854,7 @@
           </a:bodyPr>
           <a:lstStyle/>
           <a:p>
-            <a:pPr marL="285750" indent="-285750">
+            <a:pPr marL="285750" indent="-285750" algn="just">
               <a:lnSpc>
                 <a:spcPct val="150000"/>
               </a:lnSpc>
@@ -11889,37 +11863,8 @@
             </a:pPr>
             <a:r>
               <a:rPr lang="it-IT" sz="1800" dirty="0"/>
-              <a:t>Software house italiana nata a Napoli nel 2002</a:t>
-            </a:r>
-          </a:p>
-          <a:p>
-            <a:pPr>
-              <a:lnSpc>
-                <a:spcPct val="150000"/>
-              </a:lnSpc>
-            </a:pPr>
-            <a:endParaRPr lang="it-IT" sz="1800" dirty="0"/>
-          </a:p>
-          <a:p>
-            <a:pPr marL="285750" indent="-285750">
-              <a:lnSpc>
-                <a:spcPct val="150000"/>
-              </a:lnSpc>
-              <a:buFont typeface="Arial" panose="020B0604020202020204" pitchFamily="34" charset="0"/>
-              <a:buChar char="•"/>
-            </a:pPr>
-            <a:r>
-              <a:rPr lang="it-IT" sz="1800" dirty="0"/>
-              <a:t>Servizi di consulenza specialistica in ambito web, mobile, sicurezza e networking</a:t>
-            </a:r>
-          </a:p>
-          <a:p>
-            <a:pPr>
-              <a:lnSpc>
-                <a:spcPct val="150000"/>
-              </a:lnSpc>
-            </a:pPr>
-            <a:endParaRPr lang="it-IT" sz="1800" dirty="0"/>
+              <a:t>Sviluppo di applicazioni, consulenza e integrazione di soluzioni ambito web e mobile in vari settori</a:t>
+            </a:r>
           </a:p>
         </p:txBody>
       </p:sp>
@@ -11962,12 +11907,85 @@
           </a:p>
         </p:txBody>
       </p:sp>
+      <p:sp>
+        <p:nvSpPr>
+          <p:cNvPr id="10" name="CasellaDiTesto 9">
+            <a:extLst>
+              <a:ext uri="{FF2B5EF4-FFF2-40B4-BE49-F238E27FC236}">
+                <a16:creationId xmlns:a16="http://schemas.microsoft.com/office/drawing/2014/main" id="{264584F5-BE67-8131-BCFD-EA355857F988}"/>
+              </a:ext>
+            </a:extLst>
+          </p:cNvPr>
+          <p:cNvSpPr txBox="1"/>
+          <p:nvPr/>
+        </p:nvSpPr>
+        <p:spPr>
+          <a:xfrm>
+            <a:off x="280804" y="3530175"/>
+            <a:ext cx="4401686" cy="2949525"/>
+          </a:xfrm>
+          <a:prstGeom prst="rect">
+            <a:avLst/>
+          </a:prstGeom>
+          <a:noFill/>
+        </p:spPr>
+        <p:txBody>
+          <a:bodyPr wrap="square" rtlCol="0">
+            <a:spAutoFit/>
+          </a:bodyPr>
+          <a:lstStyle/>
+          <a:p>
+            <a:pPr marL="285750" indent="-285750" algn="just">
+              <a:lnSpc>
+                <a:spcPct val="150000"/>
+              </a:lnSpc>
+              <a:buFont typeface="Arial" panose="020B0604020202020204" pitchFamily="34" charset="0"/>
+              <a:buChar char="•"/>
+            </a:pPr>
+            <a:r>
+              <a:rPr lang="it-IT" sz="1800" dirty="0"/>
+              <a:t>Esplorazione e studio della tecnologia blockchain</a:t>
+            </a:r>
+          </a:p>
+          <a:p>
+            <a:pPr marL="285750" indent="-285750" algn="just">
+              <a:lnSpc>
+                <a:spcPct val="150000"/>
+              </a:lnSpc>
+              <a:buFont typeface="Arial" panose="020B0604020202020204" pitchFamily="34" charset="0"/>
+              <a:buChar char="•"/>
+            </a:pPr>
+            <a:endParaRPr lang="it-IT" sz="1800" dirty="0"/>
+          </a:p>
+          <a:p>
+            <a:pPr marL="285750" indent="-285750" algn="just">
+              <a:lnSpc>
+                <a:spcPct val="150000"/>
+              </a:lnSpc>
+              <a:buFont typeface="Arial" panose="020B0604020202020204" pitchFamily="34" charset="0"/>
+              <a:buChar char="•"/>
+            </a:pPr>
+            <a:r>
+              <a:rPr lang="it-IT" sz="1800" dirty="0"/>
+              <a:t>Creazione di un progetto legato al suo utilizzo al di fuori dell’ambito finanziario, mirato sulla sicurezza </a:t>
+            </a:r>
+          </a:p>
+          <a:p>
+            <a:pPr algn="just">
+              <a:lnSpc>
+                <a:spcPct val="150000"/>
+              </a:lnSpc>
+            </a:pPr>
+            <a:endParaRPr lang="it-IT" sz="1800" dirty="0"/>
+          </a:p>
+        </p:txBody>
+      </p:sp>
       <p:pic>
         <p:nvPicPr>
-          <p:cNvPr id="8" name="Immagine 7">
+          <p:cNvPr id="13" name="Immagine 12">
             <a:extLst>
               <a:ext uri="{FF2B5EF4-FFF2-40B4-BE49-F238E27FC236}">
-                <a16:creationId xmlns:a16="http://schemas.microsoft.com/office/drawing/2014/main" id="{8E46C6F0-5445-894E-B4C3-ADD0E58D6F0A}"/>
+                <a16:creationId xmlns:a16="http://schemas.microsoft.com/office/drawing/2014/main" id="{F2048A65-CDD6-D42F-5270-A1AAD91029BF}"/>
               </a:ext>
             </a:extLst>
           </p:cNvPr>
@@ -11984,144 +12002,12 @@
         </p:blipFill>
         <p:spPr>
           <a:xfrm>
-            <a:off x="592494" y="4157746"/>
-            <a:ext cx="1676545" cy="1859441"/>
-          </a:xfrm>
-          <a:prstGeom prst="roundRect">
-            <a:avLst>
-              <a:gd name="adj" fmla="val 16667"/>
-            </a:avLst>
-          </a:prstGeom>
-          <a:ln>
-            <a:noFill/>
-          </a:ln>
-          <a:effectLst>
-            <a:outerShdw blurRad="76200" dist="38100" dir="7800000" algn="tl" rotWithShape="0">
-              <a:srgbClr val="000000">
-                <a:alpha val="40000"/>
-              </a:srgbClr>
-            </a:outerShdw>
-          </a:effectLst>
-          <a:scene3d>
-            <a:camera prst="orthographicFront"/>
-            <a:lightRig rig="contrasting" dir="t">
-              <a:rot lat="0" lon="0" rev="4200000"/>
-            </a:lightRig>
-          </a:scene3d>
-          <a:sp3d prstMaterial="plastic">
-            <a:bevelT w="381000" h="114300" prst="relaxedInset"/>
-            <a:contourClr>
-              <a:srgbClr val="969696"/>
-            </a:contourClr>
-          </a:sp3d>
-        </p:spPr>
-      </p:pic>
-      <p:pic>
-        <p:nvPicPr>
-          <p:cNvPr id="10" name="Immagine 9">
-            <a:extLst>
-              <a:ext uri="{FF2B5EF4-FFF2-40B4-BE49-F238E27FC236}">
-                <a16:creationId xmlns:a16="http://schemas.microsoft.com/office/drawing/2014/main" id="{E70F8B12-AB90-8521-4F26-8D0227FBC3BD}"/>
-              </a:ext>
-            </a:extLst>
-          </p:cNvPr>
-          <p:cNvPicPr>
-            <a:picLocks noChangeAspect="1"/>
-          </p:cNvPicPr>
-          <p:nvPr/>
-        </p:nvPicPr>
-        <p:blipFill>
-          <a:blip r:embed="rId5"/>
-          <a:stretch>
-            <a:fillRect/>
-          </a:stretch>
-        </p:blipFill>
-        <p:spPr>
-          <a:xfrm>
-            <a:off x="3885261" y="4145197"/>
-            <a:ext cx="1373477" cy="1884538"/>
-          </a:xfrm>
-          <a:prstGeom prst="roundRect">
-            <a:avLst>
-              <a:gd name="adj" fmla="val 16667"/>
-            </a:avLst>
-          </a:prstGeom>
-          <a:ln>
-            <a:noFill/>
-          </a:ln>
-          <a:effectLst>
-            <a:outerShdw blurRad="76200" dist="38100" dir="7800000" algn="tl" rotWithShape="0">
-              <a:srgbClr val="000000">
-                <a:alpha val="40000"/>
-              </a:srgbClr>
-            </a:outerShdw>
-          </a:effectLst>
-          <a:scene3d>
-            <a:camera prst="orthographicFront"/>
-            <a:lightRig rig="contrasting" dir="t">
-              <a:rot lat="0" lon="0" rev="4200000"/>
-            </a:lightRig>
-          </a:scene3d>
-          <a:sp3d prstMaterial="plastic">
-            <a:bevelT w="381000" h="114300" prst="relaxedInset"/>
-            <a:contourClr>
-              <a:srgbClr val="969696"/>
-            </a:contourClr>
-          </a:sp3d>
-        </p:spPr>
-      </p:pic>
-      <p:pic>
-        <p:nvPicPr>
-          <p:cNvPr id="14" name="Immagine 13">
-            <a:extLst>
-              <a:ext uri="{FF2B5EF4-FFF2-40B4-BE49-F238E27FC236}">
-                <a16:creationId xmlns:a16="http://schemas.microsoft.com/office/drawing/2014/main" id="{B6459507-1F3A-7DC4-6B85-197F9EFE943F}"/>
-              </a:ext>
-            </a:extLst>
-          </p:cNvPr>
-          <p:cNvPicPr>
-            <a:picLocks noChangeAspect="1"/>
-          </p:cNvPicPr>
-          <p:nvPr/>
-        </p:nvPicPr>
-        <p:blipFill>
-          <a:blip r:embed="rId6"/>
-          <a:stretch>
-            <a:fillRect/>
-          </a:stretch>
-        </p:blipFill>
-        <p:spPr>
-          <a:xfrm>
-            <a:off x="6871877" y="4142506"/>
-            <a:ext cx="1735545" cy="1874681"/>
-          </a:xfrm>
-          <a:prstGeom prst="roundRect">
-            <a:avLst>
-              <a:gd name="adj" fmla="val 16667"/>
-            </a:avLst>
-          </a:prstGeom>
-          <a:ln>
-            <a:noFill/>
-          </a:ln>
-          <a:effectLst>
-            <a:outerShdw blurRad="76200" dist="38100" dir="7800000" algn="tl" rotWithShape="0">
-              <a:srgbClr val="000000">
-                <a:alpha val="40000"/>
-              </a:srgbClr>
-            </a:outerShdw>
-          </a:effectLst>
-          <a:scene3d>
-            <a:camera prst="orthographicFront"/>
-            <a:lightRig rig="contrasting" dir="t">
-              <a:rot lat="0" lon="0" rev="4200000"/>
-            </a:lightRig>
-          </a:scene3d>
-          <a:sp3d prstMaterial="plastic">
-            <a:bevelT w="381000" h="114300" prst="relaxedInset"/>
-            <a:contourClr>
-              <a:srgbClr val="969696"/>
-            </a:contourClr>
-          </a:sp3d>
+            <a:off x="5909021" y="3616640"/>
+            <a:ext cx="2129309" cy="2228809"/>
+          </a:xfrm>
+          <a:prstGeom prst="rect">
+            <a:avLst/>
+          </a:prstGeom>
         </p:spPr>
       </p:pic>
     </p:spTree>
@@ -12278,12 +12164,158 @@
           </a:p>
         </p:txBody>
       </p:sp>
+      <p:sp>
+        <p:nvSpPr>
+          <p:cNvPr id="12" name="CasellaDiTesto 11">
+            <a:extLst>
+              <a:ext uri="{FF2B5EF4-FFF2-40B4-BE49-F238E27FC236}">
+                <a16:creationId xmlns:a16="http://schemas.microsoft.com/office/drawing/2014/main" id="{D5434956-A88A-2A79-773E-C7DC2545DF5B}"/>
+              </a:ext>
+            </a:extLst>
+          </p:cNvPr>
+          <p:cNvSpPr txBox="1"/>
+          <p:nvPr/>
+        </p:nvSpPr>
+        <p:spPr>
+          <a:xfrm>
+            <a:off x="457198" y="2780303"/>
+            <a:ext cx="8411378" cy="3365024"/>
+          </a:xfrm>
+          <a:prstGeom prst="rect">
+            <a:avLst/>
+          </a:prstGeom>
+          <a:noFill/>
+        </p:spPr>
+        <p:txBody>
+          <a:bodyPr wrap="square" rtlCol="0">
+            <a:spAutoFit/>
+          </a:bodyPr>
+          <a:lstStyle/>
+          <a:p>
+            <a:pPr marL="285750" indent="-285750" algn="just">
+              <a:lnSpc>
+                <a:spcPct val="150000"/>
+              </a:lnSpc>
+              <a:buFont typeface="Arial" panose="020B0604020202020204" pitchFamily="34" charset="0"/>
+              <a:buChar char="•"/>
+            </a:pPr>
+            <a:r>
+              <a:rPr lang="it-IT" sz="1800" dirty="0"/>
+              <a:t>Struttura dati basata su un consenso distribuito tra i partecipanti secondo protocolli definiti a priori</a:t>
+            </a:r>
+          </a:p>
+          <a:p>
+            <a:pPr algn="just">
+              <a:lnSpc>
+                <a:spcPct val="150000"/>
+              </a:lnSpc>
+            </a:pPr>
+            <a:endParaRPr lang="it-IT" sz="1800" dirty="0"/>
+          </a:p>
+          <a:p>
+            <a:pPr marL="285750" indent="-285750" algn="just">
+              <a:lnSpc>
+                <a:spcPct val="150000"/>
+              </a:lnSpc>
+              <a:buFont typeface="Arial" panose="020B0604020202020204" pitchFamily="34" charset="0"/>
+              <a:buChar char="•"/>
+            </a:pPr>
+            <a:r>
+              <a:rPr lang="it-IT" sz="1800" dirty="0"/>
+              <a:t>Dati salvati come hash in blocchi a catena e firmati digitalmente</a:t>
+            </a:r>
+          </a:p>
+          <a:p>
+            <a:pPr marL="285750" indent="-285750" algn="just">
+              <a:lnSpc>
+                <a:spcPct val="150000"/>
+              </a:lnSpc>
+              <a:buFont typeface="Arial" panose="020B0604020202020204" pitchFamily="34" charset="0"/>
+              <a:buChar char="•"/>
+            </a:pPr>
+            <a:endParaRPr lang="it-IT" sz="1800" dirty="0"/>
+          </a:p>
+          <a:p>
+            <a:pPr marL="285750" indent="-285750" algn="just">
+              <a:lnSpc>
+                <a:spcPct val="150000"/>
+              </a:lnSpc>
+              <a:buFont typeface="Arial" panose="020B0604020202020204" pitchFamily="34" charset="0"/>
+              <a:buChar char="•"/>
+            </a:pPr>
+            <a:r>
+              <a:rPr lang="it-IT" sz="1800" dirty="0"/>
+              <a:t>Immutabilità dei dati e tracciabilità completa senza intermediari</a:t>
+            </a:r>
+          </a:p>
+          <a:p>
+            <a:pPr algn="just">
+              <a:lnSpc>
+                <a:spcPct val="150000"/>
+              </a:lnSpc>
+            </a:pPr>
+            <a:endParaRPr lang="it-IT" sz="1800" dirty="0"/>
+          </a:p>
+          <a:p>
+            <a:pPr marL="285750" indent="-285750" algn="just">
+              <a:lnSpc>
+                <a:spcPct val="150000"/>
+              </a:lnSpc>
+              <a:buFont typeface="Arial" panose="020B0604020202020204" pitchFamily="34" charset="0"/>
+              <a:buChar char="•"/>
+            </a:pPr>
+            <a:r>
+              <a:rPr lang="it-IT" sz="1800" dirty="0"/>
+              <a:t>Informazioni salvate in modo trasparente e decentralizzato</a:t>
+            </a:r>
+          </a:p>
+        </p:txBody>
+      </p:sp>
+      <p:sp>
+        <p:nvSpPr>
+          <p:cNvPr id="15" name="CasellaDiTesto 14">
+            <a:extLst>
+              <a:ext uri="{FF2B5EF4-FFF2-40B4-BE49-F238E27FC236}">
+                <a16:creationId xmlns:a16="http://schemas.microsoft.com/office/drawing/2014/main" id="{39CF2A72-7872-93A9-84C8-A66A636CCB44}"/>
+              </a:ext>
+            </a:extLst>
+          </p:cNvPr>
+          <p:cNvSpPr txBox="1"/>
+          <p:nvPr/>
+        </p:nvSpPr>
+        <p:spPr>
+          <a:xfrm>
+            <a:off x="5339930" y="6396333"/>
+            <a:ext cx="3267492" cy="307777"/>
+          </a:xfrm>
+          <a:prstGeom prst="rect">
+            <a:avLst/>
+          </a:prstGeom>
+          <a:noFill/>
+        </p:spPr>
+        <p:txBody>
+          <a:bodyPr wrap="square" rtlCol="0">
+            <a:spAutoFit/>
+          </a:bodyPr>
+          <a:lstStyle/>
+          <a:p>
+            <a:r>
+              <a:rPr lang="it-IT" dirty="0">
+                <a:solidFill>
+                  <a:schemeClr val="bg1"/>
+                </a:solidFill>
+              </a:rPr>
+              <a:t>Gabriel Rovesti - VerifiedMovies</a:t>
+            </a:r>
+          </a:p>
+        </p:txBody>
+      </p:sp>
       <p:pic>
         <p:nvPicPr>
-          <p:cNvPr id="11" name="Immagine 10">
+          <p:cNvPr id="4" name="Immagine 3">
             <a:extLst>
               <a:ext uri="{FF2B5EF4-FFF2-40B4-BE49-F238E27FC236}">
-                <a16:creationId xmlns:a16="http://schemas.microsoft.com/office/drawing/2014/main" id="{647B9970-1EBD-2331-FECA-89863CCA2C59}"/>
+                <a16:creationId xmlns:a16="http://schemas.microsoft.com/office/drawing/2014/main" id="{11BBDDB6-93DD-6BAA-55FF-09B450F09E14}"/>
               </a:ext>
             </a:extLst>
           </p:cNvPr>
@@ -12300,160 +12332,14 @@
         </p:blipFill>
         <p:spPr>
           <a:xfrm>
-            <a:off x="3749190" y="960733"/>
-            <a:ext cx="1827395" cy="1804553"/>
+            <a:off x="3525782" y="1048428"/>
+            <a:ext cx="2092435" cy="1731874"/>
           </a:xfrm>
           <a:prstGeom prst="rect">
             <a:avLst/>
           </a:prstGeom>
         </p:spPr>
       </p:pic>
-      <p:sp>
-        <p:nvSpPr>
-          <p:cNvPr id="12" name="CasellaDiTesto 11">
-            <a:extLst>
-              <a:ext uri="{FF2B5EF4-FFF2-40B4-BE49-F238E27FC236}">
-                <a16:creationId xmlns:a16="http://schemas.microsoft.com/office/drawing/2014/main" id="{D5434956-A88A-2A79-773E-C7DC2545DF5B}"/>
-              </a:ext>
-            </a:extLst>
-          </p:cNvPr>
-          <p:cNvSpPr txBox="1"/>
-          <p:nvPr/>
-        </p:nvSpPr>
-        <p:spPr>
-          <a:xfrm>
-            <a:off x="457198" y="2780303"/>
-            <a:ext cx="8411378" cy="3365024"/>
-          </a:xfrm>
-          <a:prstGeom prst="rect">
-            <a:avLst/>
-          </a:prstGeom>
-          <a:noFill/>
-        </p:spPr>
-        <p:txBody>
-          <a:bodyPr wrap="square" rtlCol="0">
-            <a:spAutoFit/>
-          </a:bodyPr>
-          <a:lstStyle/>
-          <a:p>
-            <a:pPr marL="285750" indent="-285750">
-              <a:lnSpc>
-                <a:spcPct val="150000"/>
-              </a:lnSpc>
-              <a:buFont typeface="Arial" panose="020B0604020202020204" pitchFamily="34" charset="0"/>
-              <a:buChar char="•"/>
-            </a:pPr>
-            <a:r>
-              <a:rPr lang="it-IT" sz="1800" dirty="0"/>
-              <a:t>Struttura dati basata su un consenso distribuito tra i partecipanti secondo protocolli definiti a priori</a:t>
-            </a:r>
-          </a:p>
-          <a:p>
-            <a:pPr>
-              <a:lnSpc>
-                <a:spcPct val="150000"/>
-              </a:lnSpc>
-            </a:pPr>
-            <a:endParaRPr lang="it-IT" sz="1800" dirty="0"/>
-          </a:p>
-          <a:p>
-            <a:pPr marL="285750" indent="-285750">
-              <a:lnSpc>
-                <a:spcPct val="150000"/>
-              </a:lnSpc>
-              <a:buFont typeface="Arial" panose="020B0604020202020204" pitchFamily="34" charset="0"/>
-              <a:buChar char="•"/>
-            </a:pPr>
-            <a:r>
-              <a:rPr lang="it-IT" sz="1800" dirty="0"/>
-              <a:t>Dati salvati come hash in blocchi a catena e firmati digitalmente</a:t>
-            </a:r>
-          </a:p>
-          <a:p>
-            <a:pPr marL="285750" indent="-285750">
-              <a:lnSpc>
-                <a:spcPct val="150000"/>
-              </a:lnSpc>
-              <a:buFont typeface="Arial" panose="020B0604020202020204" pitchFamily="34" charset="0"/>
-              <a:buChar char="•"/>
-            </a:pPr>
-            <a:endParaRPr lang="it-IT" sz="1800" dirty="0"/>
-          </a:p>
-          <a:p>
-            <a:pPr marL="285750" indent="-285750">
-              <a:lnSpc>
-                <a:spcPct val="150000"/>
-              </a:lnSpc>
-              <a:buFont typeface="Arial" panose="020B0604020202020204" pitchFamily="34" charset="0"/>
-              <a:buChar char="•"/>
-            </a:pPr>
-            <a:r>
-              <a:rPr lang="it-IT" sz="1800" dirty="0"/>
-              <a:t>Immutabilità dei dati e tracciabilità completa senza intermediari</a:t>
-            </a:r>
-          </a:p>
-          <a:p>
-            <a:pPr>
-              <a:lnSpc>
-                <a:spcPct val="150000"/>
-              </a:lnSpc>
-            </a:pPr>
-            <a:endParaRPr lang="it-IT" sz="1800" dirty="0"/>
-          </a:p>
-          <a:p>
-            <a:pPr marL="285750" indent="-285750">
-              <a:lnSpc>
-                <a:spcPct val="150000"/>
-              </a:lnSpc>
-              <a:buFont typeface="Arial" panose="020B0604020202020204" pitchFamily="34" charset="0"/>
-              <a:buChar char="•"/>
-            </a:pPr>
-            <a:r>
-              <a:rPr lang="it-IT" sz="1800" dirty="0"/>
-              <a:t>Informazioni salvate in modo trasparente e decentralizzato</a:t>
-            </a:r>
-          </a:p>
-        </p:txBody>
-      </p:sp>
-      <p:sp>
-        <p:nvSpPr>
-          <p:cNvPr id="15" name="CasellaDiTesto 14">
-            <a:extLst>
-              <a:ext uri="{FF2B5EF4-FFF2-40B4-BE49-F238E27FC236}">
-                <a16:creationId xmlns:a16="http://schemas.microsoft.com/office/drawing/2014/main" id="{39CF2A72-7872-93A9-84C8-A66A636CCB44}"/>
-              </a:ext>
-            </a:extLst>
-          </p:cNvPr>
-          <p:cNvSpPr txBox="1"/>
-          <p:nvPr/>
-        </p:nvSpPr>
-        <p:spPr>
-          <a:xfrm>
-            <a:off x="5339930" y="6396333"/>
-            <a:ext cx="3267492" cy="307777"/>
-          </a:xfrm>
-          <a:prstGeom prst="rect">
-            <a:avLst/>
-          </a:prstGeom>
-          <a:noFill/>
-        </p:spPr>
-        <p:txBody>
-          <a:bodyPr wrap="square" rtlCol="0">
-            <a:spAutoFit/>
-          </a:bodyPr>
-          <a:lstStyle/>
-          <a:p>
-            <a:r>
-              <a:rPr lang="it-IT" dirty="0">
-                <a:solidFill>
-                  <a:schemeClr val="bg1"/>
-                </a:solidFill>
-              </a:rPr>
-              <a:t>Gabriel Rovesti - VerifiedMovies</a:t>
-            </a:r>
-          </a:p>
-        </p:txBody>
-      </p:sp>
     </p:spTree>
     <p:extLst>
       <p:ext uri="{BB962C8B-B14F-4D97-AF65-F5344CB8AC3E}">
@@ -12627,7 +12513,7 @@
         </p:nvSpPr>
         <p:spPr>
           <a:xfrm>
-            <a:off x="554467" y="3105511"/>
+            <a:off x="457199" y="3105510"/>
             <a:ext cx="8411378" cy="2949525"/>
           </a:xfrm>
           <a:prstGeom prst="rect">
@@ -12641,7 +12527,7 @@
           </a:bodyPr>
           <a:lstStyle/>
           <a:p>
-            <a:pPr marL="285750" indent="-285750">
+            <a:pPr marL="285750" indent="-285750" algn="just">
               <a:lnSpc>
                 <a:spcPct val="150000"/>
               </a:lnSpc>
@@ -12654,7 +12540,7 @@
             </a:r>
           </a:p>
           <a:p>
-            <a:pPr marL="285750" indent="-285750">
+            <a:pPr marL="285750" indent="-285750" algn="just">
               <a:lnSpc>
                 <a:spcPct val="150000"/>
               </a:lnSpc>
@@ -12664,7 +12550,7 @@
             <a:endParaRPr lang="it-IT" sz="1800" dirty="0"/>
           </a:p>
           <a:p>
-            <a:pPr marL="285750" indent="-285750">
+            <a:pPr marL="285750" indent="-285750" algn="just">
               <a:lnSpc>
                 <a:spcPct val="150000"/>
               </a:lnSpc>
@@ -12677,7 +12563,7 @@
             </a:r>
           </a:p>
           <a:p>
-            <a:pPr marL="285750" indent="-285750">
+            <a:pPr marL="285750" indent="-285750" algn="just">
               <a:lnSpc>
                 <a:spcPct val="150000"/>
               </a:lnSpc>
@@ -12687,7 +12573,7 @@
             <a:endParaRPr lang="it-IT" sz="1800" dirty="0"/>
           </a:p>
           <a:p>
-            <a:pPr marL="285750" indent="-285750">
+            <a:pPr marL="285750" indent="-285750" algn="just">
               <a:lnSpc>
                 <a:spcPct val="150000"/>
               </a:lnSpc>
@@ -13007,7 +12893,7 @@
         </p:nvSpPr>
         <p:spPr>
           <a:xfrm>
-            <a:off x="457198" y="1374020"/>
+            <a:off x="457198" y="1449323"/>
             <a:ext cx="6516477" cy="4196020"/>
           </a:xfrm>
           <a:prstGeom prst="rect">
@@ -13021,7 +12907,7 @@
           </a:bodyPr>
           <a:lstStyle/>
           <a:p>
-            <a:pPr marL="285750" indent="-285750">
+            <a:pPr marL="285750" indent="-285750" algn="just">
               <a:lnSpc>
                 <a:spcPct val="150000"/>
               </a:lnSpc>
@@ -13034,7 +12920,7 @@
             </a:r>
           </a:p>
           <a:p>
-            <a:pPr marL="285750" indent="-285750">
+            <a:pPr marL="285750" indent="-285750" algn="just">
               <a:lnSpc>
                 <a:spcPct val="150000"/>
               </a:lnSpc>
@@ -13044,7 +12930,7 @@
             <a:endParaRPr lang="it-IT" sz="1800" dirty="0"/>
           </a:p>
           <a:p>
-            <a:pPr marL="285750" indent="-285750">
+            <a:pPr marL="285750" indent="-285750" algn="just">
               <a:lnSpc>
                 <a:spcPct val="150000"/>
               </a:lnSpc>
@@ -13070,7 +12956,7 @@
             <a:endParaRPr lang="it-IT" sz="1800" dirty="0"/>
           </a:p>
           <a:p>
-            <a:pPr marL="285750" indent="-285750">
+            <a:pPr marL="285750" indent="-285750" algn="just">
               <a:lnSpc>
                 <a:spcPct val="150000"/>
               </a:lnSpc>
@@ -13080,7 +12966,7 @@
             <a:endParaRPr lang="it-IT" sz="1800" dirty="0"/>
           </a:p>
           <a:p>
-            <a:pPr marL="285750" indent="-285750">
+            <a:pPr marL="285750" indent="-285750" algn="just">
               <a:lnSpc>
                 <a:spcPct val="150000"/>
               </a:lnSpc>
@@ -13097,7 +12983,7 @@
             </a:r>
           </a:p>
           <a:p>
-            <a:pPr marL="285750" indent="-285750">
+            <a:pPr marL="285750" indent="-285750" algn="just">
               <a:lnSpc>
                 <a:spcPct val="150000"/>
               </a:lnSpc>
@@ -13107,7 +12993,7 @@
             <a:endParaRPr lang="it-IT" sz="1800" i="1" dirty="0"/>
           </a:p>
           <a:p>
-            <a:pPr marL="285750" indent="-285750">
+            <a:pPr marL="285750" indent="-285750" algn="just">
               <a:lnSpc>
                 <a:spcPct val="150000"/>
               </a:lnSpc>
@@ -13128,7 +13014,7 @@
             </a:r>
           </a:p>
           <a:p>
-            <a:pPr>
+            <a:pPr algn="just">
               <a:lnSpc>
                 <a:spcPct val="150000"/>
               </a:lnSpc>
@@ -13216,13 +13102,22 @@
         </p:blipFill>
         <p:spPr bwMode="auto">
           <a:xfrm>
-            <a:off x="7626285" y="2544896"/>
+            <a:off x="7626285" y="2587926"/>
             <a:ext cx="1060515" cy="1768207"/>
           </a:xfrm>
           <a:prstGeom prst="rect">
             <a:avLst/>
           </a:prstGeom>
-          <a:noFill/>
+          <a:ln>
+            <a:noFill/>
+          </a:ln>
+          <a:effectLst>
+            <a:outerShdw blurRad="190500" algn="tl" rotWithShape="0">
+              <a:srgbClr val="000000">
+                <a:alpha val="70000"/>
+              </a:srgbClr>
+            </a:outerShdw>
+          </a:effectLst>
           <a:extLst>
             <a:ext uri="{909E8E84-426E-40DD-AFC4-6F175D3DCCD1}">
               <a14:hiddenFill xmlns:a14="http://schemas.microsoft.com/office/drawing/2010/main">
@@ -13490,7 +13385,7 @@
           </a:bodyPr>
           <a:lstStyle/>
           <a:p>
-            <a:pPr marL="285750" indent="-285750">
+            <a:pPr marL="285750" indent="-285750" algn="just">
               <a:lnSpc>
                 <a:spcPct val="150000"/>
               </a:lnSpc>
@@ -13519,7 +13414,7 @@
             </a:r>
           </a:p>
           <a:p>
-            <a:pPr marL="285750" indent="-285750">
+            <a:pPr marL="285750" indent="-285750" algn="just">
               <a:lnSpc>
                 <a:spcPct val="150000"/>
               </a:lnSpc>
@@ -13529,7 +13424,7 @@
             <a:endParaRPr lang="it-IT" sz="1800" dirty="0"/>
           </a:p>
           <a:p>
-            <a:pPr marL="285750" indent="-285750">
+            <a:pPr marL="285750" indent="-285750" algn="just">
               <a:lnSpc>
                 <a:spcPct val="150000"/>
               </a:lnSpc>
@@ -13538,15 +13433,15 @@
             </a:pPr>
             <a:r>
               <a:rPr lang="it-IT" sz="1800" dirty="0"/>
-              <a:t>Ad essi è associato un documento che descrive il soggetto associato e i metodi di autenticazione sicuri (</a:t>
+              <a:t>Ad essi è associato un documento che descrive il soggetto associato e il metodo di autenticazione sicuro (</a:t>
             </a:r>
             <a:r>
               <a:rPr lang="it-IT" sz="1800" i="1" dirty="0"/>
-              <a:t>DID </a:t>
+              <a:t>DID Method</a:t>
             </a:r>
             <a:r>
               <a:rPr lang="it-IT" sz="1800" dirty="0"/>
-              <a:t>Method), chiamato </a:t>
+              <a:t>), chiamato </a:t>
             </a:r>
             <a:r>
               <a:rPr lang="it-IT" sz="1800" i="1" dirty="0"/>
@@ -13555,7 +13450,7 @@
             <a:endParaRPr lang="it-IT" sz="1800" dirty="0"/>
           </a:p>
           <a:p>
-            <a:pPr>
+            <a:pPr algn="just">
               <a:lnSpc>
                 <a:spcPct val="150000"/>
               </a:lnSpc>
@@ -13563,7 +13458,7 @@
             <a:endParaRPr lang="it-IT" sz="1800" b="1" dirty="0"/>
           </a:p>
           <a:p>
-            <a:pPr marL="285750" indent="-285750">
+            <a:pPr marL="285750" indent="-285750" algn="just">
               <a:lnSpc>
                 <a:spcPct val="150000"/>
               </a:lnSpc>
@@ -13803,7 +13698,7 @@
           </a:bodyPr>
           <a:lstStyle/>
           <a:p>
-            <a:pPr marL="285750" indent="-285750">
+            <a:pPr marL="285750" indent="-285750" algn="just">
               <a:lnSpc>
                 <a:spcPct val="150000"/>
               </a:lnSpc>
@@ -13824,7 +13719,7 @@
             </a:r>
           </a:p>
           <a:p>
-            <a:pPr marL="285750" indent="-285750">
+            <a:pPr marL="285750" indent="-285750" algn="just">
               <a:lnSpc>
                 <a:spcPct val="150000"/>
               </a:lnSpc>
@@ -13834,7 +13729,7 @@
             <a:endParaRPr lang="it-IT" sz="1600" dirty="0"/>
           </a:p>
           <a:p>
-            <a:pPr marL="285750" indent="-285750">
+            <a:pPr marL="285750" indent="-285750" algn="just">
               <a:lnSpc>
                 <a:spcPct val="150000"/>
               </a:lnSpc>
@@ -13899,7 +13794,7 @@
         </p:blipFill>
         <p:spPr>
           <a:xfrm>
-            <a:off x="2906892" y="898459"/>
+            <a:off x="2906891" y="960733"/>
             <a:ext cx="3511991" cy="2596133"/>
           </a:xfrm>
           <a:prstGeom prst="rect">
@@ -14119,8 +14014,8 @@
         </p:nvSpPr>
         <p:spPr>
           <a:xfrm>
-            <a:off x="457199" y="3881021"/>
-            <a:ext cx="8411378" cy="2118529"/>
+            <a:off x="366311" y="3623485"/>
+            <a:ext cx="8411378" cy="2534027"/>
           </a:xfrm>
           <a:prstGeom prst="rect">
             <a:avLst/>
@@ -14150,7 +14045,7 @@
             </a:r>
             <a:r>
               <a:rPr lang="it-IT" sz="1800" dirty="0"/>
-              <a:t>che presentano un insieme di dati codificati con una prova crittografica di non manomissione</a:t>
+              <a:t>che li presentano esternamente come insieme di dati con prova crittografica di non manomissione</a:t>
             </a:r>
           </a:p>
           <a:p>
@@ -14208,7 +14103,7 @@
         </p:blipFill>
         <p:spPr>
           <a:xfrm>
-            <a:off x="2819570" y="1103244"/>
+            <a:off x="2819570" y="924689"/>
             <a:ext cx="3504860" cy="2579386"/>
           </a:xfrm>
           <a:prstGeom prst="rect">
@@ -14509,7 +14404,7 @@
               <a:buFont typeface="Arial" panose="020B0604020202020204" pitchFamily="34" charset="0"/>
               <a:buChar char="•"/>
             </a:pPr>
-            <a:endParaRPr lang="it-IT" sz="1800" dirty="0"/>
+            <a:endParaRPr lang="it-IT" sz="1800" u="sng" dirty="0"/>
           </a:p>
           <a:p>
             <a:pPr marL="285750" indent="-285750" algn="just">
@@ -14529,7 +14424,7 @@
             </a:r>
             <a:r>
               <a:rPr lang="it-IT" sz="1800" dirty="0"/>
-              <a:t> firmato con chiave private dell’utente e chiave pubblica di un’entità fidata in blockchain</a:t>
+              <a:t> firmato con chiave privata dell’utente e chiave pubblica di un’entità fidata in blockchain</a:t>
             </a:r>
           </a:p>
         </p:txBody>

</xml_diff>